<commit_message>
extra info in file.json
</commit_message>
<xml_diff>
--- a/docs/readme_development.pptx
+++ b/docs/readme_development.pptx
@@ -216,6 +216,7 @@
           <a:p>
             <a:fld id="{74A0E1AF-9ED3-4188-A17D-BFFB8690E4D9}" type="datetimeFigureOut">
               <a:rPr lang="en-GB" smtClean="0"/>
+              <a:pPr/>
               <a:t>02/08/2011</a:t>
             </a:fld>
             <a:endParaRPr lang="en-GB"/>
@@ -377,6 +378,7 @@
           <a:p>
             <a:fld id="{62AAED60-91E5-44DA-AD71-E62E0C676170}" type="slidenum">
               <a:rPr lang="en-GB" smtClean="0"/>
+              <a:pPr/>
               <a:t>‹#›</a:t>
             </a:fld>
             <a:endParaRPr lang="en-GB"/>
@@ -662,6 +664,7 @@
           <a:p>
             <a:fld id="{A2D17C81-3A61-4411-B0BC-18470022F277}" type="datetime1">
               <a:rPr lang="en-GB" smtClean="0"/>
+              <a:pPr/>
               <a:t>02/08/2011</a:t>
             </a:fld>
             <a:endParaRPr lang="en-GB"/>
@@ -832,6 +835,7 @@
           <a:p>
             <a:fld id="{94C1E024-F399-49EE-B17A-C884E32C64B1}" type="datetime1">
               <a:rPr lang="en-GB" smtClean="0"/>
+              <a:pPr/>
               <a:t>02/08/2011</a:t>
             </a:fld>
             <a:endParaRPr lang="en-GB"/>
@@ -1012,6 +1016,7 @@
           <a:p>
             <a:fld id="{C21146B1-A45B-4FFD-9234-6D69798353E8}" type="datetime1">
               <a:rPr lang="en-GB" smtClean="0"/>
+              <a:pPr/>
               <a:t>02/08/2011</a:t>
             </a:fld>
             <a:endParaRPr lang="en-GB"/>
@@ -1182,6 +1187,7 @@
           <a:p>
             <a:fld id="{99754A40-3E9E-4671-A285-8FDB85EEA878}" type="datetime1">
               <a:rPr lang="en-GB" smtClean="0"/>
+              <a:pPr/>
               <a:t>02/08/2011</a:t>
             </a:fld>
             <a:endParaRPr lang="en-GB"/>
@@ -1428,6 +1434,7 @@
           <a:p>
             <a:fld id="{9B1CA4E5-ACFC-4E33-8A18-16074A8688BB}" type="datetime1">
               <a:rPr lang="en-GB" smtClean="0"/>
+              <a:pPr/>
               <a:t>02/08/2011</a:t>
             </a:fld>
             <a:endParaRPr lang="en-GB"/>
@@ -1716,6 +1723,7 @@
           <a:p>
             <a:fld id="{D33E32D2-9B00-4BC7-8088-C9F213108F66}" type="datetime1">
               <a:rPr lang="en-GB" smtClean="0"/>
+              <a:pPr/>
               <a:t>02/08/2011</a:t>
             </a:fld>
             <a:endParaRPr lang="en-GB"/>
@@ -2138,6 +2146,7 @@
           <a:p>
             <a:fld id="{ED677D40-A884-454C-B1C2-FD991C706EA6}" type="datetime1">
               <a:rPr lang="en-GB" smtClean="0"/>
+              <a:pPr/>
               <a:t>02/08/2011</a:t>
             </a:fld>
             <a:endParaRPr lang="en-GB"/>
@@ -2256,6 +2265,7 @@
           <a:p>
             <a:fld id="{3A2313F6-0B76-4887-9CAC-FB231FF11EE5}" type="datetime1">
               <a:rPr lang="en-GB" smtClean="0"/>
+              <a:pPr/>
               <a:t>02/08/2011</a:t>
             </a:fld>
             <a:endParaRPr lang="en-GB"/>
@@ -2351,6 +2361,7 @@
           <a:p>
             <a:fld id="{C9BE8627-E39F-4DB4-9277-3E692B9821E5}" type="datetime1">
               <a:rPr lang="en-GB" smtClean="0"/>
+              <a:pPr/>
               <a:t>02/08/2011</a:t>
             </a:fld>
             <a:endParaRPr lang="en-GB"/>
@@ -2628,6 +2639,7 @@
           <a:p>
             <a:fld id="{EA144C46-FBB5-4F20-8AD4-692765129358}" type="datetime1">
               <a:rPr lang="en-GB" smtClean="0"/>
+              <a:pPr/>
               <a:t>02/08/2011</a:t>
             </a:fld>
             <a:endParaRPr lang="en-GB"/>
@@ -2881,6 +2893,7 @@
           <a:p>
             <a:fld id="{3C932F37-A5C5-4685-8B37-CBB5D729C0F8}" type="datetime1">
               <a:rPr lang="en-GB" smtClean="0"/>
+              <a:pPr/>
               <a:t>02/08/2011</a:t>
             </a:fld>
             <a:endParaRPr lang="en-GB"/>
@@ -3094,6 +3107,7 @@
           <a:p>
             <a:fld id="{404936E1-57E9-49BE-A877-3ED51EAA2CBC}" type="datetime1">
               <a:rPr lang="en-GB" smtClean="0"/>
+              <a:pPr/>
               <a:t>02/08/2011</a:t>
             </a:fld>
             <a:endParaRPr lang="en-GB"/>
@@ -3550,6 +3564,7 @@
           <a:p>
             <a:fld id="{ECEF0302-0078-48BC-8A28-3C08E35C3956}" type="datetime1">
               <a:rPr lang="en-GB" smtClean="0"/>
+              <a:pPr/>
               <a:t>02/08/2011</a:t>
             </a:fld>
             <a:endParaRPr lang="en-GB"/>
@@ -3680,13 +3695,7 @@
               <a:rPr lang="en-GB" sz="2800" dirty="0" smtClean="0">
                 <a:hlinkClick r:id="rId2"/>
               </a:rPr>
-              <a:t>https://</a:t>
-            </a:r>
-            <a:r>
-              <a:rPr lang="en-GB" sz="2800" dirty="0" smtClean="0">
-                <a:hlinkClick r:id="rId2"/>
-              </a:rPr>
-              <a:t>github.com/cgreenhalgh/webctdbexport</a:t>
+              <a:t>https://github.com/cgreenhalgh/webctdbexport</a:t>
             </a:r>
             <a:r>
               <a:rPr lang="en-GB" sz="2800" dirty="0" smtClean="0"/>
@@ -3800,6 +3809,7 @@
           <a:p>
             <a:fld id="{D4B290E2-3611-43DB-B345-1DC6D4CB4A8B}" type="datetime1">
               <a:rPr lang="en-GB" smtClean="0"/>
+              <a:pPr/>
               <a:t>02/08/2011</a:t>
             </a:fld>
             <a:endParaRPr lang="en-GB"/>
@@ -3983,6 +3993,7 @@
           <a:p>
             <a:fld id="{61ED3A50-388A-473C-B4FE-61F30947038F}" type="datetime1">
               <a:rPr lang="en-GB" smtClean="0"/>
+              <a:pPr/>
               <a:t>02/08/2011</a:t>
             </a:fld>
             <a:endParaRPr lang="en-GB"/>
@@ -4203,6 +4214,7 @@
           <a:p>
             <a:fld id="{03364176-B50D-4113-A739-99B042C725A6}" type="datetime1">
               <a:rPr lang="en-GB" smtClean="0"/>
+              <a:pPr/>
               <a:t>02/08/2011</a:t>
             </a:fld>
             <a:endParaRPr lang="en-GB"/>
@@ -4419,6 +4431,7 @@
           <a:p>
             <a:fld id="{F7857F0E-E873-4DCE-94AE-946A498F121D}" type="datetime1">
               <a:rPr lang="en-GB" smtClean="0"/>
+              <a:pPr/>
               <a:t>02/08/2011</a:t>
             </a:fld>
             <a:endParaRPr lang="en-GB"/>
@@ -4574,19 +4587,7 @@
             <a:pPr lvl="2"/>
             <a:r>
               <a:rPr lang="en-GB" dirty="0" smtClean="0"/>
-              <a:t>E.g. </a:t>
-            </a:r>
-            <a:r>
-              <a:rPr lang="en-GB" dirty="0" smtClean="0"/>
-              <a:t>ce12345</a:t>
-            </a:r>
-            <a:r>
-              <a:rPr lang="en-GB" dirty="0" smtClean="0"/>
-              <a:t>/ = </a:t>
-            </a:r>
-            <a:r>
-              <a:rPr lang="en-GB" dirty="0" smtClean="0"/>
-              <a:t>CMS Entry ID 12345</a:t>
+              <a:t>E.g. ce12345/ = CMS Entry ID 12345</a:t>
             </a:r>
           </a:p>
           <a:p>
@@ -4603,7 +4604,6 @@
               <a:rPr lang="en-GB" dirty="0" smtClean="0"/>
               <a:t> file with the file’s name, SHA-1 hash and path to file content</a:t>
             </a:r>
-            <a:endParaRPr lang="en-GB" dirty="0" smtClean="0"/>
           </a:p>
           <a:p>
             <a:pPr lvl="1"/>
@@ -4628,6 +4628,7 @@
           <a:p>
             <a:fld id="{F077DA80-20EA-4227-8D5A-4F2C5FC1DEAB}" type="datetime1">
               <a:rPr lang="en-GB" smtClean="0"/>
+              <a:pPr/>
               <a:t>02/08/2011</a:t>
             </a:fld>
             <a:endParaRPr lang="en-GB"/>
@@ -4832,6 +4833,7 @@
           <a:p>
             <a:fld id="{AD2E3EA8-AA70-45E1-907B-27534B36A021}" type="datetime1">
               <a:rPr lang="en-GB" smtClean="0"/>
+              <a:pPr/>
               <a:t>02/08/2011</a:t>
             </a:fld>
             <a:endParaRPr lang="en-GB"/>
@@ -5010,6 +5012,7 @@
           <a:p>
             <a:fld id="{2BA5357B-980D-4E78-A8CE-258A05709133}" type="datetime1">
               <a:rPr lang="en-GB" smtClean="0"/>
+              <a:pPr/>
               <a:t>02/08/2011</a:t>
             </a:fld>
             <a:endParaRPr lang="en-GB"/>
@@ -5153,11 +5156,7 @@
             </a:pPr>
             <a:r>
               <a:rPr lang="en-GB" dirty="0" smtClean="0"/>
-              <a:t>	</a:t>
-            </a:r>
-            <a:r>
-              <a:rPr lang="en-GB" dirty="0" smtClean="0"/>
-              <a:t>"path":[ … ], </a:t>
+              <a:t>	"path":[ … ], </a:t>
             </a:r>
           </a:p>
           <a:p>
@@ -5166,11 +5165,7 @@
             </a:pPr>
             <a:r>
               <a:rPr lang="en-GB" dirty="0" smtClean="0"/>
-              <a:t>	</a:t>
-            </a:r>
-            <a:r>
-              <a:rPr lang="en-GB" dirty="0" smtClean="0"/>
-              <a:t>…</a:t>
+              <a:t>	…</a:t>
             </a:r>
           </a:p>
           <a:p>
@@ -5179,11 +5174,7 @@
             </a:pPr>
             <a:r>
               <a:rPr lang="en-GB" dirty="0" smtClean="0"/>
-              <a:t>	</a:t>
-            </a:r>
-            <a:r>
-              <a:rPr lang="en-GB" dirty="0" smtClean="0"/>
-              <a:t>"list":[</a:t>
+              <a:t>	"list":[</a:t>
             </a:r>
           </a:p>
           <a:p>
@@ -5192,11 +5183,7 @@
             </a:pPr>
             <a:r>
               <a:rPr lang="en-GB" dirty="0" smtClean="0"/>
-              <a:t>	</a:t>
-            </a:r>
-            <a:r>
-              <a:rPr lang="en-GB" dirty="0" smtClean="0"/>
-              <a:t>	&lt;item description – see following slides&gt;</a:t>
+              <a:t>		&lt;item description – see following slides&gt;</a:t>
             </a:r>
           </a:p>
           <a:p>
@@ -5205,11 +5192,7 @@
             </a:pPr>
             <a:r>
               <a:rPr lang="en-GB" dirty="0" smtClean="0"/>
-              <a:t>	</a:t>
-            </a:r>
-            <a:r>
-              <a:rPr lang="en-GB" dirty="0" smtClean="0"/>
-              <a:t>]</a:t>
+              <a:t>	]</a:t>
             </a:r>
           </a:p>
           <a:p>
@@ -5240,6 +5223,7 @@
           <a:p>
             <a:fld id="{99754A40-3E9E-4671-A285-8FDB85EEA878}" type="datetime1">
               <a:rPr lang="en-GB" smtClean="0"/>
+              <a:pPr/>
               <a:t>02/08/2011</a:t>
             </a:fld>
             <a:endParaRPr lang="en-GB"/>
@@ -5382,15 +5366,7 @@
             </a:pPr>
             <a:r>
               <a:rPr lang="en-GB" dirty="0" smtClean="0"/>
-              <a:t>	"title": "</a:t>
-            </a:r>
-            <a:r>
-              <a:rPr lang="en-GB" dirty="0" smtClean="0"/>
-              <a:t>&lt;folder </a:t>
-            </a:r>
-            <a:r>
-              <a:rPr lang="en-GB" dirty="0" smtClean="0"/>
-              <a:t>name&gt;",</a:t>
+              <a:t>	"title": "&lt;folder name&gt;",</a:t>
             </a:r>
           </a:p>
           <a:p>
@@ -5399,21 +5375,8 @@
             </a:pPr>
             <a:r>
               <a:rPr lang="en-GB" dirty="0" smtClean="0"/>
-              <a:t>	</a:t>
-            </a:r>
-            <a:r>
-              <a:rPr lang="en-GB" dirty="0" smtClean="0"/>
-              <a:t>"</a:t>
-            </a:r>
-            <a:r>
-              <a:rPr lang="en-GB" dirty="0" smtClean="0"/>
-              <a:t>path": "&lt;folder path within cache</a:t>
-            </a:r>
-            <a:r>
-              <a:rPr lang="en-GB" dirty="0" smtClean="0"/>
-              <a:t>&gt;",</a:t>
-            </a:r>
-            <a:endParaRPr lang="en-GB" dirty="0" smtClean="0"/>
+              <a:t>	"path": "&lt;folder path within cache&gt;",</a:t>
+            </a:r>
           </a:p>
           <a:p>
             <a:pPr>
@@ -5421,15 +5384,7 @@
             </a:pPr>
             <a:r>
               <a:rPr lang="en-GB" dirty="0" smtClean="0"/>
-              <a:t>	</a:t>
-            </a:r>
-            <a:r>
-              <a:rPr lang="en-GB" dirty="0" smtClean="0"/>
-              <a:t>"</a:t>
-            </a:r>
-            <a:r>
-              <a:rPr lang="en-GB" dirty="0" smtClean="0"/>
-              <a:t>description": "&lt;description&gt;",</a:t>
+              <a:t>	"description": "&lt;description&gt;",</a:t>
             </a:r>
           </a:p>
           <a:p>
@@ -5438,11 +5393,7 @@
             </a:pPr>
             <a:r>
               <a:rPr lang="en-GB" dirty="0" smtClean="0"/>
-              <a:t>	</a:t>
-            </a:r>
-            <a:r>
-              <a:rPr lang="en-GB" dirty="0" smtClean="0"/>
-              <a:t>"</a:t>
+              <a:t>	"</a:t>
             </a:r>
             <a:r>
               <a:rPr lang="en-GB" dirty="0" err="1" smtClean="0"/>
@@ -5467,21 +5418,8 @@
             </a:pPr>
             <a:r>
               <a:rPr lang="en-GB" dirty="0" smtClean="0"/>
-              <a:t>	</a:t>
-            </a:r>
-            <a:r>
-              <a:rPr lang="en-GB" dirty="0" smtClean="0"/>
-              <a:t>"</a:t>
-            </a:r>
-            <a:r>
-              <a:rPr lang="en-GB" dirty="0" smtClean="0"/>
-              <a:t>size": </a:t>
-            </a:r>
-            <a:r>
-              <a:rPr lang="en-GB" dirty="0" smtClean="0"/>
-              <a:t>0</a:t>
-            </a:r>
-            <a:endParaRPr lang="en-GB" dirty="0" smtClean="0"/>
+              <a:t>	"size": 0</a:t>
+            </a:r>
           </a:p>
           <a:p>
             <a:pPr>
@@ -5489,15 +5427,7 @@
             </a:pPr>
             <a:r>
               <a:rPr lang="en-GB" dirty="0" smtClean="0"/>
-              <a:t>	</a:t>
-            </a:r>
-            <a:r>
-              <a:rPr lang="en-GB" dirty="0" smtClean="0"/>
-              <a:t>"</a:t>
-            </a:r>
-            <a:r>
-              <a:rPr lang="en-GB" dirty="0" smtClean="0"/>
-              <a:t>children": []</a:t>
+              <a:t>	"children": []</a:t>
             </a:r>
           </a:p>
           <a:p>
@@ -5508,7 +5438,6 @@
               <a:rPr lang="en-GB" dirty="0" smtClean="0"/>
               <a:t>}</a:t>
             </a:r>
-            <a:endParaRPr lang="en-GB" dirty="0" smtClean="0"/>
           </a:p>
           <a:p>
             <a:endParaRPr lang="en-GB" dirty="0"/>
@@ -5532,6 +5461,7 @@
           <a:p>
             <a:fld id="{99754A40-3E9E-4671-A285-8FDB85EEA878}" type="datetime1">
               <a:rPr lang="en-GB" smtClean="0"/>
+              <a:pPr/>
               <a:t>02/08/2011</a:t>
             </a:fld>
             <a:endParaRPr lang="en-GB"/>
@@ -5730,15 +5660,7 @@
             </a:pPr>
             <a:r>
               <a:rPr lang="en-GB" dirty="0" smtClean="0"/>
-              <a:t>	"title": "</a:t>
-            </a:r>
-            <a:r>
-              <a:rPr lang="en-GB" dirty="0" smtClean="0"/>
-              <a:t>&lt;link </a:t>
-            </a:r>
-            <a:r>
-              <a:rPr lang="en-GB" dirty="0" smtClean="0"/>
-              <a:t>name&gt;",</a:t>
+              <a:t>	"title": "&lt;link name&gt;",</a:t>
             </a:r>
           </a:p>
           <a:p>
@@ -5747,13 +5669,8 @@
             </a:pPr>
             <a:r>
               <a:rPr lang="en-GB" dirty="0" smtClean="0"/>
-              <a:t>	</a:t>
-            </a:r>
-            <a:r>
-              <a:rPr lang="en-GB" dirty="0" smtClean="0"/>
-              <a:t>"source": "&lt;link URL&gt;",</a:t>
-            </a:r>
-            <a:endParaRPr lang="en-GB" dirty="0" smtClean="0"/>
+              <a:t>	"source": "&lt;link URL&gt;",</a:t>
+            </a:r>
           </a:p>
           <a:p>
             <a:pPr>
@@ -5761,15 +5678,7 @@
             </a:pPr>
             <a:r>
               <a:rPr lang="en-GB" dirty="0" smtClean="0"/>
-              <a:t>	</a:t>
-            </a:r>
-            <a:r>
-              <a:rPr lang="en-GB" dirty="0" smtClean="0"/>
-              <a:t>"</a:t>
-            </a:r>
-            <a:r>
-              <a:rPr lang="en-GB" dirty="0" smtClean="0"/>
-              <a:t>description": "&lt;description&gt;",</a:t>
+              <a:t>	"description": "&lt;description&gt;",</a:t>
             </a:r>
           </a:p>
           <a:p>
@@ -5778,11 +5687,7 @@
             </a:pPr>
             <a:r>
               <a:rPr lang="en-GB" dirty="0" smtClean="0"/>
-              <a:t>	</a:t>
-            </a:r>
-            <a:r>
-              <a:rPr lang="en-GB" dirty="0" smtClean="0"/>
-              <a:t>"</a:t>
+              <a:t>	"</a:t>
             </a:r>
             <a:r>
               <a:rPr lang="en-GB" dirty="0" err="1" smtClean="0"/>
@@ -5790,13 +5695,8 @@
             </a:r>
             <a:r>
               <a:rPr lang="en-GB" dirty="0" smtClean="0"/>
-              <a:t>": </a:t>
-            </a:r>
-            <a:r>
-              <a:rPr lang="en-GB" dirty="0" smtClean="0"/>
-              <a:t>“URL_TYPE/Default",</a:t>
-            </a:r>
-            <a:endParaRPr lang="en-GB" dirty="0" smtClean="0"/>
+              <a:t>": “URL_TYPE/Default",</a:t>
+            </a:r>
           </a:p>
           <a:p>
             <a:pPr>
@@ -5804,21 +5704,8 @@
             </a:pPr>
             <a:r>
               <a:rPr lang="en-GB" dirty="0" smtClean="0"/>
-              <a:t>	</a:t>
-            </a:r>
-            <a:r>
-              <a:rPr lang="en-GB" dirty="0" smtClean="0"/>
-              <a:t>"</a:t>
-            </a:r>
-            <a:r>
-              <a:rPr lang="en-GB" dirty="0" smtClean="0"/>
-              <a:t>size": </a:t>
-            </a:r>
-            <a:r>
-              <a:rPr lang="en-GB" dirty="0" smtClean="0"/>
-              <a:t>0</a:t>
-            </a:r>
-            <a:endParaRPr lang="en-GB" dirty="0" smtClean="0"/>
+              <a:t>	"size": 0</a:t>
+            </a:r>
           </a:p>
           <a:p>
             <a:pPr>
@@ -5828,7 +5715,6 @@
               <a:rPr lang="en-GB" dirty="0" smtClean="0"/>
               <a:t>}</a:t>
             </a:r>
-            <a:endParaRPr lang="en-GB" dirty="0" smtClean="0"/>
           </a:p>
           <a:p>
             <a:endParaRPr lang="en-GB" dirty="0"/>
@@ -5852,6 +5738,7 @@
           <a:p>
             <a:fld id="{99754A40-3E9E-4671-A285-8FDB85EEA878}" type="datetime1">
               <a:rPr lang="en-GB" smtClean="0"/>
+              <a:pPr/>
               <a:t>02/08/2011</a:t>
             </a:fld>
             <a:endParaRPr lang="en-GB"/>
@@ -5947,11 +5834,7 @@
           <a:p>
             <a:r>
               <a:rPr lang="en-GB" dirty="0" smtClean="0"/>
-              <a:t>Module source files </a:t>
-            </a:r>
-            <a:r>
-              <a:rPr lang="en-GB" dirty="0" smtClean="0"/>
-              <a:t>(1)</a:t>
+              <a:t>Module source files (1)</a:t>
             </a:r>
             <a:endParaRPr lang="en-GB" dirty="0"/>
           </a:p>
@@ -6112,6 +5995,7 @@
           <a:p>
             <a:fld id="{9772B558-5545-4639-BB72-F0885B865DA6}" type="datetime1">
               <a:rPr lang="en-GB" smtClean="0"/>
+              <a:pPr/>
               <a:t>02/08/2011</a:t>
             </a:fld>
             <a:endParaRPr lang="en-GB"/>
@@ -6259,15 +6143,7 @@
             </a:pPr>
             <a:r>
               <a:rPr lang="en-GB" dirty="0" smtClean="0"/>
-              <a:t>	"title": "&lt;</a:t>
-            </a:r>
-            <a:r>
-              <a:rPr lang="en-GB" dirty="0" smtClean="0"/>
-              <a:t>file/link </a:t>
-            </a:r>
-            <a:r>
-              <a:rPr lang="en-GB" dirty="0" smtClean="0"/>
-              <a:t>name&gt;",</a:t>
+              <a:t>	"title": "&lt;file/link name&gt;",</a:t>
             </a:r>
           </a:p>
           <a:p>
@@ -6276,21 +6152,8 @@
             </a:pPr>
             <a:r>
               <a:rPr lang="en-GB" dirty="0" smtClean="0"/>
-              <a:t>	</a:t>
-            </a:r>
-            <a:r>
-              <a:rPr lang="en-GB" dirty="0" smtClean="0"/>
-              <a:t>"source": "&lt;file info path </a:t>
-            </a:r>
-            <a:r>
-              <a:rPr lang="en-GB" dirty="0" smtClean="0"/>
-              <a:t>within </a:t>
-            </a:r>
-            <a:r>
-              <a:rPr lang="en-GB" dirty="0" smtClean="0"/>
-              <a:t>folders cache&gt;",</a:t>
-            </a:r>
-            <a:endParaRPr lang="en-GB" dirty="0" smtClean="0"/>
+              <a:t>	"source": "&lt;file info path within folders cache&gt;",</a:t>
+            </a:r>
           </a:p>
           <a:p>
             <a:pPr>
@@ -6298,15 +6161,7 @@
             </a:pPr>
             <a:r>
               <a:rPr lang="en-GB" dirty="0" smtClean="0"/>
-              <a:t>	</a:t>
-            </a:r>
-            <a:r>
-              <a:rPr lang="en-GB" dirty="0" smtClean="0"/>
-              <a:t>"</a:t>
-            </a:r>
-            <a:r>
-              <a:rPr lang="en-GB" dirty="0" smtClean="0"/>
-              <a:t>description": "&lt;description&gt;",</a:t>
+              <a:t>	"description": "&lt;description&gt;",</a:t>
             </a:r>
           </a:p>
           <a:p>
@@ -6315,11 +6170,7 @@
             </a:pPr>
             <a:r>
               <a:rPr lang="en-GB" dirty="0" smtClean="0"/>
-              <a:t>	</a:t>
-            </a:r>
-            <a:r>
-              <a:rPr lang="en-GB" dirty="0" smtClean="0"/>
-              <a:t>"</a:t>
+              <a:t>	"</a:t>
             </a:r>
             <a:r>
               <a:rPr lang="en-GB" dirty="0" err="1" smtClean="0"/>
@@ -6344,21 +6195,8 @@
             </a:pPr>
             <a:r>
               <a:rPr lang="en-GB" dirty="0" smtClean="0"/>
-              <a:t>	</a:t>
-            </a:r>
-            <a:r>
-              <a:rPr lang="en-GB" dirty="0" smtClean="0"/>
-              <a:t>"</a:t>
-            </a:r>
-            <a:r>
-              <a:rPr lang="en-GB" dirty="0" smtClean="0"/>
-              <a:t>size": </a:t>
-            </a:r>
-            <a:r>
-              <a:rPr lang="en-GB" dirty="0" smtClean="0"/>
-              <a:t>0</a:t>
-            </a:r>
-            <a:endParaRPr lang="en-GB" dirty="0" smtClean="0"/>
+              <a:t>	"size": 0</a:t>
+            </a:r>
           </a:p>
           <a:p>
             <a:pPr>
@@ -6368,7 +6206,6 @@
               <a:rPr lang="en-GB" dirty="0" smtClean="0"/>
               <a:t>}</a:t>
             </a:r>
-            <a:endParaRPr lang="en-GB" dirty="0" smtClean="0"/>
           </a:p>
           <a:p>
             <a:endParaRPr lang="en-GB" dirty="0"/>
@@ -6392,6 +6229,7 @@
           <a:p>
             <a:fld id="{99754A40-3E9E-4671-A285-8FDB85EEA878}" type="datetime1">
               <a:rPr lang="en-GB" smtClean="0"/>
+              <a:pPr/>
               <a:t>02/08/2011</a:t>
             </a:fld>
             <a:endParaRPr lang="en-GB"/>
@@ -6535,11 +6373,7 @@
             </a:pPr>
             <a:r>
               <a:rPr lang="en-GB" dirty="0" smtClean="0"/>
-              <a:t>	</a:t>
-            </a:r>
-            <a:r>
-              <a:rPr lang="en-GB" dirty="0" smtClean="0"/>
-              <a:t>	"&lt;role&gt;", …</a:t>
+              <a:t>		"&lt;role&gt;", …</a:t>
             </a:r>
           </a:p>
           <a:p>
@@ -6548,11 +6382,7 @@
             </a:pPr>
             <a:r>
               <a:rPr lang="en-GB" dirty="0" smtClean="0"/>
-              <a:t>	</a:t>
-            </a:r>
-            <a:r>
-              <a:rPr lang="en-GB" dirty="0" smtClean="0"/>
-              <a:t>], </a:t>
+              <a:t>	], </a:t>
             </a:r>
           </a:p>
           <a:p>
@@ -6561,11 +6391,7 @@
             </a:pPr>
             <a:r>
               <a:rPr lang="en-GB" dirty="0" smtClean="0"/>
-              <a:t>	</a:t>
-            </a:r>
-            <a:r>
-              <a:rPr lang="en-GB" dirty="0" smtClean="0"/>
-              <a:t>…</a:t>
+              <a:t>	…</a:t>
             </a:r>
           </a:p>
           <a:p>
@@ -6597,6 +6423,7 @@
           <a:p>
             <a:fld id="{99754A40-3E9E-4671-A285-8FDB85EEA878}" type="datetime1">
               <a:rPr lang="en-GB" smtClean="0"/>
+              <a:pPr/>
               <a:t>02/08/2011</a:t>
             </a:fld>
             <a:endParaRPr lang="en-GB"/>
@@ -6803,7 +6630,7 @@
         <p:spPr/>
         <p:txBody>
           <a:bodyPr>
-            <a:normAutofit lnSpcReduction="10000"/>
+            <a:normAutofit fontScale="70000" lnSpcReduction="20000"/>
           </a:bodyPr>
           <a:lstStyle/>
           <a:p>
@@ -6830,12 +6657,127 @@
             </a:pPr>
             <a:r>
               <a:rPr lang="en-GB" dirty="0" smtClean="0"/>
+              <a:t>	"path": "&lt;file content path in file cache&gt;",</a:t>
+            </a:r>
+          </a:p>
+          <a:p>
+            <a:pPr>
+              <a:buNone/>
+            </a:pPr>
+            <a:r>
+              <a:rPr lang="en-GB" dirty="0" smtClean="0"/>
+              <a:t>	"sha1hash": "&lt;SHA-1 hash&gt;",</a:t>
+            </a:r>
+          </a:p>
+          <a:p>
+            <a:pPr>
+              <a:buNone/>
+            </a:pPr>
+            <a:r>
+              <a:rPr lang="en-GB" dirty="0" smtClean="0"/>
+              <a:t>	 "size": &lt;file size (bytes)&gt;</a:t>
+            </a:r>
+          </a:p>
+          <a:p>
+            <a:pPr>
+              <a:buNone/>
+            </a:pPr>
+            <a:r>
+              <a:rPr lang="en-GB" dirty="0" smtClean="0"/>
+              <a:t>	"</a:t>
+            </a:r>
+            <a:r>
+              <a:rPr lang="en-GB" dirty="0" err="1" smtClean="0"/>
+              <a:t>webcttype</a:t>
+            </a:r>
+            <a:r>
+              <a:rPr lang="en-GB" dirty="0" smtClean="0"/>
+              <a:t>": "&lt;</a:t>
+            </a:r>
+            <a:r>
+              <a:rPr lang="en-GB" dirty="0" err="1" smtClean="0"/>
+              <a:t>webct</a:t>
+            </a:r>
+            <a:r>
+              <a:rPr lang="en-GB" dirty="0" smtClean="0"/>
+              <a:t> type&gt;",</a:t>
+            </a:r>
+          </a:p>
+          <a:p>
+            <a:pPr>
+              <a:buNone/>
+            </a:pPr>
+            <a:r>
+              <a:rPr lang="en-GB" dirty="0" smtClean="0"/>
+              <a:t>	"</a:t>
+            </a:r>
+            <a:r>
+              <a:rPr lang="en-GB" dirty="0" err="1" smtClean="0"/>
+              <a:t>webctpath</a:t>
+            </a:r>
+            <a:r>
+              <a:rPr lang="en-GB" dirty="0" smtClean="0"/>
+              <a:t>": "&lt;</a:t>
+            </a:r>
+            <a:r>
+              <a:rPr lang="en-GB" dirty="0" err="1" smtClean="0"/>
+              <a:t>webct</a:t>
+            </a:r>
+            <a:r>
+              <a:rPr lang="en-GB" dirty="0" smtClean="0"/>
+              <a:t> internal file path</a:t>
+            </a:r>
+            <a:r>
+              <a:rPr lang="en-GB" dirty="0" smtClean="0"/>
+              <a:t>&gt;",</a:t>
+            </a:r>
+            <a:endParaRPr lang="en-GB" dirty="0" smtClean="0"/>
+          </a:p>
+          <a:p>
+            <a:pPr>
+              <a:buNone/>
+            </a:pPr>
+            <a:r>
+              <a:rPr lang="en-GB" dirty="0" smtClean="0"/>
               <a:t>	</a:t>
             </a:r>
             <a:r>
-              <a:rPr lang="en-GB" dirty="0" smtClean="0"/>
-              <a:t>"path": "&lt;file content path in file cache&gt;",</a:t>
-            </a:r>
+              <a:rPr lang="en-GB" dirty="0" smtClean="0">
+                <a:solidFill>
+                  <a:srgbClr val="FF0000"/>
+                </a:solidFill>
+              </a:rPr>
+              <a:t>"</a:t>
+            </a:r>
+            <a:r>
+              <a:rPr lang="en-GB" dirty="0" err="1" smtClean="0">
+                <a:solidFill>
+                  <a:srgbClr val="FF0000"/>
+                </a:solidFill>
+              </a:rPr>
+              <a:t>mimetype</a:t>
+            </a:r>
+            <a:r>
+              <a:rPr lang="en-GB" dirty="0" smtClean="0">
+                <a:solidFill>
+                  <a:srgbClr val="FF0000"/>
+                </a:solidFill>
+              </a:rPr>
+              <a:t>": "&lt;mime type </a:t>
+            </a:r>
+            <a:r>
+              <a:rPr lang="en-GB" smtClean="0">
+                <a:solidFill>
+                  <a:srgbClr val="FF0000"/>
+                </a:solidFill>
+              </a:rPr>
+              <a:t>if known&gt;",</a:t>
+            </a:r>
+            <a:endParaRPr lang="en-GB" dirty="0" smtClean="0">
+              <a:solidFill>
+                <a:srgbClr val="FF0000"/>
+              </a:solidFill>
+            </a:endParaRPr>
           </a:p>
           <a:p>
             <a:pPr>
@@ -6846,9 +6788,18 @@
               <a:t>	</a:t>
             </a:r>
             <a:r>
-              <a:rPr lang="en-GB" dirty="0" smtClean="0"/>
-              <a:t>"sha1hash": "&lt;SHA-1 hash&gt;",</a:t>
-            </a:r>
+              <a:rPr lang="en-GB" dirty="0" smtClean="0">
+                <a:solidFill>
+                  <a:srgbClr val="FF0000"/>
+                </a:solidFill>
+              </a:rPr>
+              <a:t>"encoding": "&lt;character set if known&gt;",</a:t>
+            </a:r>
+            <a:endParaRPr lang="en-GB" dirty="0" smtClean="0">
+              <a:solidFill>
+                <a:srgbClr val="FF0000"/>
+              </a:solidFill>
+            </a:endParaRPr>
           </a:p>
           <a:p>
             <a:pPr>
@@ -6856,69 +6807,171 @@
             </a:pPr>
             <a:r>
               <a:rPr lang="en-GB" dirty="0" smtClean="0"/>
-              <a:t>	 </a:t>
-            </a:r>
-            <a:r>
-              <a:rPr lang="en-GB" dirty="0" smtClean="0"/>
-              <a:t>"size": &lt;file size (bytes)&gt;</a:t>
-            </a:r>
+              <a:t>	</a:t>
+            </a:r>
+            <a:r>
+              <a:rPr lang="en-GB" dirty="0" smtClean="0">
+                <a:solidFill>
+                  <a:srgbClr val="FF0000"/>
+                </a:solidFill>
+              </a:rPr>
+              <a:t>"</a:t>
+            </a:r>
+            <a:r>
+              <a:rPr lang="en-GB" dirty="0" err="1" smtClean="0">
+                <a:solidFill>
+                  <a:srgbClr val="FF0000"/>
+                </a:solidFill>
+              </a:rPr>
+              <a:t>lastmodifiedts</a:t>
+            </a:r>
+            <a:r>
+              <a:rPr lang="en-GB" dirty="0" smtClean="0">
+                <a:solidFill>
+                  <a:srgbClr val="FF0000"/>
+                </a:solidFill>
+              </a:rPr>
+              <a:t>": &lt;timestamp - </a:t>
+            </a:r>
+            <a:r>
+              <a:rPr lang="en-GB" dirty="0" err="1" smtClean="0">
+                <a:solidFill>
+                  <a:srgbClr val="FF0000"/>
+                </a:solidFill>
+              </a:rPr>
+              <a:t>webct</a:t>
+            </a:r>
+            <a:r>
+              <a:rPr lang="en-GB" dirty="0" smtClean="0">
+                <a:solidFill>
+                  <a:srgbClr val="FF0000"/>
+                </a:solidFill>
+              </a:rPr>
+              <a:t> </a:t>
+            </a:r>
+            <a:r>
+              <a:rPr lang="en-GB" dirty="0" err="1" smtClean="0">
+                <a:solidFill>
+                  <a:srgbClr val="FF0000"/>
+                </a:solidFill>
+              </a:rPr>
+              <a:t>lastmodified</a:t>
+            </a:r>
+            <a:r>
+              <a:rPr lang="en-GB" dirty="0" smtClean="0">
+                <a:solidFill>
+                  <a:srgbClr val="FF0000"/>
+                </a:solidFill>
+              </a:rPr>
+              <a:t>, ms&gt;,</a:t>
+            </a:r>
+            <a:endParaRPr lang="en-GB" dirty="0" smtClean="0">
+              <a:solidFill>
+                <a:srgbClr val="FF0000"/>
+              </a:solidFill>
+            </a:endParaRPr>
           </a:p>
           <a:p>
             <a:pPr>
               <a:buNone/>
             </a:pPr>
             <a:r>
-              <a:rPr lang="en-GB" dirty="0" smtClean="0"/>
-              <a:t>	"</a:t>
-            </a:r>
-            <a:r>
-              <a:rPr lang="en-GB" dirty="0" err="1" smtClean="0"/>
-              <a:t>webcttype</a:t>
-            </a:r>
-            <a:r>
-              <a:rPr lang="en-GB" dirty="0" smtClean="0"/>
-              <a:t>": "&lt;</a:t>
-            </a:r>
-            <a:r>
-              <a:rPr lang="en-GB" dirty="0" err="1" smtClean="0"/>
-              <a:t>webct</a:t>
-            </a:r>
-            <a:r>
-              <a:rPr lang="en-GB" dirty="0" smtClean="0"/>
-              <a:t> type</a:t>
-            </a:r>
-            <a:r>
-              <a:rPr lang="en-GB" dirty="0" smtClean="0"/>
-              <a:t>&gt;",</a:t>
-            </a:r>
+              <a:rPr lang="en-GB" dirty="0" smtClean="0">
+                <a:solidFill>
+                  <a:srgbClr val="FF0000"/>
+                </a:solidFill>
+              </a:rPr>
+              <a:t>	</a:t>
+            </a:r>
+            <a:r>
+              <a:rPr lang="en-GB" dirty="0" smtClean="0">
+                <a:solidFill>
+                  <a:srgbClr val="FF0000"/>
+                </a:solidFill>
+              </a:rPr>
+              <a:t>"</a:t>
+            </a:r>
+            <a:r>
+              <a:rPr lang="en-GB" dirty="0" err="1" smtClean="0">
+                <a:solidFill>
+                  <a:srgbClr val="FF0000"/>
+                </a:solidFill>
+              </a:rPr>
+              <a:t>linkto</a:t>
+            </a:r>
+            <a:r>
+              <a:rPr lang="en-GB" dirty="0" smtClean="0">
+                <a:solidFill>
+                  <a:srgbClr val="FF0000"/>
+                </a:solidFill>
+              </a:rPr>
+              <a:t>": "&lt;cache path of file </a:t>
+            </a:r>
+            <a:r>
+              <a:rPr lang="en-GB" b="1" dirty="0" smtClean="0">
+                <a:solidFill>
+                  <a:srgbClr val="FF0000"/>
+                </a:solidFill>
+              </a:rPr>
+              <a:t>if</a:t>
+            </a:r>
+            <a:r>
+              <a:rPr lang="en-GB" dirty="0" smtClean="0">
+                <a:solidFill>
+                  <a:srgbClr val="FF0000"/>
+                </a:solidFill>
+              </a:rPr>
+              <a:t> this is a link&gt;",</a:t>
+            </a:r>
+            <a:endParaRPr lang="en-GB" dirty="0" smtClean="0">
+              <a:solidFill>
+                <a:srgbClr val="FF0000"/>
+              </a:solidFill>
+            </a:endParaRPr>
           </a:p>
           <a:p>
             <a:pPr>
               <a:buNone/>
             </a:pPr>
             <a:r>
-              <a:rPr lang="en-GB" dirty="0" smtClean="0"/>
+              <a:rPr lang="en-GB" dirty="0" smtClean="0">
+                <a:solidFill>
+                  <a:srgbClr val="FF0000"/>
+                </a:solidFill>
+              </a:rPr>
               <a:t>	</a:t>
             </a:r>
             <a:r>
-              <a:rPr lang="en-GB" dirty="0" smtClean="0"/>
-              <a:t>"</a:t>
-            </a:r>
-            <a:r>
-              <a:rPr lang="en-GB" dirty="0" err="1" smtClean="0"/>
-              <a:t>webctpath</a:t>
-            </a:r>
-            <a:r>
-              <a:rPr lang="en-GB" dirty="0" smtClean="0"/>
-              <a:t>": "&lt;</a:t>
-            </a:r>
-            <a:r>
-              <a:rPr lang="en-GB" dirty="0" err="1" smtClean="0"/>
-              <a:t>webct</a:t>
-            </a:r>
-            <a:r>
-              <a:rPr lang="en-GB" dirty="0" smtClean="0"/>
-              <a:t> internal file path&gt;"</a:t>
+              <a:rPr lang="en-GB" dirty="0" smtClean="0">
+                <a:solidFill>
+                  <a:srgbClr val="FF0000"/>
+                </a:solidFill>
+              </a:rPr>
+              <a:t>"cachets</a:t>
+            </a:r>
+            <a:r>
+              <a:rPr lang="en-GB" dirty="0" smtClean="0">
+                <a:solidFill>
+                  <a:srgbClr val="FF0000"/>
+                </a:solidFill>
+              </a:rPr>
+              <a:t>": </a:t>
+            </a:r>
+            <a:r>
+              <a:rPr lang="en-GB" dirty="0" smtClean="0">
+                <a:solidFill>
+                  <a:srgbClr val="FF0000"/>
+                </a:solidFill>
+              </a:rPr>
+              <a:t>&lt;timestamp – cached, </a:t>
+            </a:r>
+            <a:r>
+              <a:rPr lang="en-GB" dirty="0" smtClean="0">
+                <a:solidFill>
+                  <a:srgbClr val="FF0000"/>
+                </a:solidFill>
+              </a:rPr>
+              <a:t>ms&gt;,</a:t>
             </a:r>
           </a:p>
           <a:p>
@@ -6950,6 +7003,7 @@
           <a:p>
             <a:fld id="{99754A40-3E9E-4671-A285-8FDB85EEA878}" type="datetime1">
               <a:rPr lang="en-GB" smtClean="0"/>
+              <a:pPr/>
               <a:t>02/08/2011</a:t>
             </a:fld>
             <a:endParaRPr lang="en-GB"/>
@@ -6999,6 +7053,95 @@
               <a:pPr/>
               <a:t>22</a:t>
             </a:fld>
+            <a:endParaRPr lang="en-GB"/>
+          </a:p>
+        </p:txBody>
+      </p:sp>
+      <p:sp>
+        <p:nvSpPr>
+          <p:cNvPr id="7" name="Rounded Rectangular Callout 6"/>
+          <p:cNvSpPr/>
+          <p:nvPr/>
+        </p:nvSpPr>
+        <p:spPr>
+          <a:xfrm>
+            <a:off x="6876256" y="5589240"/>
+            <a:ext cx="2088232" cy="792088"/>
+          </a:xfrm>
+          <a:prstGeom prst="wedgeRoundRectCallout">
+            <a:avLst>
+              <a:gd name="adj1" fmla="val 12465"/>
+              <a:gd name="adj2" fmla="val -74587"/>
+              <a:gd name="adj3" fmla="val 16667"/>
+            </a:avLst>
+          </a:prstGeom>
+        </p:spPr>
+        <p:style>
+          <a:lnRef idx="2">
+            <a:schemeClr val="accent1">
+              <a:shade val="50000"/>
+            </a:schemeClr>
+          </a:lnRef>
+          <a:fillRef idx="1">
+            <a:schemeClr val="accent1"/>
+          </a:fillRef>
+          <a:effectRef idx="0">
+            <a:schemeClr val="accent1"/>
+          </a:effectRef>
+          <a:fontRef idx="minor">
+            <a:schemeClr val="lt1"/>
+          </a:fontRef>
+        </p:style>
+        <p:txBody>
+          <a:bodyPr rtlCol="0" anchor="ctr"/>
+          <a:lstStyle/>
+          <a:p>
+            <a:pPr algn="ctr"/>
+            <a:r>
+              <a:rPr lang="en-GB" dirty="0" smtClean="0"/>
+              <a:t>Added 2011-08-02</a:t>
+            </a:r>
+            <a:endParaRPr lang="en-GB" dirty="0"/>
+          </a:p>
+        </p:txBody>
+      </p:sp>
+      <p:sp>
+        <p:nvSpPr>
+          <p:cNvPr id="8" name="Right Brace 7"/>
+          <p:cNvSpPr/>
+          <p:nvPr/>
+        </p:nvSpPr>
+        <p:spPr>
+          <a:xfrm>
+            <a:off x="8172400" y="4077072"/>
+            <a:ext cx="288032" cy="1296144"/>
+          </a:xfrm>
+          <a:prstGeom prst="rightBrace">
+            <a:avLst>
+              <a:gd name="adj1" fmla="val 8333"/>
+              <a:gd name="adj2" fmla="val 50000"/>
+            </a:avLst>
+          </a:prstGeom>
+        </p:spPr>
+        <p:style>
+          <a:lnRef idx="1">
+            <a:schemeClr val="accent1"/>
+          </a:lnRef>
+          <a:fillRef idx="0">
+            <a:schemeClr val="accent1"/>
+          </a:fillRef>
+          <a:effectRef idx="0">
+            <a:schemeClr val="accent1"/>
+          </a:effectRef>
+          <a:fontRef idx="minor">
+            <a:schemeClr val="tx1"/>
+          </a:fontRef>
+        </p:style>
+        <p:txBody>
+          <a:bodyPr rtlCol="0" anchor="ctr"/>
+          <a:lstStyle/>
+          <a:p>
+            <a:pPr algn="ctr"/>
             <a:endParaRPr lang="en-GB"/>
           </a:p>
         </p:txBody>
@@ -7155,6 +7298,7 @@
           <a:p>
             <a:fld id="{99754A40-3E9E-4671-A285-8FDB85EEA878}" type="datetime1">
               <a:rPr lang="en-GB" smtClean="0"/>
+              <a:pPr/>
               <a:t>02/08/2011</a:t>
             </a:fld>
             <a:endParaRPr lang="en-GB"/>
@@ -7349,6 +7493,7 @@
           <a:p>
             <a:fld id="{99754A40-3E9E-4671-A285-8FDB85EEA878}" type="datetime1">
               <a:rPr lang="en-GB" smtClean="0"/>
+              <a:pPr/>
               <a:t>02/08/2011</a:t>
             </a:fld>
             <a:endParaRPr lang="en-GB"/>
@@ -7550,27 +7695,11 @@
             </a:r>
             <a:r>
               <a:rPr lang="en-GB" dirty="0" smtClean="0"/>
-              <a:t> (opt), status, source</a:t>
-            </a:r>
-            <a:r>
-              <a:rPr lang="en-GB" dirty="0" smtClean="0"/>
-              <a:t> (opt)</a:t>
-            </a:r>
-            <a:r>
-              <a:rPr lang="en-GB" dirty="0" smtClean="0"/>
-              <a:t>, author</a:t>
-            </a:r>
-            <a:r>
-              <a:rPr lang="en-GB" dirty="0" smtClean="0"/>
-              <a:t> (opt)</a:t>
-            </a:r>
-            <a:r>
-              <a:rPr lang="en-GB" dirty="0" smtClean="0"/>
-              <a:t>, license</a:t>
-            </a:r>
-            <a:r>
-              <a:rPr lang="en-GB" dirty="0" smtClean="0"/>
-              <a:t> (opt)</a:t>
+              <a:t> (opt), status, source (opt), author (opt), license (opt), </a:t>
+            </a:r>
+            <a:r>
+              <a:rPr lang="en-GB" dirty="0" err="1" smtClean="0"/>
+              <a:t>timecreated</a:t>
             </a:r>
             <a:r>
               <a:rPr lang="en-GB" dirty="0" smtClean="0"/>
@@ -7578,14 +7707,6 @@
             </a:r>
             <a:r>
               <a:rPr lang="en-GB" dirty="0" err="1" smtClean="0"/>
-              <a:t>timecreated</a:t>
-            </a:r>
-            <a:r>
-              <a:rPr lang="en-GB" dirty="0" smtClean="0"/>
-              <a:t>, </a:t>
-            </a:r>
-            <a:r>
-              <a:rPr lang="en-GB" dirty="0" err="1" smtClean="0"/>
               <a:t>timemodified</a:t>
             </a:r>
             <a:endParaRPr lang="en-GB" dirty="0" smtClean="0"/>
@@ -7617,6 +7738,7 @@
           <a:p>
             <a:fld id="{99754A40-3E9E-4671-A285-8FDB85EEA878}" type="datetime1">
               <a:rPr lang="en-GB" smtClean="0"/>
+              <a:pPr/>
               <a:t>02/08/2011</a:t>
             </a:fld>
             <a:endParaRPr lang="en-GB"/>
@@ -7712,11 +7834,7 @@
           <a:p>
             <a:r>
               <a:rPr lang="en-GB" dirty="0" smtClean="0"/>
-              <a:t>Module source files </a:t>
-            </a:r>
-            <a:r>
-              <a:rPr lang="en-GB" dirty="0" smtClean="0"/>
-              <a:t>(2) (top-level)</a:t>
+              <a:t>Module source files (2) (top-level)</a:t>
             </a:r>
             <a:endParaRPr lang="en-GB" dirty="0"/>
           </a:p>
@@ -7743,7 +7861,6 @@
               <a:rPr lang="en-GB" dirty="0" smtClean="0"/>
               <a:t>Standard, internal files</a:t>
             </a:r>
-            <a:endParaRPr lang="en-GB" dirty="0" smtClean="0"/>
           </a:p>
           <a:p>
             <a:pPr lvl="1"/>
@@ -7753,17 +7870,8 @@
             </a:r>
             <a:r>
               <a:rPr lang="en-GB" dirty="0" smtClean="0"/>
-              <a:t> </a:t>
-            </a:r>
-            <a:r>
-              <a:rPr lang="en-GB" dirty="0" smtClean="0"/>
-              <a:t>– defines module </a:t>
-            </a:r>
-            <a:r>
-              <a:rPr lang="en-GB" dirty="0" smtClean="0"/>
-              <a:t>class with standard entry points</a:t>
-            </a:r>
-            <a:endParaRPr lang="en-GB" dirty="0" smtClean="0"/>
+              <a:t> – defines module class with standard entry points</a:t>
+            </a:r>
           </a:p>
           <a:p>
             <a:pPr lvl="1"/>
@@ -7791,17 +7899,8 @@
             <a:pPr lvl="1"/>
             <a:r>
               <a:rPr lang="en-GB" dirty="0" smtClean="0"/>
-              <a:t>settings.php – defines </a:t>
-            </a:r>
-            <a:r>
-              <a:rPr lang="en-GB" dirty="0" smtClean="0"/>
-              <a:t>module-wide settings, e.g. cache </a:t>
-            </a:r>
-            <a:r>
-              <a:rPr lang="en-GB" dirty="0" smtClean="0"/>
-              <a:t>dir</a:t>
-            </a:r>
-            <a:endParaRPr lang="en-GB" dirty="0" smtClean="0"/>
+              <a:t>settings.php – defines module-wide settings, e.g. cache dir</a:t>
+            </a:r>
           </a:p>
           <a:p>
             <a:pPr lvl="1"/>
@@ -7814,11 +7913,7 @@
             <a:pPr lvl="1"/>
             <a:r>
               <a:rPr lang="en-GB" dirty="0" smtClean="0"/>
-              <a:t>version.php – module </a:t>
-            </a:r>
-            <a:r>
-              <a:rPr lang="en-GB" dirty="0" smtClean="0"/>
-              <a:t>version</a:t>
+              <a:t>version.php – module version</a:t>
             </a:r>
           </a:p>
           <a:p>
@@ -7826,7 +7921,6 @@
               <a:rPr lang="en-GB" dirty="0" smtClean="0"/>
               <a:t>Standard, visible pages</a:t>
             </a:r>
-            <a:endParaRPr lang="en-GB" dirty="0" smtClean="0"/>
           </a:p>
           <a:p>
             <a:pPr lvl="1"/>
@@ -7847,11 +7941,7 @@
             </a:r>
             <a:r>
               <a:rPr lang="en-GB" dirty="0" smtClean="0"/>
-              <a:t> </a:t>
-            </a:r>
-            <a:r>
-              <a:rPr lang="en-GB" dirty="0" smtClean="0"/>
-              <a:t>– show one instance</a:t>
+              <a:t> – show one instance</a:t>
             </a:r>
           </a:p>
         </p:txBody>
@@ -7875,11 +7965,49 @@
           <a:p>
             <a:r>
               <a:rPr lang="en-GB" dirty="0" smtClean="0"/>
-              <a:t>Tree </a:t>
-            </a:r>
-            <a:r>
-              <a:rPr lang="en-GB" dirty="0" smtClean="0"/>
-              <a:t>view, all visible</a:t>
+              <a:t>Tree view, all visible</a:t>
+            </a:r>
+          </a:p>
+          <a:p>
+            <a:pPr lvl="1"/>
+            <a:r>
+              <a:rPr lang="en-GB" dirty="0" err="1" smtClean="0"/>
+              <a:t>treeview.php</a:t>
+            </a:r>
+            <a:r>
+              <a:rPr lang="en-GB" dirty="0" smtClean="0"/>
+              <a:t> – skeleton of tree view page/form, included in frame in add form (see </a:t>
+            </a:r>
+            <a:r>
+              <a:rPr lang="en-GB" dirty="0" err="1" smtClean="0"/>
+              <a:t>mod_form.php</a:t>
+            </a:r>
+            <a:r>
+              <a:rPr lang="en-GB" dirty="0" smtClean="0"/>
+              <a:t>)</a:t>
+            </a:r>
+          </a:p>
+          <a:p>
+            <a:pPr lvl="1"/>
+            <a:r>
+              <a:rPr lang="en-GB" dirty="0" err="1" smtClean="0"/>
+              <a:t>module.js</a:t>
+            </a:r>
+            <a:r>
+              <a:rPr lang="en-GB" dirty="0" smtClean="0"/>
+              <a:t> – </a:t>
+            </a:r>
+            <a:r>
+              <a:rPr lang="en-GB" dirty="0" err="1" smtClean="0"/>
+              <a:t>Javascript</a:t>
+            </a:r>
+            <a:r>
+              <a:rPr lang="en-GB" dirty="0" smtClean="0"/>
+              <a:t> for this module, loaded by </a:t>
+            </a:r>
+            <a:r>
+              <a:rPr lang="en-GB" dirty="0" err="1" smtClean="0"/>
+              <a:t>treeview.php</a:t>
             </a:r>
             <a:endParaRPr lang="en-GB" dirty="0" smtClean="0"/>
           </a:p>
@@ -7887,143 +8015,70 @@
             <a:pPr lvl="1"/>
             <a:r>
               <a:rPr lang="en-GB" dirty="0" err="1" smtClean="0"/>
-              <a:t>treeview.php</a:t>
-            </a:r>
-            <a:r>
-              <a:rPr lang="en-GB" dirty="0" smtClean="0"/>
-              <a:t> – skeleton of tree view </a:t>
-            </a:r>
-            <a:r>
-              <a:rPr lang="en-GB" dirty="0" smtClean="0"/>
-              <a:t>page/form, included in frame in add form (see </a:t>
-            </a:r>
-            <a:r>
-              <a:rPr lang="en-GB" dirty="0" err="1" smtClean="0"/>
-              <a:t>mod_form.php</a:t>
+              <a:t>treeviewsubmit.php</a:t>
+            </a:r>
+            <a:r>
+              <a:rPr lang="en-GB" dirty="0" smtClean="0"/>
+              <a:t> – handle submit of tree view form (i.e. add)</a:t>
+            </a:r>
+          </a:p>
+          <a:p>
+            <a:r>
+              <a:rPr lang="en-GB" dirty="0" smtClean="0"/>
+              <a:t>Tree view, AJAX entry point(</a:t>
+            </a:r>
+            <a:r>
+              <a:rPr lang="en-GB" dirty="0" err="1" smtClean="0"/>
+              <a:t>s</a:t>
             </a:r>
             <a:r>
               <a:rPr lang="en-GB" dirty="0" smtClean="0"/>
               <a:t>)</a:t>
             </a:r>
+          </a:p>
+          <a:p>
+            <a:pPr lvl="1"/>
+            <a:r>
+              <a:rPr lang="en-GB" dirty="0" err="1" smtClean="0"/>
+              <a:t>get_listing.php</a:t>
+            </a:r>
+            <a:r>
+              <a:rPr lang="en-GB" dirty="0" smtClean="0"/>
+              <a:t> –  called by tree view JS to return folder info from cache and build tree</a:t>
+            </a:r>
+          </a:p>
+          <a:p>
+            <a:r>
+              <a:rPr lang="en-GB" dirty="0" smtClean="0"/>
+              <a:t>Tree view, preview file</a:t>
+            </a:r>
+          </a:p>
+          <a:p>
+            <a:pPr lvl="1"/>
+            <a:r>
+              <a:rPr lang="en-GB" dirty="0" err="1" smtClean="0"/>
+              <a:t>read_file.php</a:t>
+            </a:r>
+            <a:r>
+              <a:rPr lang="en-GB" dirty="0" smtClean="0"/>
+              <a:t> – reads file info in cache and redirects to </a:t>
+            </a:r>
+            <a:r>
+              <a:rPr lang="en-GB" dirty="0" err="1" smtClean="0"/>
+              <a:t>read_rawfile.php</a:t>
+            </a:r>
             <a:endParaRPr lang="en-GB" dirty="0" smtClean="0"/>
           </a:p>
           <a:p>
             <a:pPr lvl="1"/>
             <a:r>
               <a:rPr lang="en-GB" dirty="0" err="1" smtClean="0"/>
-              <a:t>module.js</a:t>
-            </a:r>
-            <a:r>
-              <a:rPr lang="en-GB" dirty="0" smtClean="0"/>
-              <a:t> – </a:t>
-            </a:r>
-            <a:r>
-              <a:rPr lang="en-GB" dirty="0" err="1" smtClean="0"/>
-              <a:t>Javascript</a:t>
-            </a:r>
-            <a:r>
-              <a:rPr lang="en-GB" dirty="0" smtClean="0"/>
-              <a:t> for this </a:t>
-            </a:r>
-            <a:r>
-              <a:rPr lang="en-GB" dirty="0" smtClean="0"/>
-              <a:t>module, loaded by </a:t>
-            </a:r>
-            <a:r>
-              <a:rPr lang="en-GB" dirty="0" err="1" smtClean="0"/>
-              <a:t>treeview.php</a:t>
-            </a:r>
-            <a:endParaRPr lang="en-GB" dirty="0" smtClean="0"/>
-          </a:p>
-          <a:p>
-            <a:pPr lvl="1"/>
-            <a:r>
-              <a:rPr lang="en-GB" dirty="0" err="1" smtClean="0"/>
-              <a:t>treeviewsubmit.php</a:t>
-            </a:r>
-            <a:r>
-              <a:rPr lang="en-GB" dirty="0" smtClean="0"/>
-              <a:t> </a:t>
-            </a:r>
-            <a:r>
-              <a:rPr lang="en-GB" dirty="0" smtClean="0"/>
-              <a:t>– handle submit of tree view </a:t>
-            </a:r>
-            <a:r>
-              <a:rPr lang="en-GB" dirty="0" smtClean="0"/>
-              <a:t>form (i.e</a:t>
-            </a:r>
-            <a:r>
-              <a:rPr lang="en-GB" dirty="0" smtClean="0"/>
-              <a:t>. add)</a:t>
-            </a:r>
-          </a:p>
-          <a:p>
-            <a:r>
-              <a:rPr lang="en-GB" dirty="0" smtClean="0"/>
-              <a:t>Tree view, AJAX entry point(</a:t>
-            </a:r>
-            <a:r>
-              <a:rPr lang="en-GB" dirty="0" err="1" smtClean="0"/>
-              <a:t>s</a:t>
-            </a:r>
-            <a:r>
-              <a:rPr lang="en-GB" dirty="0" smtClean="0"/>
-              <a:t>)</a:t>
-            </a:r>
-          </a:p>
-          <a:p>
-            <a:pPr lvl="1"/>
-            <a:r>
-              <a:rPr lang="en-GB" dirty="0" err="1" smtClean="0"/>
-              <a:t>get_listing.php</a:t>
-            </a:r>
-            <a:r>
-              <a:rPr lang="en-GB" dirty="0" smtClean="0"/>
-              <a:t> –  called by tree view JS to return folder info from cache and build tree</a:t>
-            </a:r>
-          </a:p>
-          <a:p>
-            <a:r>
-              <a:rPr lang="en-GB" dirty="0" smtClean="0"/>
-              <a:t>Tree view, preview file</a:t>
-            </a:r>
-          </a:p>
-          <a:p>
-            <a:pPr lvl="1"/>
-            <a:r>
-              <a:rPr lang="en-GB" dirty="0" err="1" smtClean="0"/>
-              <a:t>read_file.php</a:t>
-            </a:r>
-            <a:r>
-              <a:rPr lang="en-GB" dirty="0" smtClean="0"/>
-              <a:t> </a:t>
-            </a:r>
-            <a:r>
-              <a:rPr lang="en-GB" dirty="0" smtClean="0"/>
-              <a:t>– reads </a:t>
-            </a:r>
-            <a:r>
-              <a:rPr lang="en-GB" dirty="0" smtClean="0"/>
-              <a:t>file info in cache and redirects to </a:t>
-            </a:r>
-            <a:r>
-              <a:rPr lang="en-GB" dirty="0" err="1" smtClean="0"/>
               <a:t>read_rawfile.php</a:t>
             </a:r>
-            <a:endParaRPr lang="en-GB" dirty="0" smtClean="0"/>
-          </a:p>
-          <a:p>
-            <a:pPr lvl="1"/>
-            <a:r>
-              <a:rPr lang="en-GB" dirty="0" err="1" smtClean="0"/>
-              <a:t>read_rawfile.php</a:t>
-            </a:r>
             <a:r>
               <a:rPr lang="en-GB" dirty="0" smtClean="0"/>
               <a:t> – reads (previews) file in cache</a:t>
             </a:r>
-            <a:endParaRPr lang="en-GB" dirty="0" smtClean="0"/>
           </a:p>
           <a:p>
             <a:pPr lvl="1"/>
@@ -8055,6 +8110,7 @@
           <a:p>
             <a:fld id="{48739D44-3675-4B82-B958-123741CA0F3F}" type="datetime1">
               <a:rPr lang="en-GB" smtClean="0"/>
+              <a:pPr/>
               <a:t>02/08/2011</a:t>
             </a:fld>
             <a:endParaRPr lang="en-GB"/>
@@ -8171,11 +8227,7 @@
             </a:r>
             <a:r>
               <a:rPr lang="en-GB" dirty="0" smtClean="0"/>
-              <a:t> </a:t>
-            </a:r>
-            <a:r>
-              <a:rPr lang="en-GB" dirty="0" smtClean="0"/>
-              <a:t>table</a:t>
+              <a:t> table</a:t>
             </a:r>
             <a:endParaRPr lang="en-GB" dirty="0"/>
           </a:p>
@@ -8200,11 +8252,7 @@
           <a:p>
             <a:r>
               <a:rPr lang="en-GB" dirty="0" smtClean="0"/>
-              <a:t>Row </a:t>
-            </a:r>
-            <a:r>
-              <a:rPr lang="en-GB" dirty="0" smtClean="0"/>
-              <a:t>per </a:t>
+              <a:t>Row per </a:t>
             </a:r>
             <a:r>
               <a:rPr lang="en-GB" dirty="0" err="1" smtClean="0"/>
@@ -8214,7 +8262,6 @@
               <a:rPr lang="en-GB" dirty="0" smtClean="0"/>
               <a:t> place-holder activity instance</a:t>
             </a:r>
-            <a:endParaRPr lang="en-GB" dirty="0" smtClean="0"/>
           </a:p>
           <a:p>
             <a:r>
@@ -8314,11 +8361,7 @@
             <a:pPr lvl="1"/>
             <a:r>
               <a:rPr lang="en-GB" dirty="0" smtClean="0"/>
-              <a:t>display </a:t>
-            </a:r>
-            <a:r>
-              <a:rPr lang="en-GB" dirty="0" smtClean="0"/>
-              <a:t>– </a:t>
+              <a:t>display – </a:t>
             </a:r>
             <a:r>
               <a:rPr lang="en-GB" dirty="0" err="1" smtClean="0"/>
@@ -8396,15 +8439,7 @@
             <a:pPr lvl="1"/>
             <a:r>
               <a:rPr lang="en-GB" dirty="0" smtClean="0"/>
-              <a:t>error - </a:t>
-            </a:r>
-            <a:r>
-              <a:rPr lang="en-GB" dirty="0" smtClean="0"/>
-              <a:t>error to report to </a:t>
-            </a:r>
-            <a:r>
-              <a:rPr lang="en-GB" dirty="0" smtClean="0"/>
-              <a:t>user (?)</a:t>
+              <a:t>error - error to report to user (?)</a:t>
             </a:r>
           </a:p>
           <a:p>
@@ -8431,11 +8466,7 @@
             </a:r>
             <a:r>
               <a:rPr lang="en-GB" dirty="0" smtClean="0"/>
-              <a:t> </a:t>
-            </a:r>
-            <a:r>
-              <a:rPr lang="en-GB" dirty="0" smtClean="0"/>
-              <a:t>(?)</a:t>
+              <a:t> (?)</a:t>
             </a:r>
           </a:p>
           <a:p>
@@ -8484,6 +8515,7 @@
           <a:p>
             <a:fld id="{419BC472-90E9-4CF6-A7E5-7CBCDB001AFB}" type="datetime1">
               <a:rPr lang="en-GB" smtClean="0"/>
+              <a:pPr/>
               <a:t>02/08/2011</a:t>
             </a:fld>
             <a:endParaRPr lang="en-GB"/>
@@ -8627,20 +8659,11 @@
               <a:rPr lang="en-GB" b="1" dirty="0" smtClean="0"/>
               <a:t>Not yet implemented </a:t>
             </a:r>
-            <a:endParaRPr lang="en-GB" b="1" dirty="0" smtClean="0"/>
-          </a:p>
-          <a:p>
-            <a:r>
-              <a:rPr lang="en-GB" dirty="0" smtClean="0"/>
-              <a:t>Row </a:t>
-            </a:r>
-            <a:r>
-              <a:rPr lang="en-GB" dirty="0" smtClean="0"/>
-              <a:t>per imported </a:t>
-            </a:r>
-            <a:r>
-              <a:rPr lang="en-GB" dirty="0" smtClean="0"/>
-              <a:t>file</a:t>
+          </a:p>
+          <a:p>
+            <a:r>
+              <a:rPr lang="en-GB" dirty="0" smtClean="0"/>
+              <a:t>Row per imported file</a:t>
             </a:r>
           </a:p>
           <a:p>
@@ -8867,6 +8890,7 @@
           <a:p>
             <a:fld id="{DC153228-D550-42DF-BB33-D50F94922FDF}" type="datetime1">
               <a:rPr lang="en-GB" smtClean="0"/>
+              <a:pPr/>
               <a:t>02/08/2011</a:t>
             </a:fld>
             <a:endParaRPr lang="en-GB"/>
@@ -9044,6 +9068,7 @@
           <a:p>
             <a:fld id="{D33E32D2-9B00-4BC7-8088-C9F213108F66}" type="datetime1">
               <a:rPr lang="en-GB" smtClean="0"/>
+              <a:pPr/>
               <a:t>02/08/2011</a:t>
             </a:fld>
             <a:endParaRPr lang="en-GB"/>
@@ -9200,6 +9225,7 @@
           <a:p>
             <a:fld id="{69FFEAA8-149E-4FD6-BF3E-86240B10BB88}" type="datetime1">
               <a:rPr lang="en-GB" smtClean="0"/>
+              <a:pPr/>
               <a:t>02/08/2011</a:t>
             </a:fld>
             <a:endParaRPr lang="en-GB"/>
@@ -9350,6 +9376,7 @@
           <a:p>
             <a:fld id="{7D843E30-C87E-4571-A657-C1E63936A567}" type="datetime1">
               <a:rPr lang="en-GB" smtClean="0"/>
+              <a:pPr/>
               <a:t>02/08/2011</a:t>
             </a:fld>
             <a:endParaRPr lang="en-GB"/>
@@ -9500,6 +9527,7 @@
           <a:p>
             <a:fld id="{6255D6B8-6007-4958-B20D-C491E567D5AC}" type="datetime1">
               <a:rPr lang="en-GB" smtClean="0"/>
+              <a:pPr/>
               <a:t>02/08/2011</a:t>
             </a:fld>
             <a:endParaRPr lang="en-GB"/>

</xml_diff>

<commit_message>
updated with webctdbexport - include filecontentid in file.json; info on extra permissions
</commit_message>
<xml_diff>
--- a/docs/readme_development.pptx
+++ b/docs/readme_development.pptx
@@ -5,7 +5,7 @@
     <p:sldMasterId id="2147483648" r:id="rId1"/>
   </p:sldMasterIdLst>
   <p:notesMasterIdLst>
-    <p:notesMasterId r:id="rId27"/>
+    <p:notesMasterId r:id="rId28"/>
   </p:notesMasterIdLst>
   <p:sldIdLst>
     <p:sldId id="256" r:id="rId2"/>
@@ -18,21 +18,22 @@
     <p:sldId id="262" r:id="rId9"/>
     <p:sldId id="263" r:id="rId10"/>
     <p:sldId id="264" r:id="rId11"/>
-    <p:sldId id="267" r:id="rId12"/>
-    <p:sldId id="266" r:id="rId13"/>
-    <p:sldId id="268" r:id="rId14"/>
-    <p:sldId id="270" r:id="rId15"/>
-    <p:sldId id="269" r:id="rId16"/>
-    <p:sldId id="271" r:id="rId17"/>
-    <p:sldId id="273" r:id="rId18"/>
-    <p:sldId id="277" r:id="rId19"/>
-    <p:sldId id="276" r:id="rId20"/>
-    <p:sldId id="278" r:id="rId21"/>
-    <p:sldId id="275" r:id="rId22"/>
-    <p:sldId id="274" r:id="rId23"/>
-    <p:sldId id="281" r:id="rId24"/>
-    <p:sldId id="279" r:id="rId25"/>
-    <p:sldId id="280" r:id="rId26"/>
+    <p:sldId id="282" r:id="rId12"/>
+    <p:sldId id="267" r:id="rId13"/>
+    <p:sldId id="266" r:id="rId14"/>
+    <p:sldId id="268" r:id="rId15"/>
+    <p:sldId id="270" r:id="rId16"/>
+    <p:sldId id="269" r:id="rId17"/>
+    <p:sldId id="271" r:id="rId18"/>
+    <p:sldId id="273" r:id="rId19"/>
+    <p:sldId id="277" r:id="rId20"/>
+    <p:sldId id="276" r:id="rId21"/>
+    <p:sldId id="278" r:id="rId22"/>
+    <p:sldId id="275" r:id="rId23"/>
+    <p:sldId id="274" r:id="rId24"/>
+    <p:sldId id="281" r:id="rId25"/>
+    <p:sldId id="279" r:id="rId26"/>
+    <p:sldId id="280" r:id="rId27"/>
   </p:sldIdLst>
   <p:sldSz cx="9144000" cy="6858000" type="screen4x3"/>
   <p:notesSz cx="6858000" cy="9144000"/>
@@ -217,7 +218,7 @@
             <a:fld id="{74A0E1AF-9ED3-4188-A17D-BFFB8690E4D9}" type="datetimeFigureOut">
               <a:rPr lang="en-GB" smtClean="0"/>
               <a:pPr/>
-              <a:t>02/08/2011</a:t>
+              <a:t>03/08/2011</a:t>
             </a:fld>
             <a:endParaRPr lang="en-GB"/>
           </a:p>
@@ -665,7 +666,7 @@
             <a:fld id="{A2D17C81-3A61-4411-B0BC-18470022F277}" type="datetime1">
               <a:rPr lang="en-GB" smtClean="0"/>
               <a:pPr/>
-              <a:t>02/08/2011</a:t>
+              <a:t>03/08/2011</a:t>
             </a:fld>
             <a:endParaRPr lang="en-GB"/>
           </a:p>
@@ -836,7 +837,7 @@
             <a:fld id="{94C1E024-F399-49EE-B17A-C884E32C64B1}" type="datetime1">
               <a:rPr lang="en-GB" smtClean="0"/>
               <a:pPr/>
-              <a:t>02/08/2011</a:t>
+              <a:t>03/08/2011</a:t>
             </a:fld>
             <a:endParaRPr lang="en-GB"/>
           </a:p>
@@ -1017,7 +1018,7 @@
             <a:fld id="{C21146B1-A45B-4FFD-9234-6D69798353E8}" type="datetime1">
               <a:rPr lang="en-GB" smtClean="0"/>
               <a:pPr/>
-              <a:t>02/08/2011</a:t>
+              <a:t>03/08/2011</a:t>
             </a:fld>
             <a:endParaRPr lang="en-GB"/>
           </a:p>
@@ -1188,7 +1189,7 @@
             <a:fld id="{99754A40-3E9E-4671-A285-8FDB85EEA878}" type="datetime1">
               <a:rPr lang="en-GB" smtClean="0"/>
               <a:pPr/>
-              <a:t>02/08/2011</a:t>
+              <a:t>03/08/2011</a:t>
             </a:fld>
             <a:endParaRPr lang="en-GB"/>
           </a:p>
@@ -1435,7 +1436,7 @@
             <a:fld id="{9B1CA4E5-ACFC-4E33-8A18-16074A8688BB}" type="datetime1">
               <a:rPr lang="en-GB" smtClean="0"/>
               <a:pPr/>
-              <a:t>02/08/2011</a:t>
+              <a:t>03/08/2011</a:t>
             </a:fld>
             <a:endParaRPr lang="en-GB"/>
           </a:p>
@@ -1724,7 +1725,7 @@
             <a:fld id="{D33E32D2-9B00-4BC7-8088-C9F213108F66}" type="datetime1">
               <a:rPr lang="en-GB" smtClean="0"/>
               <a:pPr/>
-              <a:t>02/08/2011</a:t>
+              <a:t>03/08/2011</a:t>
             </a:fld>
             <a:endParaRPr lang="en-GB"/>
           </a:p>
@@ -2147,7 +2148,7 @@
             <a:fld id="{ED677D40-A884-454C-B1C2-FD991C706EA6}" type="datetime1">
               <a:rPr lang="en-GB" smtClean="0"/>
               <a:pPr/>
-              <a:t>02/08/2011</a:t>
+              <a:t>03/08/2011</a:t>
             </a:fld>
             <a:endParaRPr lang="en-GB"/>
           </a:p>
@@ -2266,7 +2267,7 @@
             <a:fld id="{3A2313F6-0B76-4887-9CAC-FB231FF11EE5}" type="datetime1">
               <a:rPr lang="en-GB" smtClean="0"/>
               <a:pPr/>
-              <a:t>02/08/2011</a:t>
+              <a:t>03/08/2011</a:t>
             </a:fld>
             <a:endParaRPr lang="en-GB"/>
           </a:p>
@@ -2362,7 +2363,7 @@
             <a:fld id="{C9BE8627-E39F-4DB4-9277-3E692B9821E5}" type="datetime1">
               <a:rPr lang="en-GB" smtClean="0"/>
               <a:pPr/>
-              <a:t>02/08/2011</a:t>
+              <a:t>03/08/2011</a:t>
             </a:fld>
             <a:endParaRPr lang="en-GB"/>
           </a:p>
@@ -2640,7 +2641,7 @@
             <a:fld id="{EA144C46-FBB5-4F20-8AD4-692765129358}" type="datetime1">
               <a:rPr lang="en-GB" smtClean="0"/>
               <a:pPr/>
-              <a:t>02/08/2011</a:t>
+              <a:t>03/08/2011</a:t>
             </a:fld>
             <a:endParaRPr lang="en-GB"/>
           </a:p>
@@ -2894,7 +2895,7 @@
             <a:fld id="{3C932F37-A5C5-4685-8B37-CBB5D729C0F8}" type="datetime1">
               <a:rPr lang="en-GB" smtClean="0"/>
               <a:pPr/>
-              <a:t>02/08/2011</a:t>
+              <a:t>03/08/2011</a:t>
             </a:fld>
             <a:endParaRPr lang="en-GB"/>
           </a:p>
@@ -3108,7 +3109,7 @@
             <a:fld id="{404936E1-57E9-49BE-A877-3ED51EAA2CBC}" type="datetime1">
               <a:rPr lang="en-GB" smtClean="0"/>
               <a:pPr/>
-              <a:t>02/08/2011</a:t>
+              <a:t>03/08/2011</a:t>
             </a:fld>
             <a:endParaRPr lang="en-GB"/>
           </a:p>
@@ -3565,7 +3566,7 @@
             <a:fld id="{ECEF0302-0078-48BC-8A28-3C08E35C3956}" type="datetime1">
               <a:rPr lang="en-GB" smtClean="0"/>
               <a:pPr/>
-              <a:t>02/08/2011</a:t>
+              <a:t>03/08/2011</a:t>
             </a:fld>
             <a:endParaRPr lang="en-GB"/>
           </a:p>
@@ -3683,7 +3684,7 @@
         <p:spPr/>
         <p:txBody>
           <a:bodyPr>
-            <a:normAutofit fontScale="92500" lnSpcReduction="10000"/>
+            <a:normAutofit fontScale="85000" lnSpcReduction="20000"/>
           </a:bodyPr>
           <a:lstStyle/>
           <a:p>
@@ -3709,6 +3710,25 @@
               <a:rPr lang="en-GB" dirty="0" err="1" smtClean="0"/>
               <a:t>webctdbexport.jdbc.DumpUsers</a:t>
             </a:r>
+            <a:r>
+              <a:rPr lang="en-GB" dirty="0" smtClean="0"/>
+              <a:t> </a:t>
+            </a:r>
+          </a:p>
+          <a:p>
+            <a:pPr lvl="2"/>
+            <a:r>
+              <a:rPr lang="en-GB" dirty="0" smtClean="0"/>
+              <a:t>Ant target “</a:t>
+            </a:r>
+            <a:r>
+              <a:rPr lang="en-GB" dirty="0" err="1" smtClean="0"/>
+              <a:t>dumpusers</a:t>
+            </a:r>
+            <a:r>
+              <a:rPr lang="en-GB" dirty="0" smtClean="0"/>
+              <a:t>”, to dump/files &amp; dump/folders</a:t>
+            </a:r>
             <a:endParaRPr lang="en-GB" dirty="0" smtClean="0"/>
           </a:p>
           <a:p>
@@ -3738,6 +3758,22 @@
             <a:pPr lvl="2"/>
             <a:r>
               <a:rPr lang="en-GB" dirty="0" smtClean="0"/>
+              <a:t>Ant target “</a:t>
+            </a:r>
+            <a:r>
+              <a:rPr lang="en-GB" dirty="0" err="1" smtClean="0"/>
+              <a:t>dumpall</a:t>
+            </a:r>
+            <a:r>
+              <a:rPr lang="en-GB" dirty="0" smtClean="0"/>
+              <a:t>”, to dump/files &amp; dump/folders</a:t>
+            </a:r>
+            <a:endParaRPr lang="en-GB" dirty="0" smtClean="0"/>
+          </a:p>
+          <a:p>
+            <a:pPr lvl="2"/>
+            <a:r>
+              <a:rPr lang="en-GB" dirty="0" smtClean="0"/>
               <a:t>Dumps all courses, starting from root institution(</a:t>
             </a:r>
             <a:r>
@@ -3810,7 +3846,7 @@
             <a:fld id="{D4B290E2-3611-43DB-B345-1DC6D4CB4A8B}" type="datetime1">
               <a:rPr lang="en-GB" smtClean="0"/>
               <a:pPr/>
-              <a:t>02/08/2011</a:t>
+              <a:t>03/08/2011</a:t>
             </a:fld>
             <a:endParaRPr lang="en-GB"/>
           </a:p>
@@ -3904,8 +3940,12 @@
           <a:lstStyle/>
           <a:p>
             <a:r>
-              <a:rPr lang="en-GB" dirty="0" smtClean="0"/>
-              <a:t>Cache top-level structure</a:t>
+              <a:rPr lang="en-GB" dirty="0" err="1" smtClean="0"/>
+              <a:t>WebCT</a:t>
+            </a:r>
+            <a:r>
+              <a:rPr lang="en-GB" dirty="0" smtClean="0"/>
+              <a:t> cache – extra permissions</a:t>
             </a:r>
             <a:endParaRPr lang="en-GB" dirty="0"/>
           </a:p>
@@ -3923,56 +3963,171 @@
         </p:nvSpPr>
         <p:spPr/>
         <p:txBody>
-          <a:bodyPr/>
-          <a:lstStyle/>
-          <a:p>
-            <a:r>
-              <a:rPr lang="en-GB" dirty="0" smtClean="0"/>
-              <a:t>files/ – the raw content files, stored based on SHA-1 hash of content bytes</a:t>
+          <a:bodyPr>
+            <a:normAutofit fontScale="85000" lnSpcReduction="10000"/>
+          </a:bodyPr>
+          <a:lstStyle/>
+          <a:p>
+            <a:r>
+              <a:rPr lang="en-GB" dirty="0" smtClean="0"/>
+              <a:t>Users can be given post-hoc access to other Sections:</a:t>
             </a:r>
           </a:p>
           <a:p>
             <a:pPr lvl="1"/>
             <a:r>
-              <a:rPr lang="en-GB" dirty="0" smtClean="0"/>
-              <a:t>Same trick used by </a:t>
-            </a:r>
-            <a:r>
-              <a:rPr lang="en-GB" dirty="0" err="1" smtClean="0"/>
-              <a:t>Moodle</a:t>
-            </a:r>
-            <a:r>
-              <a:rPr lang="en-GB" dirty="0" smtClean="0"/>
-              <a:t> 2</a:t>
-            </a:r>
-          </a:p>
-          <a:p>
-            <a:r>
-              <a:rPr lang="en-GB" dirty="0" smtClean="0"/>
-              <a:t>folders/ – the structure of the course(</a:t>
-            </a:r>
-            <a:r>
-              <a:rPr lang="en-GB" dirty="0" err="1" smtClean="0"/>
-              <a:t>s</a:t>
-            </a:r>
-            <a:r>
-              <a:rPr lang="en-GB" dirty="0" smtClean="0"/>
-              <a:t>) and folders in </a:t>
-            </a:r>
-            <a:r>
-              <a:rPr lang="en-GB" dirty="0" err="1" smtClean="0"/>
-              <a:t>WebCT</a:t>
-            </a:r>
-            <a:r>
-              <a:rPr lang="en-GB" dirty="0" smtClean="0"/>
-              <a:t>, including links and references to file content in files/</a:t>
-            </a:r>
-          </a:p>
-          <a:p>
-            <a:r>
-              <a:rPr lang="en-GB" dirty="0" smtClean="0"/>
-              <a:t>folders/user/ - root of directories for information about users</a:t>
-            </a:r>
+              <a:rPr lang="en-GB" dirty="0" err="1" smtClean="0"/>
+              <a:t>webctdbexport.jdbc.FindLearningContext</a:t>
+            </a:r>
+            <a:endParaRPr lang="en-GB" dirty="0" smtClean="0"/>
+          </a:p>
+          <a:p>
+            <a:pPr lvl="2"/>
+            <a:r>
+              <a:rPr lang="en-GB" dirty="0" smtClean="0"/>
+              <a:t>Ant target </a:t>
+            </a:r>
+            <a:r>
+              <a:rPr lang="en-GB" dirty="0" err="1" smtClean="0"/>
+              <a:t>findsection</a:t>
+            </a:r>
+            <a:endParaRPr lang="en-GB" dirty="0" smtClean="0"/>
+          </a:p>
+          <a:p>
+            <a:pPr lvl="2"/>
+            <a:r>
+              <a:rPr lang="en-GB" dirty="0" smtClean="0"/>
+              <a:t>Takes SQL LIKE pattern for section name and optional pattern for course name (‘%’ is wild-card)</a:t>
+            </a:r>
+          </a:p>
+          <a:p>
+            <a:pPr lvl="2"/>
+            <a:r>
+              <a:rPr lang="en-GB" dirty="0" smtClean="0"/>
+              <a:t>Lists matching sections and their IDs, e.g. “lc12345”</a:t>
+            </a:r>
+          </a:p>
+          <a:p>
+            <a:pPr lvl="1"/>
+            <a:r>
+              <a:rPr lang="en-GB" dirty="0" err="1" smtClean="0"/>
+              <a:t>DumpUsers</a:t>
+            </a:r>
+            <a:r>
+              <a:rPr lang="en-GB" dirty="0" smtClean="0"/>
+              <a:t> reads from extra permissions file:</a:t>
+            </a:r>
+          </a:p>
+          <a:p>
+            <a:pPr lvl="2"/>
+            <a:r>
+              <a:rPr lang="en-GB" dirty="0" smtClean="0"/>
+              <a:t>4</a:t>
+            </a:r>
+            <a:r>
+              <a:rPr lang="en-GB" baseline="30000" dirty="0" smtClean="0"/>
+              <a:t>th</a:t>
+            </a:r>
+            <a:r>
+              <a:rPr lang="en-GB" dirty="0" smtClean="0"/>
+              <a:t> argument; default dump/</a:t>
+            </a:r>
+            <a:r>
+              <a:rPr lang="en-GB" dirty="0" err="1" smtClean="0"/>
+              <a:t>extrapermissions.txt</a:t>
+            </a:r>
+            <a:endParaRPr lang="en-GB" dirty="0" smtClean="0"/>
+          </a:p>
+          <a:p>
+            <a:pPr lvl="2"/>
+            <a:r>
+              <a:rPr lang="en-GB" dirty="0" smtClean="0"/>
+              <a:t>Format:</a:t>
+            </a:r>
+          </a:p>
+          <a:p>
+            <a:pPr lvl="3">
+              <a:buNone/>
+            </a:pPr>
+            <a:r>
+              <a:rPr lang="en-GB" dirty="0" smtClean="0">
+                <a:latin typeface="Courier New" pitchFamily="49" charset="0"/>
+                <a:cs typeface="Courier New" pitchFamily="49" charset="0"/>
+              </a:rPr>
+              <a:t># comment…</a:t>
+            </a:r>
+          </a:p>
+          <a:p>
+            <a:pPr lvl="3">
+              <a:buNone/>
+            </a:pPr>
+            <a:r>
+              <a:rPr lang="en-GB" dirty="0" smtClean="0">
+                <a:latin typeface="Courier New" pitchFamily="49" charset="0"/>
+                <a:cs typeface="Courier New" pitchFamily="49" charset="0"/>
+              </a:rPr>
+              <a:t>&lt;username&gt; &lt;</a:t>
+            </a:r>
+            <a:r>
+              <a:rPr lang="en-GB" dirty="0" err="1" smtClean="0">
+                <a:latin typeface="Courier New" pitchFamily="49" charset="0"/>
+                <a:cs typeface="Courier New" pitchFamily="49" charset="0"/>
+              </a:rPr>
+              <a:t>lc</a:t>
+            </a:r>
+            <a:r>
+              <a:rPr lang="en-GB" dirty="0" smtClean="0">
+                <a:latin typeface="Courier New" pitchFamily="49" charset="0"/>
+                <a:cs typeface="Courier New" pitchFamily="49" charset="0"/>
+              </a:rPr>
+              <a:t>-code&gt; …</a:t>
+            </a:r>
+          </a:p>
+          <a:p>
+            <a:pPr lvl="3">
+              <a:buNone/>
+            </a:pPr>
+            <a:r>
+              <a:rPr lang="en-GB" dirty="0" smtClean="0">
+                <a:latin typeface="Courier New" pitchFamily="49" charset="0"/>
+                <a:cs typeface="Courier New" pitchFamily="49" charset="0"/>
+              </a:rPr>
+              <a:t>&lt;username&gt; &lt;</a:t>
+            </a:r>
+            <a:r>
+              <a:rPr lang="en-GB" dirty="0" err="1" smtClean="0">
+                <a:latin typeface="Courier New" pitchFamily="49" charset="0"/>
+                <a:cs typeface="Courier New" pitchFamily="49" charset="0"/>
+              </a:rPr>
+              <a:t>lc</a:t>
+            </a:r>
+            <a:r>
+              <a:rPr lang="en-GB" dirty="0" smtClean="0">
+                <a:latin typeface="Courier New" pitchFamily="49" charset="0"/>
+                <a:cs typeface="Courier New" pitchFamily="49" charset="0"/>
+              </a:rPr>
+              <a:t>-code&gt; …</a:t>
+            </a:r>
+          </a:p>
+          <a:p>
+            <a:pPr lvl="3">
+              <a:buNone/>
+            </a:pPr>
+            <a:r>
+              <a:rPr lang="en-GB" dirty="0" smtClean="0">
+                <a:latin typeface="Courier New" pitchFamily="49" charset="0"/>
+                <a:cs typeface="Courier New" pitchFamily="49" charset="0"/>
+              </a:rPr>
+              <a:t>…</a:t>
+            </a:r>
+            <a:endParaRPr lang="en-GB" dirty="0" smtClean="0">
+              <a:latin typeface="Courier New" pitchFamily="49" charset="0"/>
+              <a:cs typeface="Courier New" pitchFamily="49" charset="0"/>
+            </a:endParaRPr>
+          </a:p>
+          <a:p>
+            <a:pPr lvl="1"/>
+            <a:endParaRPr lang="en-GB" dirty="0"/>
           </a:p>
         </p:txBody>
       </p:sp>
@@ -3991,10 +4146,10 @@
           <a:bodyPr/>
           <a:lstStyle/>
           <a:p>
-            <a:fld id="{61ED3A50-388A-473C-B4FE-61F30947038F}" type="datetime1">
+            <a:fld id="{99754A40-3E9E-4671-A285-8FDB85EEA878}" type="datetime1">
               <a:rPr lang="en-GB" smtClean="0"/>
               <a:pPr/>
-              <a:t>02/08/2011</a:t>
+              <a:t>03/08/2011</a:t>
             </a:fld>
             <a:endParaRPr lang="en-GB"/>
           </a:p>
@@ -4002,7 +4157,30 @@
       </p:sp>
       <p:sp>
         <p:nvSpPr>
-          <p:cNvPr id="5" name="Slide Number Placeholder 4"/>
+          <p:cNvPr id="5" name="Footer Placeholder 4"/>
+          <p:cNvSpPr>
+            <a:spLocks noGrp="1"/>
+          </p:cNvSpPr>
+          <p:nvPr>
+            <p:ph type="ftr" sz="quarter" idx="11"/>
+          </p:nvPr>
+        </p:nvSpPr>
+        <p:spPr/>
+        <p:txBody>
+          <a:bodyPr/>
+          <a:lstStyle/>
+          <a:p>
+            <a:r>
+              <a:rPr lang="en-GB" smtClean="0"/>
+              <a:t>Moodle mod/webctimport</a:t>
+            </a:r>
+            <a:endParaRPr lang="en-GB"/>
+          </a:p>
+        </p:txBody>
+      </p:sp>
+      <p:sp>
+        <p:nvSpPr>
+          <p:cNvPr id="6" name="Slide Number Placeholder 5"/>
           <p:cNvSpPr>
             <a:spLocks noGrp="1"/>
           </p:cNvSpPr>
@@ -4020,29 +4198,6 @@
               <a:pPr/>
               <a:t>11</a:t>
             </a:fld>
-            <a:endParaRPr lang="en-GB"/>
-          </a:p>
-        </p:txBody>
-      </p:sp>
-      <p:sp>
-        <p:nvSpPr>
-          <p:cNvPr id="6" name="Footer Placeholder 5"/>
-          <p:cNvSpPr>
-            <a:spLocks noGrp="1"/>
-          </p:cNvSpPr>
-          <p:nvPr>
-            <p:ph type="ftr" sz="quarter" idx="11"/>
-          </p:nvPr>
-        </p:nvSpPr>
-        <p:spPr/>
-        <p:txBody>
-          <a:bodyPr/>
-          <a:lstStyle/>
-          <a:p>
-            <a:r>
-              <a:rPr lang="en-GB" smtClean="0"/>
-              <a:t>Moodle mod/webctimport</a:t>
-            </a:r>
             <a:endParaRPr lang="en-GB"/>
           </a:p>
         </p:txBody>
@@ -4089,7 +4244,7 @@
           <a:p>
             <a:r>
               <a:rPr lang="en-GB" dirty="0" smtClean="0"/>
-              <a:t>File cache structure: courses</a:t>
+              <a:t>Cache top-level structure</a:t>
             </a:r>
             <a:endParaRPr lang="en-GB" dirty="0"/>
           </a:p>
@@ -4112,21 +4267,36 @@
           <a:p>
             <a:r>
               <a:rPr lang="en-GB" dirty="0" smtClean="0"/>
-              <a:t>Each section or folder becomes a directory</a:t>
+              <a:t>files/ – the raw content files, stored based on SHA-1 hash of content bytes</a:t>
             </a:r>
           </a:p>
           <a:p>
             <a:pPr lvl="1"/>
             <a:r>
               <a:rPr lang="en-GB" dirty="0" smtClean="0"/>
-              <a:t>Under parent learning context or folder</a:t>
-            </a:r>
-          </a:p>
-          <a:p>
-            <a:pPr lvl="1"/>
-            <a:r>
-              <a:rPr lang="en-GB" dirty="0" smtClean="0"/>
-              <a:t>Name based on </a:t>
+              <a:t>Same trick used by </a:t>
+            </a:r>
+            <a:r>
+              <a:rPr lang="en-GB" dirty="0" err="1" smtClean="0"/>
+              <a:t>Moodle</a:t>
+            </a:r>
+            <a:r>
+              <a:rPr lang="en-GB" dirty="0" smtClean="0"/>
+              <a:t> 2</a:t>
+            </a:r>
+          </a:p>
+          <a:p>
+            <a:r>
+              <a:rPr lang="en-GB" dirty="0" smtClean="0"/>
+              <a:t>folders/ – the structure of the course(</a:t>
+            </a:r>
+            <a:r>
+              <a:rPr lang="en-GB" dirty="0" err="1" smtClean="0"/>
+              <a:t>s</a:t>
+            </a:r>
+            <a:r>
+              <a:rPr lang="en-GB" dirty="0" smtClean="0"/>
+              <a:t>) and folders in </a:t>
             </a:r>
             <a:r>
               <a:rPr lang="en-GB" dirty="0" err="1" smtClean="0"/>
@@ -4134,65 +4304,13 @@
             </a:r>
             <a:r>
               <a:rPr lang="en-GB" dirty="0" smtClean="0"/>
-              <a:t> database ID</a:t>
-            </a:r>
-          </a:p>
-          <a:p>
-            <a:pPr lvl="2"/>
-            <a:r>
-              <a:rPr lang="en-GB" dirty="0" smtClean="0"/>
-              <a:t>E.g. lc12345/ = Learning Context ID 12345</a:t>
-            </a:r>
-          </a:p>
-          <a:p>
-            <a:pPr lvl="1"/>
-            <a:r>
-              <a:rPr lang="en-GB" dirty="0" smtClean="0"/>
-              <a:t>Contains </a:t>
-            </a:r>
-            <a:r>
-              <a:rPr lang="en-GB" dirty="0" err="1" smtClean="0"/>
-              <a:t>get_listing.json</a:t>
-            </a:r>
-            <a:r>
-              <a:rPr lang="en-GB" dirty="0" smtClean="0"/>
-              <a:t> file identifying contents</a:t>
-            </a:r>
-          </a:p>
-          <a:p>
-            <a:pPr lvl="1"/>
-            <a:r>
-              <a:rPr lang="en-GB" dirty="0" smtClean="0"/>
-              <a:t>Contains </a:t>
-            </a:r>
-            <a:r>
-              <a:rPr lang="en-GB" dirty="0" err="1" smtClean="0"/>
-              <a:t>permissions.json</a:t>
-            </a:r>
-            <a:r>
-              <a:rPr lang="en-GB" dirty="0" smtClean="0"/>
-              <a:t> file identifying members and their roles</a:t>
-            </a:r>
-          </a:p>
-          <a:p>
-            <a:pPr lvl="2"/>
-            <a:r>
-              <a:rPr lang="en-GB" dirty="0" smtClean="0"/>
-              <a:t>Only seems to have useful content for a Course folder</a:t>
-            </a:r>
-          </a:p>
-          <a:p>
-            <a:r>
-              <a:rPr lang="en-GB" dirty="0" smtClean="0"/>
-              <a:t>Institution(</a:t>
-            </a:r>
-            <a:r>
-              <a:rPr lang="en-GB" dirty="0" err="1" smtClean="0"/>
-              <a:t>s</a:t>
-            </a:r>
-            <a:r>
-              <a:rPr lang="en-GB" dirty="0" smtClean="0"/>
-              <a:t>) are the top-level under folders/</a:t>
+              <a:t>, including links and references to file content in files/</a:t>
+            </a:r>
+          </a:p>
+          <a:p>
+            <a:r>
+              <a:rPr lang="en-GB" dirty="0" smtClean="0"/>
+              <a:t>folders/user/ - root of directories for information about users</a:t>
             </a:r>
           </a:p>
         </p:txBody>
@@ -4212,10 +4330,10 @@
           <a:bodyPr/>
           <a:lstStyle/>
           <a:p>
-            <a:fld id="{03364176-B50D-4113-A739-99B042C725A6}" type="datetime1">
+            <a:fld id="{61ED3A50-388A-473C-B4FE-61F30947038F}" type="datetime1">
               <a:rPr lang="en-GB" smtClean="0"/>
               <a:pPr/>
-              <a:t>02/08/2011</a:t>
+              <a:t>03/08/2011</a:t>
             </a:fld>
             <a:endParaRPr lang="en-GB"/>
           </a:p>
@@ -4310,7 +4428,7 @@
           <a:p>
             <a:r>
               <a:rPr lang="en-GB" dirty="0" smtClean="0"/>
-              <a:t>File cache structure: users</a:t>
+              <a:t>File cache structure: courses</a:t>
             </a:r>
             <a:endParaRPr lang="en-GB" dirty="0"/>
           </a:p>
@@ -4328,44 +4446,41 @@
         </p:nvSpPr>
         <p:spPr/>
         <p:txBody>
-          <a:bodyPr>
-            <a:normAutofit fontScale="92500" lnSpcReduction="10000"/>
-          </a:bodyPr>
-          <a:lstStyle/>
-          <a:p>
-            <a:r>
-              <a:rPr lang="en-GB" dirty="0" smtClean="0"/>
-              <a:t>Each user becomes a directory based on their username</a:t>
+          <a:bodyPr/>
+          <a:lstStyle/>
+          <a:p>
+            <a:r>
+              <a:rPr lang="en-GB" dirty="0" smtClean="0"/>
+              <a:t>Each section or folder becomes a directory</a:t>
             </a:r>
           </a:p>
           <a:p>
             <a:pPr lvl="1"/>
             <a:r>
               <a:rPr lang="en-GB" dirty="0" smtClean="0"/>
-              <a:t>E.g. “</a:t>
-            </a:r>
-            <a:r>
-              <a:rPr lang="en-GB" dirty="0" err="1" smtClean="0"/>
-              <a:t>pszcmg</a:t>
-            </a:r>
-            <a:r>
-              <a:rPr lang="en-GB" dirty="0" smtClean="0"/>
-              <a:t>” -&gt; </a:t>
-            </a:r>
-            <a:r>
-              <a:rPr lang="en-GB" dirty="0" err="1" smtClean="0"/>
-              <a:t>ps/psz/pszcmg</a:t>
-            </a:r>
-            <a:r>
-              <a:rPr lang="en-GB" dirty="0" smtClean="0"/>
-              <a:t>/</a:t>
+              <a:t>Under parent learning context or folder</a:t>
+            </a:r>
+          </a:p>
+          <a:p>
+            <a:pPr lvl="1"/>
+            <a:r>
+              <a:rPr lang="en-GB" dirty="0" smtClean="0"/>
+              <a:t>Name based on </a:t>
+            </a:r>
+            <a:r>
+              <a:rPr lang="en-GB" dirty="0" err="1" smtClean="0"/>
+              <a:t>WebCT</a:t>
+            </a:r>
+            <a:r>
+              <a:rPr lang="en-GB" dirty="0" smtClean="0"/>
+              <a:t> database ID</a:t>
             </a:r>
           </a:p>
           <a:p>
             <a:pPr lvl="2"/>
             <a:r>
               <a:rPr lang="en-GB" dirty="0" smtClean="0"/>
-              <a:t>Hopefully avoids having too many entries in one directory</a:t>
+              <a:t>E.g. lc12345/ = Learning Context ID 12345</a:t>
             </a:r>
           </a:p>
           <a:p>
@@ -4380,37 +4495,44 @@
             </a:r>
             <a:r>
               <a:rPr lang="en-GB" dirty="0" smtClean="0"/>
-              <a:t> file identifying user’s personal file area (if any) and courses on which they are an instructor</a:t>
-            </a:r>
-          </a:p>
-          <a:p>
-            <a:r>
-              <a:rPr lang="en-GB" dirty="0" smtClean="0"/>
-              <a:t>User’s personal file area becomes a directory</a:t>
+              <a:t> file identifying contents</a:t>
             </a:r>
           </a:p>
           <a:p>
             <a:pPr lvl="1"/>
             <a:r>
               <a:rPr lang="en-GB" dirty="0" smtClean="0"/>
-              <a:t>Under user directory</a:t>
-            </a:r>
-          </a:p>
-          <a:p>
-            <a:pPr lvl="1"/>
-            <a:r>
-              <a:rPr lang="en-GB" dirty="0" smtClean="0"/>
-              <a:t>Name based on </a:t>
-            </a:r>
-            <a:r>
-              <a:rPr lang="en-GB" dirty="0" err="1" smtClean="0"/>
-              <a:t>WebCT</a:t>
-            </a:r>
-            <a:r>
-              <a:rPr lang="en-GB" dirty="0" smtClean="0"/>
-              <a:t> person ID, e.g. p12345/</a:t>
-            </a:r>
-            <a:endParaRPr lang="en-GB" dirty="0"/>
+              <a:t>Contains </a:t>
+            </a:r>
+            <a:r>
+              <a:rPr lang="en-GB" dirty="0" err="1" smtClean="0"/>
+              <a:t>permissions.json</a:t>
+            </a:r>
+            <a:r>
+              <a:rPr lang="en-GB" dirty="0" smtClean="0"/>
+              <a:t> file identifying members and their roles</a:t>
+            </a:r>
+          </a:p>
+          <a:p>
+            <a:pPr lvl="2"/>
+            <a:r>
+              <a:rPr lang="en-GB" dirty="0" smtClean="0"/>
+              <a:t>Only seems to have useful content for a Course folder</a:t>
+            </a:r>
+          </a:p>
+          <a:p>
+            <a:r>
+              <a:rPr lang="en-GB" dirty="0" smtClean="0"/>
+              <a:t>Institution(</a:t>
+            </a:r>
+            <a:r>
+              <a:rPr lang="en-GB" dirty="0" err="1" smtClean="0"/>
+              <a:t>s</a:t>
+            </a:r>
+            <a:r>
+              <a:rPr lang="en-GB" dirty="0" smtClean="0"/>
+              <a:t>) are the top-level under folders/</a:t>
+            </a:r>
           </a:p>
         </p:txBody>
       </p:sp>
@@ -4429,10 +4551,10 @@
           <a:bodyPr/>
           <a:lstStyle/>
           <a:p>
-            <a:fld id="{F7857F0E-E873-4DCE-94AE-946A498F121D}" type="datetime1">
+            <a:fld id="{03364176-B50D-4113-A739-99B042C725A6}" type="datetime1">
               <a:rPr lang="en-GB" smtClean="0"/>
               <a:pPr/>
-              <a:t>02/08/2011</a:t>
+              <a:t>03/08/2011</a:t>
             </a:fld>
             <a:endParaRPr lang="en-GB"/>
           </a:p>
@@ -4527,7 +4649,7 @@
           <a:p>
             <a:r>
               <a:rPr lang="en-GB" dirty="0" smtClean="0"/>
-              <a:t>File cache structure: files</a:t>
+              <a:t>File cache structure: users</a:t>
             </a:r>
             <a:endParaRPr lang="en-GB" dirty="0"/>
           </a:p>
@@ -4545,12 +4667,79 @@
         </p:nvSpPr>
         <p:spPr/>
         <p:txBody>
-          <a:bodyPr/>
-          <a:lstStyle/>
-          <a:p>
-            <a:r>
-              <a:rPr lang="en-GB" dirty="0" smtClean="0"/>
-              <a:t>Each file as seen in </a:t>
+          <a:bodyPr>
+            <a:normAutofit fontScale="92500" lnSpcReduction="10000"/>
+          </a:bodyPr>
+          <a:lstStyle/>
+          <a:p>
+            <a:r>
+              <a:rPr lang="en-GB" dirty="0" smtClean="0"/>
+              <a:t>Each user becomes a directory based on their username</a:t>
+            </a:r>
+          </a:p>
+          <a:p>
+            <a:pPr lvl="1"/>
+            <a:r>
+              <a:rPr lang="en-GB" dirty="0" smtClean="0"/>
+              <a:t>E.g. “</a:t>
+            </a:r>
+            <a:r>
+              <a:rPr lang="en-GB" dirty="0" err="1" smtClean="0"/>
+              <a:t>pszcmg</a:t>
+            </a:r>
+            <a:r>
+              <a:rPr lang="en-GB" dirty="0" smtClean="0"/>
+              <a:t>” -&gt; </a:t>
+            </a:r>
+            <a:r>
+              <a:rPr lang="en-GB" dirty="0" err="1" smtClean="0"/>
+              <a:t>ps/psz/pszcmg</a:t>
+            </a:r>
+            <a:r>
+              <a:rPr lang="en-GB" dirty="0" smtClean="0"/>
+              <a:t>/</a:t>
+            </a:r>
+          </a:p>
+          <a:p>
+            <a:pPr lvl="2"/>
+            <a:r>
+              <a:rPr lang="en-GB" dirty="0" smtClean="0"/>
+              <a:t>Hopefully avoids having too many entries in one directory</a:t>
+            </a:r>
+          </a:p>
+          <a:p>
+            <a:pPr lvl="1"/>
+            <a:r>
+              <a:rPr lang="en-GB" dirty="0" smtClean="0"/>
+              <a:t>Contains </a:t>
+            </a:r>
+            <a:r>
+              <a:rPr lang="en-GB" dirty="0" err="1" smtClean="0"/>
+              <a:t>get_listing.json</a:t>
+            </a:r>
+            <a:r>
+              <a:rPr lang="en-GB" dirty="0" smtClean="0"/>
+              <a:t> file identifying user’s personal file area (if any) and courses on which they are an instructor</a:t>
+            </a:r>
+          </a:p>
+          <a:p>
+            <a:r>
+              <a:rPr lang="en-GB" dirty="0" smtClean="0"/>
+              <a:t>User’s personal file area becomes a directory</a:t>
+            </a:r>
+          </a:p>
+          <a:p>
+            <a:pPr lvl="1"/>
+            <a:r>
+              <a:rPr lang="en-GB" dirty="0" smtClean="0"/>
+              <a:t>Under user directory</a:t>
+            </a:r>
+          </a:p>
+          <a:p>
+            <a:pPr lvl="1"/>
+            <a:r>
+              <a:rPr lang="en-GB" dirty="0" smtClean="0"/>
+              <a:t>Name based on </a:t>
             </a:r>
             <a:r>
               <a:rPr lang="en-GB" dirty="0" err="1" smtClean="0"/>
@@ -4558,55 +4747,8 @@
             </a:r>
             <a:r>
               <a:rPr lang="en-GB" dirty="0" smtClean="0"/>
-              <a:t> becomes a directory</a:t>
-            </a:r>
-          </a:p>
-          <a:p>
-            <a:pPr lvl="1"/>
-            <a:r>
-              <a:rPr lang="en-GB" dirty="0" smtClean="0"/>
-              <a:t>Under parent learning context or folder</a:t>
-            </a:r>
-          </a:p>
-          <a:p>
-            <a:pPr lvl="1"/>
-            <a:r>
-              <a:rPr lang="en-GB" dirty="0" smtClean="0"/>
-              <a:t>Name based on </a:t>
-            </a:r>
-            <a:r>
-              <a:rPr lang="en-GB" dirty="0" err="1" smtClean="0"/>
-              <a:t>WebCT</a:t>
-            </a:r>
-            <a:r>
-              <a:rPr lang="en-GB" dirty="0" smtClean="0"/>
-              <a:t> database ID</a:t>
-            </a:r>
-          </a:p>
-          <a:p>
-            <a:pPr lvl="2"/>
-            <a:r>
-              <a:rPr lang="en-GB" dirty="0" smtClean="0"/>
-              <a:t>E.g. ce12345/ = CMS Entry ID 12345</a:t>
-            </a:r>
-          </a:p>
-          <a:p>
-            <a:pPr lvl="1"/>
-            <a:r>
-              <a:rPr lang="en-GB" dirty="0" smtClean="0"/>
-              <a:t>Contains </a:t>
-            </a:r>
-            <a:r>
-              <a:rPr lang="en-GB" dirty="0" err="1" smtClean="0"/>
-              <a:t>file.json</a:t>
-            </a:r>
-            <a:r>
-              <a:rPr lang="en-GB" dirty="0" smtClean="0"/>
-              <a:t> file with the file’s name, SHA-1 hash and path to file content</a:t>
-            </a:r>
-          </a:p>
-          <a:p>
-            <a:pPr lvl="1"/>
+              <a:t> person ID, e.g. p12345/</a:t>
+            </a:r>
             <a:endParaRPr lang="en-GB" dirty="0"/>
           </a:p>
         </p:txBody>
@@ -4626,10 +4768,10 @@
           <a:bodyPr/>
           <a:lstStyle/>
           <a:p>
-            <a:fld id="{F077DA80-20EA-4227-8D5A-4F2C5FC1DEAB}" type="datetime1">
+            <a:fld id="{F7857F0E-E873-4DCE-94AE-946A498F121D}" type="datetime1">
               <a:rPr lang="en-GB" smtClean="0"/>
               <a:pPr/>
-              <a:t>02/08/2011</a:t>
+              <a:t>03/08/2011</a:t>
             </a:fld>
             <a:endParaRPr lang="en-GB"/>
           </a:p>
@@ -4724,7 +4866,7 @@
           <a:p>
             <a:r>
               <a:rPr lang="en-GB" dirty="0" smtClean="0"/>
-              <a:t>File cache structure: file content</a:t>
+              <a:t>File cache structure: files</a:t>
             </a:r>
             <a:endParaRPr lang="en-GB" dirty="0"/>
           </a:p>
@@ -4742,27 +4884,56 @@
         </p:nvSpPr>
         <p:spPr/>
         <p:txBody>
-          <a:bodyPr>
-            <a:normAutofit fontScale="92500" lnSpcReduction="10000"/>
-          </a:bodyPr>
-          <a:lstStyle/>
-          <a:p>
-            <a:r>
-              <a:rPr lang="en-GB" dirty="0" smtClean="0"/>
-              <a:t>Each unique file (i.e. unique sequence of bytes) becomes a file under the files/ directory</a:t>
+          <a:bodyPr/>
+          <a:lstStyle/>
+          <a:p>
+            <a:r>
+              <a:rPr lang="en-GB" dirty="0" smtClean="0"/>
+              <a:t>Each file as seen in </a:t>
+            </a:r>
+            <a:r>
+              <a:rPr lang="en-GB" dirty="0" err="1" smtClean="0"/>
+              <a:t>WebCT</a:t>
+            </a:r>
+            <a:r>
+              <a:rPr lang="en-GB" dirty="0" smtClean="0"/>
+              <a:t> becomes a directory</a:t>
             </a:r>
           </a:p>
           <a:p>
             <a:pPr lvl="1"/>
             <a:r>
               <a:rPr lang="en-GB" dirty="0" smtClean="0"/>
-              <a:t>File content is NOT stored in the folders/ cache</a:t>
-            </a:r>
-          </a:p>
-          <a:p>
-            <a:r>
-              <a:rPr lang="en-GB" dirty="0" smtClean="0"/>
-              <a:t>N.B. therefore the content file is separated from any filename or mime type information – this is in the </a:t>
+              <a:t>Under parent learning context or folder</a:t>
+            </a:r>
+          </a:p>
+          <a:p>
+            <a:pPr lvl="1"/>
+            <a:r>
+              <a:rPr lang="en-GB" dirty="0" smtClean="0"/>
+              <a:t>Name based on </a:t>
+            </a:r>
+            <a:r>
+              <a:rPr lang="en-GB" dirty="0" err="1" smtClean="0"/>
+              <a:t>WebCT</a:t>
+            </a:r>
+            <a:r>
+              <a:rPr lang="en-GB" dirty="0" smtClean="0"/>
+              <a:t> database ID</a:t>
+            </a:r>
+          </a:p>
+          <a:p>
+            <a:pPr lvl="2"/>
+            <a:r>
+              <a:rPr lang="en-GB" dirty="0" smtClean="0"/>
+              <a:t>E.g. ce12345/ = CMS Entry ID 12345</a:t>
+            </a:r>
+          </a:p>
+          <a:p>
+            <a:pPr lvl="1"/>
+            <a:r>
+              <a:rPr lang="en-GB" dirty="0" smtClean="0"/>
+              <a:t>Contains </a:t>
             </a:r>
             <a:r>
               <a:rPr lang="en-GB" dirty="0" err="1" smtClean="0"/>
@@ -4770,44 +4941,7 @@
             </a:r>
             <a:r>
               <a:rPr lang="en-GB" dirty="0" smtClean="0"/>
-              <a:t> file(</a:t>
-            </a:r>
-            <a:r>
-              <a:rPr lang="en-GB" dirty="0" err="1" smtClean="0"/>
-              <a:t>s</a:t>
-            </a:r>
-            <a:r>
-              <a:rPr lang="en-GB" dirty="0" smtClean="0"/>
-              <a:t>)</a:t>
-            </a:r>
-          </a:p>
-          <a:p>
-            <a:r>
-              <a:rPr lang="en-GB" dirty="0" smtClean="0"/>
-              <a:t>N.B. the same file content may appear in several places in </a:t>
-            </a:r>
-            <a:r>
-              <a:rPr lang="en-GB" dirty="0" err="1" smtClean="0"/>
-              <a:t>WebCT</a:t>
-            </a:r>
-            <a:r>
-              <a:rPr lang="en-GB" dirty="0" smtClean="0"/>
-              <a:t> </a:t>
-            </a:r>
-          </a:p>
-          <a:p>
-            <a:pPr lvl="1"/>
-            <a:r>
-              <a:rPr lang="en-GB" dirty="0" smtClean="0"/>
-              <a:t>e.g. via </a:t>
-            </a:r>
-            <a:r>
-              <a:rPr lang="en-GB" dirty="0" err="1" smtClean="0"/>
-              <a:t>WebCT</a:t>
-            </a:r>
-            <a:r>
-              <a:rPr lang="en-GB" dirty="0" smtClean="0"/>
-              <a:t> links or because uploaded multiple time or re-authored identically</a:t>
+              <a:t> file with the file’s name, SHA-1 hash and path to file content</a:t>
             </a:r>
           </a:p>
           <a:p>
@@ -4831,10 +4965,10 @@
           <a:bodyPr/>
           <a:lstStyle/>
           <a:p>
-            <a:fld id="{AD2E3EA8-AA70-45E1-907B-27534B36A021}" type="datetime1">
+            <a:fld id="{F077DA80-20EA-4227-8D5A-4F2C5FC1DEAB}" type="datetime1">
               <a:rPr lang="en-GB" smtClean="0"/>
               <a:pPr/>
-              <a:t>02/08/2011</a:t>
+              <a:t>03/08/2011</a:t>
             </a:fld>
             <a:endParaRPr lang="en-GB"/>
           </a:p>
@@ -4929,7 +5063,7 @@
           <a:p>
             <a:r>
               <a:rPr lang="en-GB" dirty="0" smtClean="0"/>
-              <a:t>File content cache details</a:t>
+              <a:t>File cache structure: file content</a:t>
             </a:r>
             <a:endParaRPr lang="en-GB" dirty="0"/>
           </a:p>
@@ -4948,49 +5082,75 @@
         <p:spPr/>
         <p:txBody>
           <a:bodyPr>
-            <a:normAutofit lnSpcReduction="10000"/>
+            <a:normAutofit fontScale="92500" lnSpcReduction="10000"/>
           </a:bodyPr>
           <a:lstStyle/>
           <a:p>
             <a:r>
               <a:rPr lang="en-GB" dirty="0" smtClean="0"/>
-              <a:t>The SHA-1 hash is calculated for the bytes of each file</a:t>
+              <a:t>Each unique file (i.e. unique sequence of bytes) becomes a file under the files/ directory</a:t>
             </a:r>
           </a:p>
           <a:p>
             <a:pPr lvl="1"/>
             <a:r>
               <a:rPr lang="en-GB" dirty="0" smtClean="0"/>
-              <a:t>this is a 160 bit value represented as 40 hex digits</a:t>
-            </a:r>
-          </a:p>
-          <a:p>
-            <a:r>
-              <a:rPr lang="en-GB" dirty="0" smtClean="0"/>
-              <a:t>There are two levels of directories under files/:</a:t>
+              <a:t>File content is NOT stored in the folders/ cache</a:t>
+            </a:r>
+          </a:p>
+          <a:p>
+            <a:r>
+              <a:rPr lang="en-GB" dirty="0" smtClean="0"/>
+              <a:t>N.B. therefore the content file is separated from any filename or mime type information – this is in the </a:t>
+            </a:r>
+            <a:r>
+              <a:rPr lang="en-GB" dirty="0" err="1" smtClean="0"/>
+              <a:t>file.json</a:t>
+            </a:r>
+            <a:r>
+              <a:rPr lang="en-GB" dirty="0" smtClean="0"/>
+              <a:t> file(</a:t>
+            </a:r>
+            <a:r>
+              <a:rPr lang="en-GB" dirty="0" err="1" smtClean="0"/>
+              <a:t>s</a:t>
+            </a:r>
+            <a:r>
+              <a:rPr lang="en-GB" dirty="0" smtClean="0"/>
+              <a:t>)</a:t>
+            </a:r>
+          </a:p>
+          <a:p>
+            <a:r>
+              <a:rPr lang="en-GB" dirty="0" smtClean="0"/>
+              <a:t>N.B. the same file content may appear in several places in </a:t>
+            </a:r>
+            <a:r>
+              <a:rPr lang="en-GB" dirty="0" err="1" smtClean="0"/>
+              <a:t>WebCT</a:t>
+            </a:r>
+            <a:r>
+              <a:rPr lang="en-GB" dirty="0" smtClean="0"/>
+              <a:t> </a:t>
             </a:r>
           </a:p>
           <a:p>
             <a:pPr lvl="1"/>
             <a:r>
               <a:rPr lang="en-GB" dirty="0" smtClean="0"/>
-              <a:t>First two hex digits of hash</a:t>
+              <a:t>e.g. via </a:t>
+            </a:r>
+            <a:r>
+              <a:rPr lang="en-GB" dirty="0" err="1" smtClean="0"/>
+              <a:t>WebCT</a:t>
+            </a:r>
+            <a:r>
+              <a:rPr lang="en-GB" dirty="0" smtClean="0"/>
+              <a:t> links or because uploaded multiple time or re-authored identically</a:t>
             </a:r>
           </a:p>
           <a:p>
             <a:pPr lvl="1"/>
-            <a:r>
-              <a:rPr lang="en-GB" dirty="0" smtClean="0"/>
-              <a:t>Second two hex digits of hash</a:t>
-            </a:r>
-          </a:p>
-          <a:p>
-            <a:r>
-              <a:rPr lang="en-GB" dirty="0" smtClean="0"/>
-              <a:t>The file itself is stored in the appropriate subdirectory with its SHA-1 has as its name</a:t>
-            </a:r>
-          </a:p>
-          <a:p>
             <a:endParaRPr lang="en-GB" dirty="0"/>
           </a:p>
         </p:txBody>
@@ -5010,10 +5170,10 @@
           <a:bodyPr/>
           <a:lstStyle/>
           <a:p>
-            <a:fld id="{2BA5357B-980D-4E78-A8CE-258A05709133}" type="datetime1">
+            <a:fld id="{AD2E3EA8-AA70-45E1-907B-27534B36A021}" type="datetime1">
               <a:rPr lang="en-GB" smtClean="0"/>
               <a:pPr/>
-              <a:t>02/08/2011</a:t>
+              <a:t>03/08/2011</a:t>
             </a:fld>
             <a:endParaRPr lang="en-GB"/>
           </a:p>
@@ -5103,111 +5263,79 @@
         </p:nvSpPr>
         <p:spPr/>
         <p:txBody>
+          <a:bodyPr/>
+          <a:lstStyle/>
+          <a:p>
+            <a:r>
+              <a:rPr lang="en-GB" dirty="0" smtClean="0"/>
+              <a:t>File content cache details</a:t>
+            </a:r>
+            <a:endParaRPr lang="en-GB" dirty="0"/>
+          </a:p>
+        </p:txBody>
+      </p:sp>
+      <p:sp>
+        <p:nvSpPr>
+          <p:cNvPr id="3" name="Content Placeholder 2"/>
+          <p:cNvSpPr>
+            <a:spLocks noGrp="1"/>
+          </p:cNvSpPr>
+          <p:nvPr>
+            <p:ph idx="1"/>
+          </p:nvPr>
+        </p:nvSpPr>
+        <p:spPr/>
+        <p:txBody>
           <a:bodyPr>
-            <a:normAutofit/>
+            <a:normAutofit lnSpcReduction="10000"/>
           </a:bodyPr>
           <a:lstStyle/>
           <a:p>
             <a:r>
               <a:rPr lang="en-GB" dirty="0" smtClean="0"/>
-              <a:t>File format: </a:t>
-            </a:r>
-            <a:r>
-              <a:rPr lang="en-GB" dirty="0" err="1" smtClean="0"/>
-              <a:t>get_listing.json</a:t>
-            </a:r>
+              <a:t>The SHA-1 hash is calculated for the bytes of each file</a:t>
+            </a:r>
+          </a:p>
+          <a:p>
+            <a:pPr lvl="1"/>
+            <a:r>
+              <a:rPr lang="en-GB" dirty="0" smtClean="0"/>
+              <a:t>this is a 160 bit value represented as 40 hex digits</a:t>
+            </a:r>
+          </a:p>
+          <a:p>
+            <a:r>
+              <a:rPr lang="en-GB" dirty="0" smtClean="0"/>
+              <a:t>There are two levels of directories under files/:</a:t>
+            </a:r>
+          </a:p>
+          <a:p>
+            <a:pPr lvl="1"/>
+            <a:r>
+              <a:rPr lang="en-GB" dirty="0" smtClean="0"/>
+              <a:t>First two hex digits of hash</a:t>
+            </a:r>
+          </a:p>
+          <a:p>
+            <a:pPr lvl="1"/>
+            <a:r>
+              <a:rPr lang="en-GB" dirty="0" smtClean="0"/>
+              <a:t>Second two hex digits of hash</a:t>
+            </a:r>
+          </a:p>
+          <a:p>
+            <a:r>
+              <a:rPr lang="en-GB" dirty="0" smtClean="0"/>
+              <a:t>The file itself is stored in the appropriate subdirectory with its SHA-1 has as its name</a:t>
+            </a:r>
+          </a:p>
+          <a:p>
             <a:endParaRPr lang="en-GB" dirty="0"/>
           </a:p>
         </p:txBody>
       </p:sp>
       <p:sp>
         <p:nvSpPr>
-          <p:cNvPr id="3" name="Content Placeholder 2"/>
-          <p:cNvSpPr>
-            <a:spLocks noGrp="1"/>
-          </p:cNvSpPr>
-          <p:nvPr>
-            <p:ph idx="1"/>
-          </p:nvPr>
-        </p:nvSpPr>
-        <p:spPr>
-          <a:xfrm>
-            <a:off x="457200" y="1600200"/>
-            <a:ext cx="8507288" cy="4525963"/>
-          </a:xfrm>
-        </p:spPr>
-        <p:txBody>
-          <a:bodyPr>
-            <a:normAutofit/>
-          </a:bodyPr>
-          <a:lstStyle/>
-          <a:p>
-            <a:pPr>
-              <a:buNone/>
-            </a:pPr>
-            <a:r>
-              <a:rPr lang="en-GB" dirty="0" smtClean="0"/>
-              <a:t>{	</a:t>
-            </a:r>
-          </a:p>
-          <a:p>
-            <a:pPr>
-              <a:buNone/>
-            </a:pPr>
-            <a:r>
-              <a:rPr lang="en-GB" dirty="0" smtClean="0"/>
-              <a:t>	"path":[ … ], </a:t>
-            </a:r>
-          </a:p>
-          <a:p>
-            <a:pPr>
-              <a:buNone/>
-            </a:pPr>
-            <a:r>
-              <a:rPr lang="en-GB" dirty="0" smtClean="0"/>
-              <a:t>	…</a:t>
-            </a:r>
-          </a:p>
-          <a:p>
-            <a:pPr>
-              <a:buNone/>
-            </a:pPr>
-            <a:r>
-              <a:rPr lang="en-GB" dirty="0" smtClean="0"/>
-              <a:t>	"list":[</a:t>
-            </a:r>
-          </a:p>
-          <a:p>
-            <a:pPr>
-              <a:buNone/>
-            </a:pPr>
-            <a:r>
-              <a:rPr lang="en-GB" dirty="0" smtClean="0"/>
-              <a:t>		&lt;item description – see following slides&gt;</a:t>
-            </a:r>
-          </a:p>
-          <a:p>
-            <a:pPr>
-              <a:buNone/>
-            </a:pPr>
-            <a:r>
-              <a:rPr lang="en-GB" dirty="0" smtClean="0"/>
-              <a:t>	]</a:t>
-            </a:r>
-          </a:p>
-          <a:p>
-            <a:pPr>
-              <a:buNone/>
-            </a:pPr>
-            <a:r>
-              <a:rPr lang="en-GB" dirty="0" smtClean="0"/>
-              <a:t>}</a:t>
-            </a:r>
-          </a:p>
-        </p:txBody>
-      </p:sp>
-      <p:sp>
-        <p:nvSpPr>
           <p:cNvPr id="4" name="Date Placeholder 3"/>
           <p:cNvSpPr>
             <a:spLocks noGrp="1"/>
@@ -5221,10 +5349,10 @@
           <a:bodyPr/>
           <a:lstStyle/>
           <a:p>
-            <a:fld id="{99754A40-3E9E-4671-A285-8FDB85EEA878}" type="datetime1">
+            <a:fld id="{2BA5357B-980D-4E78-A8CE-258A05709133}" type="datetime1">
               <a:rPr lang="en-GB" smtClean="0"/>
               <a:pPr/>
-              <a:t>02/08/2011</a:t>
+              <a:t>03/08/2011</a:t>
             </a:fld>
             <a:endParaRPr lang="en-GB"/>
           </a:p>
@@ -5232,30 +5360,7 @@
       </p:sp>
       <p:sp>
         <p:nvSpPr>
-          <p:cNvPr id="5" name="Footer Placeholder 4"/>
-          <p:cNvSpPr>
-            <a:spLocks noGrp="1"/>
-          </p:cNvSpPr>
-          <p:nvPr>
-            <p:ph type="ftr" sz="quarter" idx="11"/>
-          </p:nvPr>
-        </p:nvSpPr>
-        <p:spPr/>
-        <p:txBody>
-          <a:bodyPr/>
-          <a:lstStyle/>
-          <a:p>
-            <a:r>
-              <a:rPr lang="en-GB" smtClean="0"/>
-              <a:t>Moodle mod/webctimport</a:t>
-            </a:r>
-            <a:endParaRPr lang="en-GB"/>
-          </a:p>
-        </p:txBody>
-      </p:sp>
-      <p:sp>
-        <p:nvSpPr>
-          <p:cNvPr id="6" name="Slide Number Placeholder 5"/>
+          <p:cNvPr id="5" name="Slide Number Placeholder 4"/>
           <p:cNvSpPr>
             <a:spLocks noGrp="1"/>
           </p:cNvSpPr>
@@ -5273,6 +5378,29 @@
               <a:pPr/>
               <a:t>17</a:t>
             </a:fld>
+            <a:endParaRPr lang="en-GB"/>
+          </a:p>
+        </p:txBody>
+      </p:sp>
+      <p:sp>
+        <p:nvSpPr>
+          <p:cNvPr id="6" name="Footer Placeholder 5"/>
+          <p:cNvSpPr>
+            <a:spLocks noGrp="1"/>
+          </p:cNvSpPr>
+          <p:nvPr>
+            <p:ph type="ftr" sz="quarter" idx="11"/>
+          </p:nvPr>
+        </p:nvSpPr>
+        <p:spPr/>
+        <p:txBody>
+          <a:bodyPr/>
+          <a:lstStyle/>
+          <a:p>
+            <a:r>
+              <a:rPr lang="en-GB" smtClean="0"/>
+              <a:t>Moodle mod/webctimport</a:t>
+            </a:r>
             <a:endParaRPr lang="en-GB"/>
           </a:p>
         </p:txBody>
@@ -5315,6 +5443,217 @@
         <p:spPr/>
         <p:txBody>
           <a:bodyPr>
+            <a:normAutofit/>
+          </a:bodyPr>
+          <a:lstStyle/>
+          <a:p>
+            <a:r>
+              <a:rPr lang="en-GB" dirty="0" smtClean="0"/>
+              <a:t>File format: </a:t>
+            </a:r>
+            <a:r>
+              <a:rPr lang="en-GB" dirty="0" err="1" smtClean="0"/>
+              <a:t>get_listing.json</a:t>
+            </a:r>
+            <a:endParaRPr lang="en-GB" dirty="0"/>
+          </a:p>
+        </p:txBody>
+      </p:sp>
+      <p:sp>
+        <p:nvSpPr>
+          <p:cNvPr id="3" name="Content Placeholder 2"/>
+          <p:cNvSpPr>
+            <a:spLocks noGrp="1"/>
+          </p:cNvSpPr>
+          <p:nvPr>
+            <p:ph idx="1"/>
+          </p:nvPr>
+        </p:nvSpPr>
+        <p:spPr>
+          <a:xfrm>
+            <a:off x="457200" y="1600200"/>
+            <a:ext cx="8507288" cy="4525963"/>
+          </a:xfrm>
+        </p:spPr>
+        <p:txBody>
+          <a:bodyPr>
+            <a:normAutofit/>
+          </a:bodyPr>
+          <a:lstStyle/>
+          <a:p>
+            <a:pPr>
+              <a:buNone/>
+            </a:pPr>
+            <a:r>
+              <a:rPr lang="en-GB" dirty="0" smtClean="0"/>
+              <a:t>{	</a:t>
+            </a:r>
+          </a:p>
+          <a:p>
+            <a:pPr>
+              <a:buNone/>
+            </a:pPr>
+            <a:r>
+              <a:rPr lang="en-GB" dirty="0" smtClean="0"/>
+              <a:t>	"path":[ … ], </a:t>
+            </a:r>
+          </a:p>
+          <a:p>
+            <a:pPr>
+              <a:buNone/>
+            </a:pPr>
+            <a:r>
+              <a:rPr lang="en-GB" dirty="0" smtClean="0"/>
+              <a:t>	…</a:t>
+            </a:r>
+          </a:p>
+          <a:p>
+            <a:pPr>
+              <a:buNone/>
+            </a:pPr>
+            <a:r>
+              <a:rPr lang="en-GB" dirty="0" smtClean="0"/>
+              <a:t>	"list":[</a:t>
+            </a:r>
+          </a:p>
+          <a:p>
+            <a:pPr>
+              <a:buNone/>
+            </a:pPr>
+            <a:r>
+              <a:rPr lang="en-GB" dirty="0" smtClean="0"/>
+              <a:t>		&lt;item description – see following slides&gt;</a:t>
+            </a:r>
+          </a:p>
+          <a:p>
+            <a:pPr>
+              <a:buNone/>
+            </a:pPr>
+            <a:r>
+              <a:rPr lang="en-GB" dirty="0" smtClean="0"/>
+              <a:t>	]</a:t>
+            </a:r>
+          </a:p>
+          <a:p>
+            <a:pPr>
+              <a:buNone/>
+            </a:pPr>
+            <a:r>
+              <a:rPr lang="en-GB" dirty="0" smtClean="0"/>
+              <a:t>}</a:t>
+            </a:r>
+          </a:p>
+        </p:txBody>
+      </p:sp>
+      <p:sp>
+        <p:nvSpPr>
+          <p:cNvPr id="4" name="Date Placeholder 3"/>
+          <p:cNvSpPr>
+            <a:spLocks noGrp="1"/>
+          </p:cNvSpPr>
+          <p:nvPr>
+            <p:ph type="dt" sz="half" idx="10"/>
+          </p:nvPr>
+        </p:nvSpPr>
+        <p:spPr/>
+        <p:txBody>
+          <a:bodyPr/>
+          <a:lstStyle/>
+          <a:p>
+            <a:fld id="{99754A40-3E9E-4671-A285-8FDB85EEA878}" type="datetime1">
+              <a:rPr lang="en-GB" smtClean="0"/>
+              <a:pPr/>
+              <a:t>03/08/2011</a:t>
+            </a:fld>
+            <a:endParaRPr lang="en-GB"/>
+          </a:p>
+        </p:txBody>
+      </p:sp>
+      <p:sp>
+        <p:nvSpPr>
+          <p:cNvPr id="5" name="Footer Placeholder 4"/>
+          <p:cNvSpPr>
+            <a:spLocks noGrp="1"/>
+          </p:cNvSpPr>
+          <p:nvPr>
+            <p:ph type="ftr" sz="quarter" idx="11"/>
+          </p:nvPr>
+        </p:nvSpPr>
+        <p:spPr/>
+        <p:txBody>
+          <a:bodyPr/>
+          <a:lstStyle/>
+          <a:p>
+            <a:r>
+              <a:rPr lang="en-GB" smtClean="0"/>
+              <a:t>Moodle mod/webctimport</a:t>
+            </a:r>
+            <a:endParaRPr lang="en-GB"/>
+          </a:p>
+        </p:txBody>
+      </p:sp>
+      <p:sp>
+        <p:nvSpPr>
+          <p:cNvPr id="6" name="Slide Number Placeholder 5"/>
+          <p:cNvSpPr>
+            <a:spLocks noGrp="1"/>
+          </p:cNvSpPr>
+          <p:nvPr>
+            <p:ph type="sldNum" sz="quarter" idx="12"/>
+          </p:nvPr>
+        </p:nvSpPr>
+        <p:spPr/>
+        <p:txBody>
+          <a:bodyPr/>
+          <a:lstStyle/>
+          <a:p>
+            <a:fld id="{F43FEFBC-BC93-4024-A70C-E996616B976B}" type="slidenum">
+              <a:rPr lang="en-GB" smtClean="0"/>
+              <a:pPr/>
+              <a:t>18</a:t>
+            </a:fld>
+            <a:endParaRPr lang="en-GB"/>
+          </a:p>
+        </p:txBody>
+      </p:sp>
+    </p:spTree>
+  </p:cSld>
+  <p:clrMapOvr>
+    <a:masterClrMapping/>
+  </p:clrMapOvr>
+</p:sld>
+</file>
+
+<file path=ppt/slides/slide19.xml><?xml version="1.0" encoding="utf-8"?>
+<p:sld xmlns:a="http://schemas.openxmlformats.org/drawingml/2006/main" xmlns:r="http://schemas.openxmlformats.org/officeDocument/2006/relationships" xmlns:p="http://schemas.openxmlformats.org/presentationml/2006/main">
+  <p:cSld>
+    <p:spTree>
+      <p:nvGrpSpPr>
+        <p:cNvPr id="1" name=""/>
+        <p:cNvGrpSpPr/>
+        <p:nvPr/>
+      </p:nvGrpSpPr>
+      <p:grpSpPr>
+        <a:xfrm>
+          <a:off x="0" y="0"/>
+          <a:ext cx="0" cy="0"/>
+          <a:chOff x="0" y="0"/>
+          <a:chExt cx="0" cy="0"/>
+        </a:xfrm>
+      </p:grpSpPr>
+      <p:sp>
+        <p:nvSpPr>
+          <p:cNvPr id="2" name="Title 1"/>
+          <p:cNvSpPr>
+            <a:spLocks noGrp="1"/>
+          </p:cNvSpPr>
+          <p:nvPr>
+            <p:ph type="title"/>
+          </p:nvPr>
+        </p:nvSpPr>
+        <p:spPr/>
+        <p:txBody>
+          <a:bodyPr>
             <a:normAutofit fontScale="90000"/>
           </a:bodyPr>
           <a:lstStyle/>
@@ -5462,7 +5801,7 @@
             <a:fld id="{99754A40-3E9E-4671-A285-8FDB85EEA878}" type="datetime1">
               <a:rPr lang="en-GB" smtClean="0"/>
               <a:pPr/>
-              <a:t>02/08/2011</a:t>
+              <a:t>03/08/2011</a:t>
             </a:fld>
             <a:endParaRPr lang="en-GB"/>
           </a:p>
@@ -5509,7 +5848,7 @@
             <a:fld id="{F43FEFBC-BC93-4024-A70C-E996616B976B}" type="slidenum">
               <a:rPr lang="en-GB" smtClean="0"/>
               <a:pPr/>
-              <a:t>18</a:t>
+              <a:t>19</a:t>
             </a:fld>
             <a:endParaRPr lang="en-GB"/>
           </a:p>
@@ -5579,227 +5918,6 @@
 </p:sld>
 </file>
 
-<file path=ppt/slides/slide19.xml><?xml version="1.0" encoding="utf-8"?>
-<p:sld xmlns:a="http://schemas.openxmlformats.org/drawingml/2006/main" xmlns:r="http://schemas.openxmlformats.org/officeDocument/2006/relationships" xmlns:p="http://schemas.openxmlformats.org/presentationml/2006/main">
-  <p:cSld>
-    <p:spTree>
-      <p:nvGrpSpPr>
-        <p:cNvPr id="1" name=""/>
-        <p:cNvGrpSpPr/>
-        <p:nvPr/>
-      </p:nvGrpSpPr>
-      <p:grpSpPr>
-        <a:xfrm>
-          <a:off x="0" y="0"/>
-          <a:ext cx="0" cy="0"/>
-          <a:chOff x="0" y="0"/>
-          <a:chExt cx="0" cy="0"/>
-        </a:xfrm>
-      </p:grpSpPr>
-      <p:sp>
-        <p:nvSpPr>
-          <p:cNvPr id="2" name="Title 1"/>
-          <p:cNvSpPr>
-            <a:spLocks noGrp="1"/>
-          </p:cNvSpPr>
-          <p:nvPr>
-            <p:ph type="title"/>
-          </p:nvPr>
-        </p:nvSpPr>
-        <p:spPr/>
-        <p:txBody>
-          <a:bodyPr>
-            <a:normAutofit fontScale="90000"/>
-          </a:bodyPr>
-          <a:lstStyle/>
-          <a:p>
-            <a:r>
-              <a:rPr lang="en-GB" dirty="0" smtClean="0"/>
-              <a:t>File format: </a:t>
-            </a:r>
-            <a:r>
-              <a:rPr lang="en-GB" dirty="0" err="1" smtClean="0"/>
-              <a:t>get_listing.json</a:t>
-            </a:r>
-            <a:r>
-              <a:rPr lang="en-GB" dirty="0" smtClean="0"/>
-              <a:t>, link item</a:t>
-            </a:r>
-            <a:endParaRPr lang="en-GB" dirty="0"/>
-          </a:p>
-        </p:txBody>
-      </p:sp>
-      <p:sp>
-        <p:nvSpPr>
-          <p:cNvPr id="3" name="Content Placeholder 2"/>
-          <p:cNvSpPr>
-            <a:spLocks noGrp="1"/>
-          </p:cNvSpPr>
-          <p:nvPr>
-            <p:ph idx="1"/>
-          </p:nvPr>
-        </p:nvSpPr>
-        <p:spPr/>
-        <p:txBody>
-          <a:bodyPr>
-            <a:normAutofit/>
-          </a:bodyPr>
-          <a:lstStyle/>
-          <a:p>
-            <a:pPr>
-              <a:buNone/>
-            </a:pPr>
-            <a:r>
-              <a:rPr lang="en-GB" dirty="0" smtClean="0"/>
-              <a:t>{</a:t>
-            </a:r>
-          </a:p>
-          <a:p>
-            <a:pPr>
-              <a:buNone/>
-            </a:pPr>
-            <a:r>
-              <a:rPr lang="en-GB" dirty="0" smtClean="0"/>
-              <a:t>	"title": "&lt;link name&gt;",</a:t>
-            </a:r>
-          </a:p>
-          <a:p>
-            <a:pPr>
-              <a:buNone/>
-            </a:pPr>
-            <a:r>
-              <a:rPr lang="en-GB" dirty="0" smtClean="0"/>
-              <a:t>	"source": "&lt;link URL&gt;",</a:t>
-            </a:r>
-          </a:p>
-          <a:p>
-            <a:pPr>
-              <a:buNone/>
-            </a:pPr>
-            <a:r>
-              <a:rPr lang="en-GB" dirty="0" smtClean="0"/>
-              <a:t>	"description": "&lt;description&gt;",</a:t>
-            </a:r>
-          </a:p>
-          <a:p>
-            <a:pPr>
-              <a:buNone/>
-            </a:pPr>
-            <a:r>
-              <a:rPr lang="en-GB" dirty="0" smtClean="0"/>
-              <a:t>	"</a:t>
-            </a:r>
-            <a:r>
-              <a:rPr lang="en-GB" dirty="0" err="1" smtClean="0"/>
-              <a:t>webcttype</a:t>
-            </a:r>
-            <a:r>
-              <a:rPr lang="en-GB" dirty="0" smtClean="0"/>
-              <a:t>": “URL_TYPE/Default",</a:t>
-            </a:r>
-          </a:p>
-          <a:p>
-            <a:pPr>
-              <a:buNone/>
-            </a:pPr>
-            <a:r>
-              <a:rPr lang="en-GB" dirty="0" smtClean="0"/>
-              <a:t>	"size": 0</a:t>
-            </a:r>
-          </a:p>
-          <a:p>
-            <a:pPr>
-              <a:buNone/>
-            </a:pPr>
-            <a:r>
-              <a:rPr lang="en-GB" dirty="0" smtClean="0"/>
-              <a:t>}</a:t>
-            </a:r>
-          </a:p>
-          <a:p>
-            <a:endParaRPr lang="en-GB" dirty="0"/>
-          </a:p>
-        </p:txBody>
-      </p:sp>
-      <p:sp>
-        <p:nvSpPr>
-          <p:cNvPr id="4" name="Date Placeholder 3"/>
-          <p:cNvSpPr>
-            <a:spLocks noGrp="1"/>
-          </p:cNvSpPr>
-          <p:nvPr>
-            <p:ph type="dt" sz="half" idx="10"/>
-          </p:nvPr>
-        </p:nvSpPr>
-        <p:spPr/>
-        <p:txBody>
-          <a:bodyPr/>
-          <a:lstStyle/>
-          <a:p>
-            <a:fld id="{99754A40-3E9E-4671-A285-8FDB85EEA878}" type="datetime1">
-              <a:rPr lang="en-GB" smtClean="0"/>
-              <a:pPr/>
-              <a:t>02/08/2011</a:t>
-            </a:fld>
-            <a:endParaRPr lang="en-GB"/>
-          </a:p>
-        </p:txBody>
-      </p:sp>
-      <p:sp>
-        <p:nvSpPr>
-          <p:cNvPr id="5" name="Footer Placeholder 4"/>
-          <p:cNvSpPr>
-            <a:spLocks noGrp="1"/>
-          </p:cNvSpPr>
-          <p:nvPr>
-            <p:ph type="ftr" sz="quarter" idx="11"/>
-          </p:nvPr>
-        </p:nvSpPr>
-        <p:spPr/>
-        <p:txBody>
-          <a:bodyPr/>
-          <a:lstStyle/>
-          <a:p>
-            <a:r>
-              <a:rPr lang="en-GB" smtClean="0"/>
-              <a:t>Moodle mod/webctimport</a:t>
-            </a:r>
-            <a:endParaRPr lang="en-GB"/>
-          </a:p>
-        </p:txBody>
-      </p:sp>
-      <p:sp>
-        <p:nvSpPr>
-          <p:cNvPr id="6" name="Slide Number Placeholder 5"/>
-          <p:cNvSpPr>
-            <a:spLocks noGrp="1"/>
-          </p:cNvSpPr>
-          <p:nvPr>
-            <p:ph type="sldNum" sz="quarter" idx="12"/>
-          </p:nvPr>
-        </p:nvSpPr>
-        <p:spPr/>
-        <p:txBody>
-          <a:bodyPr/>
-          <a:lstStyle/>
-          <a:p>
-            <a:fld id="{F43FEFBC-BC93-4024-A70C-E996616B976B}" type="slidenum">
-              <a:rPr lang="en-GB" smtClean="0"/>
-              <a:pPr/>
-              <a:t>19</a:t>
-            </a:fld>
-            <a:endParaRPr lang="en-GB"/>
-          </a:p>
-        </p:txBody>
-      </p:sp>
-    </p:spTree>
-  </p:cSld>
-  <p:clrMapOvr>
-    <a:masterClrMapping/>
-  </p:clrMapOvr>
-</p:sld>
-</file>
-
 <file path=ppt/slides/slide2.xml><?xml version="1.0" encoding="utf-8"?>
 <p:sld xmlns:a="http://schemas.openxmlformats.org/drawingml/2006/main" xmlns:r="http://schemas.openxmlformats.org/officeDocument/2006/relationships" xmlns:p="http://schemas.openxmlformats.org/presentationml/2006/main">
   <p:cSld>
@@ -5996,7 +6114,7 @@
             <a:fld id="{9772B558-5545-4639-BB72-F0885B865DA6}" type="datetime1">
               <a:rPr lang="en-GB" smtClean="0"/>
               <a:pPr/>
-              <a:t>02/08/2011</a:t>
+              <a:t>03/08/2011</a:t>
             </a:fld>
             <a:endParaRPr lang="en-GB"/>
           </a:p>
@@ -6101,7 +6219,7 @@
             </a:r>
             <a:r>
               <a:rPr lang="en-GB" dirty="0" smtClean="0"/>
-              <a:t>, file item</a:t>
+              <a:t>, link item</a:t>
             </a:r>
             <a:endParaRPr lang="en-GB" dirty="0"/>
           </a:p>
@@ -6117,12 +6235,7 @@
             <p:ph idx="1"/>
           </p:nvPr>
         </p:nvSpPr>
-        <p:spPr>
-          <a:xfrm>
-            <a:off x="457200" y="1600200"/>
-            <a:ext cx="8686800" cy="4525963"/>
-          </a:xfrm>
-        </p:spPr>
+        <p:spPr/>
         <p:txBody>
           <a:bodyPr>
             <a:normAutofit/>
@@ -6143,7 +6256,7 @@
             </a:pPr>
             <a:r>
               <a:rPr lang="en-GB" dirty="0" smtClean="0"/>
-              <a:t>	"title": "&lt;file/link name&gt;",</a:t>
+              <a:t>	"title": "&lt;link name&gt;",</a:t>
             </a:r>
           </a:p>
           <a:p>
@@ -6152,7 +6265,7 @@
             </a:pPr>
             <a:r>
               <a:rPr lang="en-GB" dirty="0" smtClean="0"/>
-              <a:t>	"source": "&lt;file info path within folders cache&gt;",</a:t>
+              <a:t>	"source": "&lt;link URL&gt;",</a:t>
             </a:r>
           </a:p>
           <a:p>
@@ -6178,15 +6291,7 @@
             </a:r>
             <a:r>
               <a:rPr lang="en-GB" dirty="0" smtClean="0"/>
-              <a:t>": "&lt;</a:t>
-            </a:r>
-            <a:r>
-              <a:rPr lang="en-GB" dirty="0" err="1" smtClean="0"/>
-              <a:t>webct</a:t>
-            </a:r>
-            <a:r>
-              <a:rPr lang="en-GB" dirty="0" smtClean="0"/>
-              <a:t> type&gt;",</a:t>
+              <a:t>": “URL_TYPE/Default",</a:t>
             </a:r>
           </a:p>
           <a:p>
@@ -6230,7 +6335,7 @@
             <a:fld id="{99754A40-3E9E-4671-A285-8FDB85EEA878}" type="datetime1">
               <a:rPr lang="en-GB" smtClean="0"/>
               <a:pPr/>
-              <a:t>02/08/2011</a:t>
+              <a:t>03/08/2011</a:t>
             </a:fld>
             <a:endParaRPr lang="en-GB"/>
           </a:p>
@@ -6320,7 +6425,9 @@
         </p:nvSpPr>
         <p:spPr/>
         <p:txBody>
-          <a:bodyPr/>
+          <a:bodyPr>
+            <a:normAutofit fontScale="90000"/>
+          </a:bodyPr>
           <a:lstStyle/>
           <a:p>
             <a:r>
@@ -6329,7 +6436,11 @@
             </a:r>
             <a:r>
               <a:rPr lang="en-GB" dirty="0" err="1" smtClean="0"/>
-              <a:t>permissions.json</a:t>
+              <a:t>get_listing.json</a:t>
+            </a:r>
+            <a:r>
+              <a:rPr lang="en-GB" dirty="0" smtClean="0"/>
+              <a:t>, file item</a:t>
             </a:r>
             <a:endParaRPr lang="en-GB" dirty="0"/>
           </a:p>
@@ -6345,9 +6456,16 @@
             <p:ph idx="1"/>
           </p:nvPr>
         </p:nvSpPr>
-        <p:spPr/>
-        <p:txBody>
-          <a:bodyPr/>
+        <p:spPr>
+          <a:xfrm>
+            <a:off x="457200" y="1600200"/>
+            <a:ext cx="8686800" cy="4525963"/>
+          </a:xfrm>
+        </p:spPr>
+        <p:txBody>
+          <a:bodyPr>
+            <a:normAutofit/>
+          </a:bodyPr>
           <a:lstStyle/>
           <a:p>
             <a:pPr>
@@ -6364,7 +6482,7 @@
             </a:pPr>
             <a:r>
               <a:rPr lang="en-GB" dirty="0" smtClean="0"/>
-              <a:t>	"&lt;username&gt;": [</a:t>
+              <a:t>	"title": "&lt;file/link name&gt;",</a:t>
             </a:r>
           </a:p>
           <a:p>
@@ -6373,7 +6491,7 @@
             </a:pPr>
             <a:r>
               <a:rPr lang="en-GB" dirty="0" smtClean="0"/>
-              <a:t>		"&lt;role&gt;", …</a:t>
+              <a:t>	"source": "&lt;file info path within folders cache&gt;",</a:t>
             </a:r>
           </a:p>
           <a:p>
@@ -6382,7 +6500,7 @@
             </a:pPr>
             <a:r>
               <a:rPr lang="en-GB" dirty="0" smtClean="0"/>
-              <a:t>	], </a:t>
+              <a:t>	"description": "&lt;description&gt;",</a:t>
             </a:r>
           </a:p>
           <a:p>
@@ -6391,7 +6509,23 @@
             </a:pPr>
             <a:r>
               <a:rPr lang="en-GB" dirty="0" smtClean="0"/>
-              <a:t>	…</a:t>
+              <a:t>	"</a:t>
+            </a:r>
+            <a:r>
+              <a:rPr lang="en-GB" dirty="0" err="1" smtClean="0"/>
+              <a:t>webcttype</a:t>
+            </a:r>
+            <a:r>
+              <a:rPr lang="en-GB" dirty="0" smtClean="0"/>
+              <a:t>": "&lt;</a:t>
+            </a:r>
+            <a:r>
+              <a:rPr lang="en-GB" dirty="0" err="1" smtClean="0"/>
+              <a:t>webct</a:t>
+            </a:r>
+            <a:r>
+              <a:rPr lang="en-GB" dirty="0" smtClean="0"/>
+              <a:t> type&gt;",</a:t>
             </a:r>
           </a:p>
           <a:p>
@@ -6400,8 +6534,19 @@
             </a:pPr>
             <a:r>
               <a:rPr lang="en-GB" dirty="0" smtClean="0"/>
+              <a:t>	"size": 0</a:t>
+            </a:r>
+          </a:p>
+          <a:p>
+            <a:pPr>
+              <a:buNone/>
+            </a:pPr>
+            <a:r>
+              <a:rPr lang="en-GB" dirty="0" smtClean="0"/>
               <a:t>}</a:t>
             </a:r>
+          </a:p>
+          <a:p>
             <a:endParaRPr lang="en-GB" dirty="0"/>
           </a:p>
         </p:txBody>
@@ -6424,7 +6569,7 @@
             <a:fld id="{99754A40-3E9E-4671-A285-8FDB85EEA878}" type="datetime1">
               <a:rPr lang="en-GB" smtClean="0"/>
               <a:pPr/>
-              <a:t>02/08/2011</a:t>
+              <a:t>03/08/2011</a:t>
             </a:fld>
             <a:endParaRPr lang="en-GB"/>
           </a:p>
@@ -6472,6 +6617,200 @@
               <a:rPr lang="en-GB" smtClean="0"/>
               <a:pPr/>
               <a:t>21</a:t>
+            </a:fld>
+            <a:endParaRPr lang="en-GB"/>
+          </a:p>
+        </p:txBody>
+      </p:sp>
+    </p:spTree>
+  </p:cSld>
+  <p:clrMapOvr>
+    <a:masterClrMapping/>
+  </p:clrMapOvr>
+</p:sld>
+</file>
+
+<file path=ppt/slides/slide22.xml><?xml version="1.0" encoding="utf-8"?>
+<p:sld xmlns:a="http://schemas.openxmlformats.org/drawingml/2006/main" xmlns:r="http://schemas.openxmlformats.org/officeDocument/2006/relationships" xmlns:p="http://schemas.openxmlformats.org/presentationml/2006/main">
+  <p:cSld>
+    <p:spTree>
+      <p:nvGrpSpPr>
+        <p:cNvPr id="1" name=""/>
+        <p:cNvGrpSpPr/>
+        <p:nvPr/>
+      </p:nvGrpSpPr>
+      <p:grpSpPr>
+        <a:xfrm>
+          <a:off x="0" y="0"/>
+          <a:ext cx="0" cy="0"/>
+          <a:chOff x="0" y="0"/>
+          <a:chExt cx="0" cy="0"/>
+        </a:xfrm>
+      </p:grpSpPr>
+      <p:sp>
+        <p:nvSpPr>
+          <p:cNvPr id="2" name="Title 1"/>
+          <p:cNvSpPr>
+            <a:spLocks noGrp="1"/>
+          </p:cNvSpPr>
+          <p:nvPr>
+            <p:ph type="title"/>
+          </p:nvPr>
+        </p:nvSpPr>
+        <p:spPr/>
+        <p:txBody>
+          <a:bodyPr/>
+          <a:lstStyle/>
+          <a:p>
+            <a:r>
+              <a:rPr lang="en-GB" dirty="0" smtClean="0"/>
+              <a:t>File format: </a:t>
+            </a:r>
+            <a:r>
+              <a:rPr lang="en-GB" dirty="0" err="1" smtClean="0"/>
+              <a:t>permissions.json</a:t>
+            </a:r>
+            <a:endParaRPr lang="en-GB" dirty="0"/>
+          </a:p>
+        </p:txBody>
+      </p:sp>
+      <p:sp>
+        <p:nvSpPr>
+          <p:cNvPr id="3" name="Content Placeholder 2"/>
+          <p:cNvSpPr>
+            <a:spLocks noGrp="1"/>
+          </p:cNvSpPr>
+          <p:nvPr>
+            <p:ph idx="1"/>
+          </p:nvPr>
+        </p:nvSpPr>
+        <p:spPr/>
+        <p:txBody>
+          <a:bodyPr/>
+          <a:lstStyle/>
+          <a:p>
+            <a:pPr>
+              <a:buNone/>
+            </a:pPr>
+            <a:r>
+              <a:rPr lang="en-GB" dirty="0" smtClean="0"/>
+              <a:t>{</a:t>
+            </a:r>
+          </a:p>
+          <a:p>
+            <a:pPr>
+              <a:buNone/>
+            </a:pPr>
+            <a:r>
+              <a:rPr lang="en-GB" dirty="0" smtClean="0"/>
+              <a:t>	"&lt;username&gt;": [</a:t>
+            </a:r>
+          </a:p>
+          <a:p>
+            <a:pPr>
+              <a:buNone/>
+            </a:pPr>
+            <a:r>
+              <a:rPr lang="en-GB" dirty="0" smtClean="0"/>
+              <a:t>		"&lt;role&gt;", …</a:t>
+            </a:r>
+          </a:p>
+          <a:p>
+            <a:pPr>
+              <a:buNone/>
+            </a:pPr>
+            <a:r>
+              <a:rPr lang="en-GB" dirty="0" smtClean="0"/>
+              <a:t>	], </a:t>
+            </a:r>
+          </a:p>
+          <a:p>
+            <a:pPr>
+              <a:buNone/>
+            </a:pPr>
+            <a:r>
+              <a:rPr lang="en-GB" dirty="0" smtClean="0"/>
+              <a:t>	…</a:t>
+            </a:r>
+          </a:p>
+          <a:p>
+            <a:pPr>
+              <a:buNone/>
+            </a:pPr>
+            <a:r>
+              <a:rPr lang="en-GB" dirty="0" smtClean="0"/>
+              <a:t>}</a:t>
+            </a:r>
+            <a:endParaRPr lang="en-GB" dirty="0"/>
+          </a:p>
+        </p:txBody>
+      </p:sp>
+      <p:sp>
+        <p:nvSpPr>
+          <p:cNvPr id="4" name="Date Placeholder 3"/>
+          <p:cNvSpPr>
+            <a:spLocks noGrp="1"/>
+          </p:cNvSpPr>
+          <p:nvPr>
+            <p:ph type="dt" sz="half" idx="10"/>
+          </p:nvPr>
+        </p:nvSpPr>
+        <p:spPr/>
+        <p:txBody>
+          <a:bodyPr/>
+          <a:lstStyle/>
+          <a:p>
+            <a:fld id="{99754A40-3E9E-4671-A285-8FDB85EEA878}" type="datetime1">
+              <a:rPr lang="en-GB" smtClean="0"/>
+              <a:pPr/>
+              <a:t>03/08/2011</a:t>
+            </a:fld>
+            <a:endParaRPr lang="en-GB"/>
+          </a:p>
+        </p:txBody>
+      </p:sp>
+      <p:sp>
+        <p:nvSpPr>
+          <p:cNvPr id="5" name="Footer Placeholder 4"/>
+          <p:cNvSpPr>
+            <a:spLocks noGrp="1"/>
+          </p:cNvSpPr>
+          <p:nvPr>
+            <p:ph type="ftr" sz="quarter" idx="11"/>
+          </p:nvPr>
+        </p:nvSpPr>
+        <p:spPr/>
+        <p:txBody>
+          <a:bodyPr/>
+          <a:lstStyle/>
+          <a:p>
+            <a:r>
+              <a:rPr lang="en-GB" smtClean="0"/>
+              <a:t>Moodle mod/webctimport</a:t>
+            </a:r>
+            <a:endParaRPr lang="en-GB"/>
+          </a:p>
+        </p:txBody>
+      </p:sp>
+      <p:sp>
+        <p:nvSpPr>
+          <p:cNvPr id="6" name="Slide Number Placeholder 5"/>
+          <p:cNvSpPr>
+            <a:spLocks noGrp="1"/>
+          </p:cNvSpPr>
+          <p:nvPr>
+            <p:ph type="sldNum" sz="quarter" idx="12"/>
+          </p:nvPr>
+        </p:nvSpPr>
+        <p:spPr/>
+        <p:txBody>
+          <a:bodyPr/>
+          <a:lstStyle/>
+          <a:p>
+            <a:fld id="{F43FEFBC-BC93-4024-A70C-E996616B976B}" type="slidenum">
+              <a:rPr lang="en-GB" smtClean="0"/>
+              <a:pPr/>
+              <a:t>22</a:t>
             </a:fld>
             <a:endParaRPr lang="en-GB"/>
           </a:p>
@@ -6573,7 +6912,7 @@
 </p:sld>
 </file>
 
-<file path=ppt/slides/slide22.xml><?xml version="1.0" encoding="utf-8"?>
+<file path=ppt/slides/slide23.xml><?xml version="1.0" encoding="utf-8"?>
 <p:sld xmlns:a="http://schemas.openxmlformats.org/drawingml/2006/main" xmlns:r="http://schemas.openxmlformats.org/officeDocument/2006/relationships" xmlns:p="http://schemas.openxmlformats.org/presentationml/2006/main">
   <p:cSld>
     <p:spTree>
@@ -6630,7 +6969,7 @@
         <p:spPr/>
         <p:txBody>
           <a:bodyPr>
-            <a:normAutofit fontScale="70000" lnSpcReduction="20000"/>
+            <a:normAutofit fontScale="62500" lnSpcReduction="20000"/>
           </a:bodyPr>
           <a:lstStyle/>
           <a:p>
@@ -6725,13 +7064,8 @@
             </a:r>
             <a:r>
               <a:rPr lang="en-GB" dirty="0" smtClean="0"/>
-              <a:t> internal file path</a:t>
-            </a:r>
-            <a:r>
-              <a:rPr lang="en-GB" dirty="0" smtClean="0"/>
-              <a:t>&gt;",</a:t>
-            </a:r>
-            <a:endParaRPr lang="en-GB" dirty="0" smtClean="0"/>
+              <a:t> internal file path&gt;",</a:t>
+            </a:r>
           </a:p>
           <a:p>
             <a:pPr>
@@ -6763,21 +7097,8 @@
                   <a:srgbClr val="FF0000"/>
                 </a:solidFill>
               </a:rPr>
-              <a:t>": "&lt;mime type </a:t>
-            </a:r>
-            <a:r>
-              <a:rPr lang="en-GB" smtClean="0">
-                <a:solidFill>
-                  <a:srgbClr val="FF0000"/>
-                </a:solidFill>
-              </a:rPr>
-              <a:t>if known&gt;",</a:t>
-            </a:r>
-            <a:endParaRPr lang="en-GB" dirty="0" smtClean="0">
-              <a:solidFill>
-                <a:srgbClr val="FF0000"/>
-              </a:solidFill>
-            </a:endParaRPr>
+              <a:t>": "&lt;mime type if known&gt;",</a:t>
+            </a:r>
           </a:p>
           <a:p>
             <a:pPr>
@@ -6795,11 +7116,6 @@
               </a:rPr>
               <a:t>"encoding": "&lt;character set if known&gt;",</a:t>
             </a:r>
-            <a:endParaRPr lang="en-GB" dirty="0" smtClean="0">
-              <a:solidFill>
-                <a:srgbClr val="FF0000"/>
-              </a:solidFill>
-            </a:endParaRPr>
           </a:p>
           <a:p>
             <a:pPr>
@@ -6865,11 +7181,6 @@
               </a:rPr>
               <a:t>, ms&gt;,</a:t>
             </a:r>
-            <a:endParaRPr lang="en-GB" dirty="0" smtClean="0">
-              <a:solidFill>
-                <a:srgbClr val="FF0000"/>
-              </a:solidFill>
-            </a:endParaRPr>
           </a:p>
           <a:p>
             <a:pPr>
@@ -6881,15 +7192,7 @@
                   <a:srgbClr val="FF0000"/>
                 </a:solidFill>
               </a:rPr>
-              <a:t>	</a:t>
-            </a:r>
-            <a:r>
-              <a:rPr lang="en-GB" dirty="0" smtClean="0">
-                <a:solidFill>
-                  <a:srgbClr val="FF0000"/>
-                </a:solidFill>
-              </a:rPr>
-              <a:t>"</a:t>
+              <a:t>	"</a:t>
             </a:r>
             <a:r>
               <a:rPr lang="en-GB" dirty="0" err="1" smtClean="0">
@@ -6923,6 +7226,80 @@
               </a:rPr>
               <a:t> this is a link&gt;",</a:t>
             </a:r>
+          </a:p>
+          <a:p>
+            <a:pPr>
+              <a:buNone/>
+            </a:pPr>
+            <a:r>
+              <a:rPr lang="en-GB" dirty="0" smtClean="0">
+                <a:solidFill>
+                  <a:srgbClr val="FF0000"/>
+                </a:solidFill>
+              </a:rPr>
+              <a:t>	"cachets": &lt;timestamp – cached, ms&gt;,</a:t>
+            </a:r>
+          </a:p>
+          <a:p>
+            <a:pPr>
+              <a:buNone/>
+            </a:pPr>
+            <a:r>
+              <a:rPr lang="en-GB" dirty="0" smtClean="0">
+                <a:solidFill>
+                  <a:srgbClr val="FF0000"/>
+                </a:solidFill>
+              </a:rPr>
+              <a:t>	"</a:t>
+            </a:r>
+            <a:r>
+              <a:rPr lang="en-GB" dirty="0" err="1" smtClean="0">
+                <a:solidFill>
+                  <a:srgbClr val="FF0000"/>
+                </a:solidFill>
+              </a:rPr>
+              <a:t>filecontentid</a:t>
+            </a:r>
+            <a:r>
+              <a:rPr lang="en-GB" dirty="0" smtClean="0">
+                <a:solidFill>
+                  <a:srgbClr val="FF0000"/>
+                </a:solidFill>
+              </a:rPr>
+              <a:t>": &lt;</a:t>
+            </a:r>
+            <a:r>
+              <a:rPr lang="en-GB" dirty="0" err="1" smtClean="0">
+                <a:solidFill>
+                  <a:srgbClr val="FF0000"/>
+                </a:solidFill>
+              </a:rPr>
+              <a:t>webct</a:t>
+            </a:r>
+            <a:r>
+              <a:rPr lang="en-GB" dirty="0" smtClean="0">
+                <a:solidFill>
+                  <a:srgbClr val="FF0000"/>
+                </a:solidFill>
+              </a:rPr>
+              <a:t> </a:t>
+            </a:r>
+            <a:r>
+              <a:rPr lang="en-GB" dirty="0" err="1" smtClean="0">
+                <a:solidFill>
+                  <a:srgbClr val="FF0000"/>
+                </a:solidFill>
+              </a:rPr>
+              <a:t>CmsFileContent</a:t>
+            </a:r>
+            <a:r>
+              <a:rPr lang="en-GB" dirty="0" smtClean="0">
+                <a:solidFill>
+                  <a:srgbClr val="FF0000"/>
+                </a:solidFill>
+              </a:rPr>
+              <a:t> ID&gt;</a:t>
+            </a:r>
             <a:endParaRPr lang="en-GB" dirty="0" smtClean="0">
               <a:solidFill>
                 <a:srgbClr val="FF0000"/>
@@ -6934,51 +7311,6 @@
               <a:buNone/>
             </a:pPr>
             <a:r>
-              <a:rPr lang="en-GB" dirty="0" smtClean="0">
-                <a:solidFill>
-                  <a:srgbClr val="FF0000"/>
-                </a:solidFill>
-              </a:rPr>
-              <a:t>	</a:t>
-            </a:r>
-            <a:r>
-              <a:rPr lang="en-GB" dirty="0" smtClean="0">
-                <a:solidFill>
-                  <a:srgbClr val="FF0000"/>
-                </a:solidFill>
-              </a:rPr>
-              <a:t>"cachets</a:t>
-            </a:r>
-            <a:r>
-              <a:rPr lang="en-GB" dirty="0" smtClean="0">
-                <a:solidFill>
-                  <a:srgbClr val="FF0000"/>
-                </a:solidFill>
-              </a:rPr>
-              <a:t>": </a:t>
-            </a:r>
-            <a:r>
-              <a:rPr lang="en-GB" dirty="0" smtClean="0">
-                <a:solidFill>
-                  <a:srgbClr val="FF0000"/>
-                </a:solidFill>
-              </a:rPr>
-              <a:t>&lt;timestamp – cached, </a:t>
-            </a:r>
-            <a:r>
-              <a:rPr lang="en-GB" dirty="0" smtClean="0">
-                <a:solidFill>
-                  <a:srgbClr val="FF0000"/>
-                </a:solidFill>
-              </a:rPr>
-              <a:t>ms&gt;,</a:t>
-            </a:r>
-          </a:p>
-          <a:p>
-            <a:pPr>
-              <a:buNone/>
-            </a:pPr>
-            <a:r>
               <a:rPr lang="en-GB" dirty="0" smtClean="0"/>
               <a:t>}</a:t>
             </a:r>
@@ -7004,7 +7336,7 @@
             <a:fld id="{99754A40-3E9E-4671-A285-8FDB85EEA878}" type="datetime1">
               <a:rPr lang="en-GB" smtClean="0"/>
               <a:pPr/>
-              <a:t>02/08/2011</a:t>
+              <a:t>03/08/2011</a:t>
             </a:fld>
             <a:endParaRPr lang="en-GB"/>
           </a:p>
@@ -7051,7 +7383,7 @@
             <a:fld id="{F43FEFBC-BC93-4024-A70C-E996616B976B}" type="slidenum">
               <a:rPr lang="en-GB" smtClean="0"/>
               <a:pPr/>
-              <a:t>22</a:t>
+              <a:t>23</a:t>
             </a:fld>
             <a:endParaRPr lang="en-GB"/>
           </a:p>
@@ -7065,13 +7397,13 @@
         </p:nvSpPr>
         <p:spPr>
           <a:xfrm>
-            <a:off x="6876256" y="5589240"/>
+            <a:off x="6660232" y="5805264"/>
             <a:ext cx="2088232" cy="792088"/>
           </a:xfrm>
           <a:prstGeom prst="wedgeRoundRectCallout">
             <a:avLst>
-              <a:gd name="adj1" fmla="val 12465"/>
-              <a:gd name="adj2" fmla="val -74587"/>
+              <a:gd name="adj1" fmla="val 16570"/>
+              <a:gd name="adj2" fmla="val -85410"/>
               <a:gd name="adj3" fmla="val 16667"/>
             </a:avLst>
           </a:prstGeom>
@@ -7099,7 +7431,18 @@
             <a:pPr algn="ctr"/>
             <a:r>
               <a:rPr lang="en-GB" dirty="0" smtClean="0"/>
-              <a:t>Added 2011-08-02</a:t>
+              <a:t>Added </a:t>
+            </a:r>
+            <a:r>
+              <a:rPr lang="en-GB" dirty="0" smtClean="0"/>
+              <a:t>2011-08-02,</a:t>
+            </a:r>
+          </a:p>
+          <a:p>
+            <a:pPr algn="ctr"/>
+            <a:r>
+              <a:rPr lang="en-GB" dirty="0" smtClean="0"/>
+              <a:t>2011-08-03</a:t>
             </a:r>
             <a:endParaRPr lang="en-GB" dirty="0"/>
           </a:p>
@@ -7113,8 +7456,8 @@
         </p:nvSpPr>
         <p:spPr>
           <a:xfrm>
-            <a:off x="8172400" y="4077072"/>
-            <a:ext cx="288032" cy="1296144"/>
+            <a:off x="8028384" y="3933056"/>
+            <a:ext cx="432048" cy="1584176"/>
           </a:xfrm>
           <a:prstGeom prst="rightBrace">
             <a:avLst>
@@ -7142,212 +7485,6 @@
           <a:lstStyle/>
           <a:p>
             <a:pPr algn="ctr"/>
-            <a:endParaRPr lang="en-GB"/>
-          </a:p>
-        </p:txBody>
-      </p:sp>
-    </p:spTree>
-  </p:cSld>
-  <p:clrMapOvr>
-    <a:masterClrMapping/>
-  </p:clrMapOvr>
-</p:sld>
-</file>
-
-<file path=ppt/slides/slide23.xml><?xml version="1.0" encoding="utf-8"?>
-<p:sld xmlns:a="http://schemas.openxmlformats.org/drawingml/2006/main" xmlns:r="http://schemas.openxmlformats.org/officeDocument/2006/relationships" xmlns:p="http://schemas.openxmlformats.org/presentationml/2006/main">
-  <p:cSld>
-    <p:spTree>
-      <p:nvGrpSpPr>
-        <p:cNvPr id="1" name=""/>
-        <p:cNvGrpSpPr/>
-        <p:nvPr/>
-      </p:nvGrpSpPr>
-      <p:grpSpPr>
-        <a:xfrm>
-          <a:off x="0" y="0"/>
-          <a:ext cx="0" cy="0"/>
-          <a:chOff x="0" y="0"/>
-          <a:chExt cx="0" cy="0"/>
-        </a:xfrm>
-      </p:grpSpPr>
-      <p:sp>
-        <p:nvSpPr>
-          <p:cNvPr id="2" name="Title 1"/>
-          <p:cNvSpPr>
-            <a:spLocks noGrp="1"/>
-          </p:cNvSpPr>
-          <p:nvPr>
-            <p:ph type="title"/>
-          </p:nvPr>
-        </p:nvSpPr>
-        <p:spPr/>
-        <p:txBody>
-          <a:bodyPr/>
-          <a:lstStyle/>
-          <a:p>
-            <a:r>
-              <a:rPr lang="en-GB" smtClean="0"/>
-              <a:t>Other cache </a:t>
-            </a:r>
-            <a:r>
-              <a:rPr lang="en-GB" dirty="0" smtClean="0"/>
-              <a:t>files</a:t>
-            </a:r>
-            <a:endParaRPr lang="en-GB" dirty="0"/>
-          </a:p>
-        </p:txBody>
-      </p:sp>
-      <p:sp>
-        <p:nvSpPr>
-          <p:cNvPr id="3" name="Content Placeholder 2"/>
-          <p:cNvSpPr>
-            <a:spLocks noGrp="1"/>
-          </p:cNvSpPr>
-          <p:nvPr>
-            <p:ph idx="1"/>
-          </p:nvPr>
-        </p:nvSpPr>
-        <p:spPr/>
-        <p:txBody>
-          <a:bodyPr>
-            <a:normAutofit fontScale="92500"/>
-          </a:bodyPr>
-          <a:lstStyle/>
-          <a:p>
-            <a:r>
-              <a:rPr lang="en-GB" dirty="0" smtClean="0"/>
-              <a:t>Created by dump process but not used by import:</a:t>
-            </a:r>
-          </a:p>
-          <a:p>
-            <a:pPr lvl="1"/>
-            <a:r>
-              <a:rPr lang="en-GB" dirty="0" err="1" smtClean="0"/>
-              <a:t>done.ts</a:t>
-            </a:r>
-            <a:r>
-              <a:rPr lang="en-GB" dirty="0" smtClean="0"/>
-              <a:t> – created when a folder and all sub-folders have been completely dumped (prevents the folder being re-dumped)</a:t>
-            </a:r>
-          </a:p>
-          <a:p>
-            <a:pPr lvl="1"/>
-            <a:r>
-              <a:rPr lang="en-GB" dirty="0" err="1" smtClean="0"/>
-              <a:t>index.html</a:t>
-            </a:r>
-            <a:r>
-              <a:rPr lang="en-GB" dirty="0" smtClean="0"/>
-              <a:t> – human-readable version of (subset of) </a:t>
-            </a:r>
-            <a:r>
-              <a:rPr lang="en-GB" dirty="0" err="1" smtClean="0"/>
-              <a:t>get_listing.json</a:t>
-            </a:r>
-            <a:endParaRPr lang="en-GB" dirty="0" smtClean="0"/>
-          </a:p>
-          <a:p>
-            <a:pPr lvl="1"/>
-            <a:r>
-              <a:rPr lang="en-GB" dirty="0" err="1" smtClean="0"/>
-              <a:t>permissions.html</a:t>
-            </a:r>
-            <a:r>
-              <a:rPr lang="en-GB" dirty="0" smtClean="0"/>
-              <a:t> – human-readable version of </a:t>
-            </a:r>
-            <a:r>
-              <a:rPr lang="en-GB" dirty="0" err="1" smtClean="0"/>
-              <a:t>permissions.json</a:t>
-            </a:r>
-            <a:endParaRPr lang="en-GB" dirty="0" smtClean="0"/>
-          </a:p>
-          <a:p>
-            <a:pPr lvl="1"/>
-            <a:r>
-              <a:rPr lang="en-GB" dirty="0" err="1" smtClean="0"/>
-              <a:t>file.html</a:t>
-            </a:r>
-            <a:r>
-              <a:rPr lang="en-GB" dirty="0" smtClean="0"/>
-              <a:t> – human-readable version of (subset of) </a:t>
-            </a:r>
-            <a:r>
-              <a:rPr lang="en-GB" dirty="0" err="1" smtClean="0"/>
-              <a:t>file.json</a:t>
-            </a:r>
-            <a:endParaRPr lang="en-GB" dirty="0"/>
-          </a:p>
-        </p:txBody>
-      </p:sp>
-      <p:sp>
-        <p:nvSpPr>
-          <p:cNvPr id="4" name="Date Placeholder 3"/>
-          <p:cNvSpPr>
-            <a:spLocks noGrp="1"/>
-          </p:cNvSpPr>
-          <p:nvPr>
-            <p:ph type="dt" sz="half" idx="10"/>
-          </p:nvPr>
-        </p:nvSpPr>
-        <p:spPr/>
-        <p:txBody>
-          <a:bodyPr/>
-          <a:lstStyle/>
-          <a:p>
-            <a:fld id="{99754A40-3E9E-4671-A285-8FDB85EEA878}" type="datetime1">
-              <a:rPr lang="en-GB" smtClean="0"/>
-              <a:pPr/>
-              <a:t>02/08/2011</a:t>
-            </a:fld>
-            <a:endParaRPr lang="en-GB"/>
-          </a:p>
-        </p:txBody>
-      </p:sp>
-      <p:sp>
-        <p:nvSpPr>
-          <p:cNvPr id="5" name="Footer Placeholder 4"/>
-          <p:cNvSpPr>
-            <a:spLocks noGrp="1"/>
-          </p:cNvSpPr>
-          <p:nvPr>
-            <p:ph type="ftr" sz="quarter" idx="11"/>
-          </p:nvPr>
-        </p:nvSpPr>
-        <p:spPr/>
-        <p:txBody>
-          <a:bodyPr/>
-          <a:lstStyle/>
-          <a:p>
-            <a:r>
-              <a:rPr lang="en-GB" smtClean="0"/>
-              <a:t>Moodle mod/webctimport</a:t>
-            </a:r>
-            <a:endParaRPr lang="en-GB"/>
-          </a:p>
-        </p:txBody>
-      </p:sp>
-      <p:sp>
-        <p:nvSpPr>
-          <p:cNvPr id="6" name="Slide Number Placeholder 5"/>
-          <p:cNvSpPr>
-            <a:spLocks noGrp="1"/>
-          </p:cNvSpPr>
-          <p:nvPr>
-            <p:ph type="sldNum" sz="quarter" idx="12"/>
-          </p:nvPr>
-        </p:nvSpPr>
-        <p:spPr/>
-        <p:txBody>
-          <a:bodyPr/>
-          <a:lstStyle/>
-          <a:p>
-            <a:fld id="{F43FEFBC-BC93-4024-A70C-E996616B976B}" type="slidenum">
-              <a:rPr lang="en-GB" smtClean="0"/>
-              <a:pPr/>
-              <a:t>23</a:t>
-            </a:fld>
             <a:endParaRPr lang="en-GB"/>
           </a:p>
         </p:txBody>
@@ -7393,8 +7530,12 @@
           <a:lstStyle/>
           <a:p>
             <a:r>
-              <a:rPr lang="en-GB" dirty="0" smtClean="0"/>
-              <a:t>Notes / issues</a:t>
+              <a:rPr lang="en-GB" smtClean="0"/>
+              <a:t>Other cache </a:t>
+            </a:r>
+            <a:r>
+              <a:rPr lang="en-GB" dirty="0" smtClean="0"/>
+              <a:t>files</a:t>
             </a:r>
             <a:endParaRPr lang="en-GB" dirty="0"/>
           </a:p>
@@ -7413,65 +7554,72 @@
         <p:spPr/>
         <p:txBody>
           <a:bodyPr>
-            <a:normAutofit lnSpcReduction="10000"/>
+            <a:normAutofit fontScale="92500"/>
           </a:bodyPr>
           <a:lstStyle/>
           <a:p>
             <a:r>
+              <a:rPr lang="en-GB" dirty="0" smtClean="0"/>
+              <a:t>Created by dump process but not used by import:</a:t>
+            </a:r>
+          </a:p>
+          <a:p>
+            <a:pPr lvl="1"/>
+            <a:r>
+              <a:rPr lang="en-GB" dirty="0" err="1" smtClean="0"/>
+              <a:t>done.ts</a:t>
+            </a:r>
+            <a:r>
+              <a:rPr lang="en-GB" dirty="0" smtClean="0"/>
+              <a:t> – created when a folder and all sub-folders have been completely dumped (prevents the folder being re-dumped)</a:t>
+            </a:r>
+          </a:p>
+          <a:p>
+            <a:pPr lvl="1"/>
+            <a:r>
+              <a:rPr lang="en-GB" dirty="0" err="1" smtClean="0"/>
+              <a:t>index.html</a:t>
+            </a:r>
+            <a:r>
+              <a:rPr lang="en-GB" dirty="0" smtClean="0"/>
+              <a:t> – human-readable version of (subset of) </a:t>
+            </a:r>
+            <a:r>
+              <a:rPr lang="en-GB" dirty="0" err="1" smtClean="0"/>
+              <a:t>get_listing.json</a:t>
+            </a:r>
+            <a:endParaRPr lang="en-GB" dirty="0" smtClean="0"/>
+          </a:p>
+          <a:p>
+            <a:pPr lvl="1"/>
+            <a:r>
+              <a:rPr lang="en-GB" dirty="0" err="1" smtClean="0"/>
+              <a:t>permissions.html</a:t>
+            </a:r>
+            <a:r>
+              <a:rPr lang="en-GB" dirty="0" smtClean="0"/>
+              <a:t> – human-readable version of </a:t>
+            </a:r>
+            <a:r>
+              <a:rPr lang="en-GB" dirty="0" err="1" smtClean="0"/>
+              <a:t>permissions.json</a:t>
+            </a:r>
+            <a:endParaRPr lang="en-GB" dirty="0" smtClean="0"/>
+          </a:p>
+          <a:p>
+            <a:pPr lvl="1"/>
+            <a:r>
+              <a:rPr lang="en-GB" dirty="0" err="1" smtClean="0"/>
+              <a:t>file.html</a:t>
+            </a:r>
+            <a:r>
+              <a:rPr lang="en-GB" dirty="0" smtClean="0"/>
+              <a:t> – human-readable version of (subset of) </a:t>
+            </a:r>
+            <a:r>
               <a:rPr lang="en-GB" dirty="0" err="1" smtClean="0"/>
               <a:t>file.json</a:t>
             </a:r>
-            <a:r>
-              <a:rPr lang="en-GB" dirty="0" smtClean="0"/>
-              <a:t> should probably include </a:t>
-            </a:r>
-            <a:r>
-              <a:rPr lang="en-GB" dirty="0" err="1" smtClean="0"/>
-              <a:t>mimetype</a:t>
-            </a:r>
-            <a:r>
-              <a:rPr lang="en-GB" dirty="0" smtClean="0"/>
-              <a:t> information from </a:t>
-            </a:r>
-            <a:r>
-              <a:rPr lang="en-GB" dirty="0" err="1" smtClean="0"/>
-              <a:t>WebCT</a:t>
-            </a:r>
-            <a:endParaRPr lang="en-GB" dirty="0" smtClean="0"/>
-          </a:p>
-          <a:p>
-            <a:r>
-              <a:rPr lang="en-GB" dirty="0" err="1" smtClean="0"/>
-              <a:t>file.json</a:t>
-            </a:r>
-            <a:r>
-              <a:rPr lang="en-GB" dirty="0" smtClean="0"/>
-              <a:t> should probably include link property which tries to map a </a:t>
-            </a:r>
-            <a:r>
-              <a:rPr lang="en-GB" dirty="0" err="1" smtClean="0"/>
-              <a:t>CmsEntry</a:t>
-            </a:r>
-            <a:r>
-              <a:rPr lang="en-GB" dirty="0" smtClean="0"/>
-              <a:t> which is a link to a file to the corresponding file entry, to avoid unnecessary re-fetching of the file content</a:t>
-            </a:r>
-          </a:p>
-          <a:p>
-            <a:r>
-              <a:rPr lang="en-GB" dirty="0" smtClean="0"/>
-              <a:t>Various bugs in </a:t>
-            </a:r>
-            <a:r>
-              <a:rPr lang="en-GB" dirty="0" err="1" smtClean="0"/>
-              <a:t>mod_form.php</a:t>
-            </a:r>
-            <a:r>
-              <a:rPr lang="en-GB" dirty="0" smtClean="0"/>
-              <a:t> for view and update?!</a:t>
-            </a:r>
-          </a:p>
-          <a:p>
             <a:endParaRPr lang="en-GB" dirty="0"/>
           </a:p>
         </p:txBody>
@@ -7494,7 +7642,7 @@
             <a:fld id="{99754A40-3E9E-4671-A285-8FDB85EEA878}" type="datetime1">
               <a:rPr lang="en-GB" smtClean="0"/>
               <a:pPr/>
-              <a:t>02/08/2011</a:t>
+              <a:t>03/08/2011</a:t>
             </a:fld>
             <a:endParaRPr lang="en-GB"/>
           </a:p>
@@ -7588,12 +7736,8 @@
           <a:lstStyle/>
           <a:p>
             <a:r>
-              <a:rPr lang="en-GB" dirty="0" err="1" smtClean="0"/>
-              <a:t>Moodle</a:t>
-            </a:r>
-            <a:r>
-              <a:rPr lang="en-GB" dirty="0" smtClean="0"/>
-              <a:t> file table notes</a:t>
+              <a:rPr lang="en-GB" dirty="0" smtClean="0"/>
+              <a:t>Notes / issues</a:t>
             </a:r>
             <a:endParaRPr lang="en-GB" dirty="0"/>
           </a:p>
@@ -7611,83 +7755,18 @@
         </p:nvSpPr>
         <p:spPr/>
         <p:txBody>
-          <a:bodyPr/>
-          <a:lstStyle/>
-          <a:p>
-            <a:r>
-              <a:rPr lang="en-GB" dirty="0" smtClean="0"/>
-              <a:t>Columns include:</a:t>
-            </a:r>
-          </a:p>
-          <a:p>
-            <a:pPr lvl="1"/>
-            <a:r>
-              <a:rPr lang="en-GB" dirty="0" smtClean="0"/>
-              <a:t>id, </a:t>
-            </a:r>
-            <a:r>
-              <a:rPr lang="en-GB" dirty="0" err="1" smtClean="0"/>
-              <a:t>contenthash</a:t>
-            </a:r>
-            <a:r>
-              <a:rPr lang="en-GB" dirty="0" smtClean="0"/>
-              <a:t>, </a:t>
-            </a:r>
-            <a:r>
-              <a:rPr lang="en-GB" dirty="0" err="1" smtClean="0"/>
-              <a:t>pathnamehash</a:t>
-            </a:r>
-            <a:r>
-              <a:rPr lang="en-GB" dirty="0" smtClean="0"/>
-              <a:t>, </a:t>
-            </a:r>
-            <a:r>
-              <a:rPr lang="en-GB" dirty="0" err="1" smtClean="0"/>
-              <a:t>contextid</a:t>
-            </a:r>
-            <a:r>
-              <a:rPr lang="en-GB" dirty="0" smtClean="0"/>
-              <a:t>, component, </a:t>
-            </a:r>
-            <a:r>
-              <a:rPr lang="en-GB" dirty="0" err="1" smtClean="0"/>
-              <a:t>filearea</a:t>
-            </a:r>
-            <a:r>
-              <a:rPr lang="en-GB" dirty="0" smtClean="0"/>
-              <a:t>, </a:t>
-            </a:r>
-            <a:r>
-              <a:rPr lang="en-GB" dirty="0" err="1" smtClean="0"/>
-              <a:t>itemid</a:t>
-            </a:r>
-            <a:r>
-              <a:rPr lang="en-GB" dirty="0" smtClean="0"/>
-              <a:t>, </a:t>
-            </a:r>
-            <a:r>
-              <a:rPr lang="en-GB" dirty="0" err="1" smtClean="0"/>
-              <a:t>filepath</a:t>
-            </a:r>
-            <a:r>
-              <a:rPr lang="en-GB" dirty="0" smtClean="0"/>
-              <a:t>, filename, </a:t>
-            </a:r>
-            <a:r>
-              <a:rPr lang="en-GB" dirty="0" err="1" smtClean="0"/>
-              <a:t>userid</a:t>
-            </a:r>
-            <a:r>
-              <a:rPr lang="en-GB" dirty="0" smtClean="0"/>
-              <a:t> (opt), </a:t>
-            </a:r>
-            <a:r>
-              <a:rPr lang="en-GB" dirty="0" err="1" smtClean="0"/>
-              <a:t>filesize</a:t>
-            </a:r>
-            <a:r>
-              <a:rPr lang="en-GB" dirty="0" smtClean="0"/>
-              <a:t>, </a:t>
+          <a:bodyPr>
+            <a:normAutofit lnSpcReduction="10000"/>
+          </a:bodyPr>
+          <a:lstStyle/>
+          <a:p>
+            <a:r>
+              <a:rPr lang="en-GB" dirty="0" err="1" smtClean="0"/>
+              <a:t>file.json</a:t>
+            </a:r>
+            <a:r>
+              <a:rPr lang="en-GB" dirty="0" smtClean="0"/>
+              <a:t> should probably include </a:t>
             </a:r>
             <a:r>
               <a:rPr lang="en-GB" dirty="0" err="1" smtClean="0"/>
@@ -7695,28 +7774,47 @@
             </a:r>
             <a:r>
               <a:rPr lang="en-GB" dirty="0" smtClean="0"/>
-              <a:t> (opt), status, source (opt), author (opt), license (opt), </a:t>
-            </a:r>
-            <a:r>
-              <a:rPr lang="en-GB" dirty="0" err="1" smtClean="0"/>
-              <a:t>timecreated</a:t>
-            </a:r>
-            <a:r>
-              <a:rPr lang="en-GB" dirty="0" smtClean="0"/>
-              <a:t>, </a:t>
-            </a:r>
-            <a:r>
-              <a:rPr lang="en-GB" dirty="0" err="1" smtClean="0"/>
-              <a:t>timemodified</a:t>
+              <a:t> information from </a:t>
+            </a:r>
+            <a:r>
+              <a:rPr lang="en-GB" dirty="0" err="1" smtClean="0"/>
+              <a:t>WebCT</a:t>
             </a:r>
             <a:endParaRPr lang="en-GB" dirty="0" smtClean="0"/>
           </a:p>
           <a:p>
-            <a:pPr lvl="1"/>
-            <a:r>
-              <a:rPr lang="en-GB" dirty="0" smtClean="0"/>
-              <a:t>Repository interface gives form view to populate (alt.) filename, author (text) and license (from drop-down list)</a:t>
-            </a:r>
+            <a:r>
+              <a:rPr lang="en-GB" dirty="0" err="1" smtClean="0"/>
+              <a:t>file.json</a:t>
+            </a:r>
+            <a:r>
+              <a:rPr lang="en-GB" dirty="0" smtClean="0"/>
+              <a:t> should probably include link property which tries to map a </a:t>
+            </a:r>
+            <a:r>
+              <a:rPr lang="en-GB" dirty="0" err="1" smtClean="0"/>
+              <a:t>CmsEntry</a:t>
+            </a:r>
+            <a:r>
+              <a:rPr lang="en-GB" dirty="0" smtClean="0"/>
+              <a:t> which is a link to a file to the corresponding file entry, to avoid unnecessary re-fetching of the file content</a:t>
+            </a:r>
+          </a:p>
+          <a:p>
+            <a:r>
+              <a:rPr lang="en-GB" dirty="0" smtClean="0"/>
+              <a:t>Various bugs in </a:t>
+            </a:r>
+            <a:r>
+              <a:rPr lang="en-GB" dirty="0" err="1" smtClean="0"/>
+              <a:t>mod_form.php</a:t>
+            </a:r>
+            <a:r>
+              <a:rPr lang="en-GB" dirty="0" smtClean="0"/>
+              <a:t> for view and update?!</a:t>
+            </a:r>
+          </a:p>
+          <a:p>
             <a:endParaRPr lang="en-GB" dirty="0"/>
           </a:p>
         </p:txBody>
@@ -7739,7 +7837,7 @@
             <a:fld id="{99754A40-3E9E-4671-A285-8FDB85EEA878}" type="datetime1">
               <a:rPr lang="en-GB" smtClean="0"/>
               <a:pPr/>
-              <a:t>02/08/2011</a:t>
+              <a:t>03/08/2011</a:t>
             </a:fld>
             <a:endParaRPr lang="en-GB"/>
           </a:p>
@@ -7787,6 +7885,251 @@
               <a:rPr lang="en-GB" smtClean="0"/>
               <a:pPr/>
               <a:t>25</a:t>
+            </a:fld>
+            <a:endParaRPr lang="en-GB"/>
+          </a:p>
+        </p:txBody>
+      </p:sp>
+    </p:spTree>
+  </p:cSld>
+  <p:clrMapOvr>
+    <a:masterClrMapping/>
+  </p:clrMapOvr>
+</p:sld>
+</file>
+
+<file path=ppt/slides/slide26.xml><?xml version="1.0" encoding="utf-8"?>
+<p:sld xmlns:a="http://schemas.openxmlformats.org/drawingml/2006/main" xmlns:r="http://schemas.openxmlformats.org/officeDocument/2006/relationships" xmlns:p="http://schemas.openxmlformats.org/presentationml/2006/main">
+  <p:cSld>
+    <p:spTree>
+      <p:nvGrpSpPr>
+        <p:cNvPr id="1" name=""/>
+        <p:cNvGrpSpPr/>
+        <p:nvPr/>
+      </p:nvGrpSpPr>
+      <p:grpSpPr>
+        <a:xfrm>
+          <a:off x="0" y="0"/>
+          <a:ext cx="0" cy="0"/>
+          <a:chOff x="0" y="0"/>
+          <a:chExt cx="0" cy="0"/>
+        </a:xfrm>
+      </p:grpSpPr>
+      <p:sp>
+        <p:nvSpPr>
+          <p:cNvPr id="2" name="Title 1"/>
+          <p:cNvSpPr>
+            <a:spLocks noGrp="1"/>
+          </p:cNvSpPr>
+          <p:nvPr>
+            <p:ph type="title"/>
+          </p:nvPr>
+        </p:nvSpPr>
+        <p:spPr/>
+        <p:txBody>
+          <a:bodyPr/>
+          <a:lstStyle/>
+          <a:p>
+            <a:r>
+              <a:rPr lang="en-GB" dirty="0" err="1" smtClean="0"/>
+              <a:t>Moodle</a:t>
+            </a:r>
+            <a:r>
+              <a:rPr lang="en-GB" dirty="0" smtClean="0"/>
+              <a:t> file table notes</a:t>
+            </a:r>
+            <a:endParaRPr lang="en-GB" dirty="0"/>
+          </a:p>
+        </p:txBody>
+      </p:sp>
+      <p:sp>
+        <p:nvSpPr>
+          <p:cNvPr id="3" name="Content Placeholder 2"/>
+          <p:cNvSpPr>
+            <a:spLocks noGrp="1"/>
+          </p:cNvSpPr>
+          <p:nvPr>
+            <p:ph idx="1"/>
+          </p:nvPr>
+        </p:nvSpPr>
+        <p:spPr/>
+        <p:txBody>
+          <a:bodyPr/>
+          <a:lstStyle/>
+          <a:p>
+            <a:r>
+              <a:rPr lang="en-GB" dirty="0" smtClean="0"/>
+              <a:t>Columns include:</a:t>
+            </a:r>
+          </a:p>
+          <a:p>
+            <a:pPr lvl="1"/>
+            <a:r>
+              <a:rPr lang="en-GB" dirty="0" smtClean="0"/>
+              <a:t>id, </a:t>
+            </a:r>
+            <a:r>
+              <a:rPr lang="en-GB" dirty="0" err="1" smtClean="0"/>
+              <a:t>contenthash</a:t>
+            </a:r>
+            <a:r>
+              <a:rPr lang="en-GB" dirty="0" smtClean="0"/>
+              <a:t>, </a:t>
+            </a:r>
+            <a:r>
+              <a:rPr lang="en-GB" dirty="0" err="1" smtClean="0"/>
+              <a:t>pathnamehash</a:t>
+            </a:r>
+            <a:r>
+              <a:rPr lang="en-GB" dirty="0" smtClean="0"/>
+              <a:t>, </a:t>
+            </a:r>
+            <a:r>
+              <a:rPr lang="en-GB" dirty="0" err="1" smtClean="0"/>
+              <a:t>contextid</a:t>
+            </a:r>
+            <a:r>
+              <a:rPr lang="en-GB" dirty="0" smtClean="0"/>
+              <a:t>, component, </a:t>
+            </a:r>
+            <a:r>
+              <a:rPr lang="en-GB" dirty="0" err="1" smtClean="0"/>
+              <a:t>filearea</a:t>
+            </a:r>
+            <a:r>
+              <a:rPr lang="en-GB" dirty="0" smtClean="0"/>
+              <a:t>, </a:t>
+            </a:r>
+            <a:r>
+              <a:rPr lang="en-GB" dirty="0" err="1" smtClean="0"/>
+              <a:t>itemid</a:t>
+            </a:r>
+            <a:r>
+              <a:rPr lang="en-GB" dirty="0" smtClean="0"/>
+              <a:t>, </a:t>
+            </a:r>
+            <a:r>
+              <a:rPr lang="en-GB" dirty="0" err="1" smtClean="0"/>
+              <a:t>filepath</a:t>
+            </a:r>
+            <a:r>
+              <a:rPr lang="en-GB" dirty="0" smtClean="0"/>
+              <a:t>, filename, </a:t>
+            </a:r>
+            <a:r>
+              <a:rPr lang="en-GB" dirty="0" err="1" smtClean="0"/>
+              <a:t>userid</a:t>
+            </a:r>
+            <a:r>
+              <a:rPr lang="en-GB" dirty="0" smtClean="0"/>
+              <a:t> (opt), </a:t>
+            </a:r>
+            <a:r>
+              <a:rPr lang="en-GB" dirty="0" err="1" smtClean="0"/>
+              <a:t>filesize</a:t>
+            </a:r>
+            <a:r>
+              <a:rPr lang="en-GB" dirty="0" smtClean="0"/>
+              <a:t>, </a:t>
+            </a:r>
+            <a:r>
+              <a:rPr lang="en-GB" dirty="0" err="1" smtClean="0"/>
+              <a:t>mimetype</a:t>
+            </a:r>
+            <a:r>
+              <a:rPr lang="en-GB" dirty="0" smtClean="0"/>
+              <a:t> (opt), status, source (opt), author (opt), license (opt), </a:t>
+            </a:r>
+            <a:r>
+              <a:rPr lang="en-GB" dirty="0" err="1" smtClean="0"/>
+              <a:t>timecreated</a:t>
+            </a:r>
+            <a:r>
+              <a:rPr lang="en-GB" dirty="0" smtClean="0"/>
+              <a:t>, </a:t>
+            </a:r>
+            <a:r>
+              <a:rPr lang="en-GB" dirty="0" err="1" smtClean="0"/>
+              <a:t>timemodified</a:t>
+            </a:r>
+            <a:endParaRPr lang="en-GB" dirty="0" smtClean="0"/>
+          </a:p>
+          <a:p>
+            <a:pPr lvl="1"/>
+            <a:r>
+              <a:rPr lang="en-GB" dirty="0" smtClean="0"/>
+              <a:t>Repository interface gives form view to populate (alt.) filename, author (text) and license (from drop-down list)</a:t>
+            </a:r>
+            <a:endParaRPr lang="en-GB" dirty="0"/>
+          </a:p>
+        </p:txBody>
+      </p:sp>
+      <p:sp>
+        <p:nvSpPr>
+          <p:cNvPr id="4" name="Date Placeholder 3"/>
+          <p:cNvSpPr>
+            <a:spLocks noGrp="1"/>
+          </p:cNvSpPr>
+          <p:nvPr>
+            <p:ph type="dt" sz="half" idx="10"/>
+          </p:nvPr>
+        </p:nvSpPr>
+        <p:spPr/>
+        <p:txBody>
+          <a:bodyPr/>
+          <a:lstStyle/>
+          <a:p>
+            <a:fld id="{99754A40-3E9E-4671-A285-8FDB85EEA878}" type="datetime1">
+              <a:rPr lang="en-GB" smtClean="0"/>
+              <a:pPr/>
+              <a:t>03/08/2011</a:t>
+            </a:fld>
+            <a:endParaRPr lang="en-GB"/>
+          </a:p>
+        </p:txBody>
+      </p:sp>
+      <p:sp>
+        <p:nvSpPr>
+          <p:cNvPr id="5" name="Footer Placeholder 4"/>
+          <p:cNvSpPr>
+            <a:spLocks noGrp="1"/>
+          </p:cNvSpPr>
+          <p:nvPr>
+            <p:ph type="ftr" sz="quarter" idx="11"/>
+          </p:nvPr>
+        </p:nvSpPr>
+        <p:spPr/>
+        <p:txBody>
+          <a:bodyPr/>
+          <a:lstStyle/>
+          <a:p>
+            <a:r>
+              <a:rPr lang="en-GB" smtClean="0"/>
+              <a:t>Moodle mod/webctimport</a:t>
+            </a:r>
+            <a:endParaRPr lang="en-GB"/>
+          </a:p>
+        </p:txBody>
+      </p:sp>
+      <p:sp>
+        <p:nvSpPr>
+          <p:cNvPr id="6" name="Slide Number Placeholder 5"/>
+          <p:cNvSpPr>
+            <a:spLocks noGrp="1"/>
+          </p:cNvSpPr>
+          <p:nvPr>
+            <p:ph type="sldNum" sz="quarter" idx="12"/>
+          </p:nvPr>
+        </p:nvSpPr>
+        <p:spPr/>
+        <p:txBody>
+          <a:bodyPr/>
+          <a:lstStyle/>
+          <a:p>
+            <a:fld id="{F43FEFBC-BC93-4024-A70C-E996616B976B}" type="slidenum">
+              <a:rPr lang="en-GB" smtClean="0"/>
+              <a:pPr/>
+              <a:t>26</a:t>
             </a:fld>
             <a:endParaRPr lang="en-GB"/>
           </a:p>
@@ -8111,7 +8454,7 @@
             <a:fld id="{48739D44-3675-4B82-B958-123741CA0F3F}" type="datetime1">
               <a:rPr lang="en-GB" smtClean="0"/>
               <a:pPr/>
-              <a:t>02/08/2011</a:t>
+              <a:t>03/08/2011</a:t>
             </a:fld>
             <a:endParaRPr lang="en-GB"/>
           </a:p>
@@ -8516,7 +8859,7 @@
             <a:fld id="{419BC472-90E9-4CF6-A7E5-7CBCDB001AFB}" type="datetime1">
               <a:rPr lang="en-GB" smtClean="0"/>
               <a:pPr/>
-              <a:t>02/08/2011</a:t>
+              <a:t>03/08/2011</a:t>
             </a:fld>
             <a:endParaRPr lang="en-GB"/>
           </a:p>
@@ -8891,7 +9234,7 @@
             <a:fld id="{DC153228-D550-42DF-BB33-D50F94922FDF}" type="datetime1">
               <a:rPr lang="en-GB" smtClean="0"/>
               <a:pPr/>
-              <a:t>02/08/2011</a:t>
+              <a:t>03/08/2011</a:t>
             </a:fld>
             <a:endParaRPr lang="en-GB"/>
           </a:p>
@@ -9069,7 +9412,7 @@
             <a:fld id="{D33E32D2-9B00-4BC7-8088-C9F213108F66}" type="datetime1">
               <a:rPr lang="en-GB" smtClean="0"/>
               <a:pPr/>
-              <a:t>02/08/2011</a:t>
+              <a:t>03/08/2011</a:t>
             </a:fld>
             <a:endParaRPr lang="en-GB"/>
           </a:p>
@@ -9226,7 +9569,7 @@
             <a:fld id="{69FFEAA8-149E-4FD6-BF3E-86240B10BB88}" type="datetime1">
               <a:rPr lang="en-GB" smtClean="0"/>
               <a:pPr/>
-              <a:t>02/08/2011</a:t>
+              <a:t>03/08/2011</a:t>
             </a:fld>
             <a:endParaRPr lang="en-GB"/>
           </a:p>
@@ -9377,7 +9720,7 @@
             <a:fld id="{7D843E30-C87E-4571-A657-C1E63936A567}" type="datetime1">
               <a:rPr lang="en-GB" smtClean="0"/>
               <a:pPr/>
-              <a:t>02/08/2011</a:t>
+              <a:t>03/08/2011</a:t>
             </a:fld>
             <a:endParaRPr lang="en-GB"/>
           </a:p>
@@ -9528,7 +9871,7 @@
             <a:fld id="{6255D6B8-6007-4958-B20D-C491E567D5AC}" type="datetime1">
               <a:rPr lang="en-GB" smtClean="0"/>
               <a:pPr/>
-              <a:t>02/08/2011</a:t>
+              <a:t>03/08/2011</a:t>
             </a:fld>
             <a:endParaRPr lang="en-GB"/>
           </a:p>

</xml_diff>

<commit_message>
minor udpates to docs
</commit_message>
<xml_diff>
--- a/docs/readme_development.pptx
+++ b/docs/readme_development.pptx
@@ -3542,7 +3542,7 @@
           <a:p>
             <a:r>
               <a:rPr lang="en-GB" dirty="0" smtClean="0"/>
-              <a:t>2011-08-02</a:t>
+              <a:t>2011-08-02, updated 2011-08-03</a:t>
             </a:r>
             <a:endParaRPr lang="en-GB" dirty="0"/>
           </a:p>
@@ -3729,35 +3729,34 @@
               <a:rPr lang="en-GB" dirty="0" smtClean="0"/>
               <a:t>”, to dump/files &amp; dump/folders</a:t>
             </a:r>
+          </a:p>
+          <a:p>
+            <a:pPr lvl="2"/>
+            <a:r>
+              <a:rPr lang="en-GB" dirty="0" smtClean="0"/>
+              <a:t>Optional command line list of user(</a:t>
+            </a:r>
+            <a:r>
+              <a:rPr lang="en-GB" dirty="0" err="1" smtClean="0"/>
+              <a:t>s</a:t>
+            </a:r>
+            <a:r>
+              <a:rPr lang="en-GB" dirty="0" smtClean="0"/>
+              <a:t>) to dump; by default attempts to dump ALL users</a:t>
+            </a:r>
+          </a:p>
+          <a:p>
+            <a:pPr lvl="1"/>
+            <a:r>
+              <a:rPr lang="en-GB" dirty="0" err="1" smtClean="0"/>
+              <a:t>webctdbexport.jdbc.DumpAll</a:t>
+            </a:r>
             <a:endParaRPr lang="en-GB" dirty="0" smtClean="0"/>
           </a:p>
           <a:p>
             <a:pPr lvl="2"/>
             <a:r>
               <a:rPr lang="en-GB" dirty="0" smtClean="0"/>
-              <a:t>Optional command line list of user(</a:t>
-            </a:r>
-            <a:r>
-              <a:rPr lang="en-GB" dirty="0" err="1" smtClean="0"/>
-              <a:t>s</a:t>
-            </a:r>
-            <a:r>
-              <a:rPr lang="en-GB" dirty="0" smtClean="0"/>
-              <a:t>) to dump; by default attempts to dump ALL users</a:t>
-            </a:r>
-          </a:p>
-          <a:p>
-            <a:pPr lvl="1"/>
-            <a:r>
-              <a:rPr lang="en-GB" dirty="0" err="1" smtClean="0"/>
-              <a:t>webctdbexport.jdbc.DumpAll</a:t>
-            </a:r>
-            <a:endParaRPr lang="en-GB" dirty="0" smtClean="0"/>
-          </a:p>
-          <a:p>
-            <a:pPr lvl="2"/>
-            <a:r>
-              <a:rPr lang="en-GB" dirty="0" smtClean="0"/>
               <a:t>Ant target “</a:t>
             </a:r>
             <a:r>
@@ -3768,7 +3767,6 @@
               <a:rPr lang="en-GB" dirty="0" smtClean="0"/>
               <a:t>”, to dump/files &amp; dump/folders</a:t>
             </a:r>
-            <a:endParaRPr lang="en-GB" dirty="0" smtClean="0"/>
           </a:p>
           <a:p>
             <a:pPr lvl="2"/>
@@ -4120,10 +4118,6 @@
               </a:rPr>
               <a:t>…</a:t>
             </a:r>
-            <a:endParaRPr lang="en-GB" dirty="0" smtClean="0">
-              <a:latin typeface="Courier New" pitchFamily="49" charset="0"/>
-              <a:cs typeface="Courier New" pitchFamily="49" charset="0"/>
-            </a:endParaRPr>
           </a:p>
           <a:p>
             <a:pPr lvl="1"/>
@@ -7300,11 +7294,6 @@
               </a:rPr>
               <a:t> ID&gt;</a:t>
             </a:r>
-            <a:endParaRPr lang="en-GB" dirty="0" smtClean="0">
-              <a:solidFill>
-                <a:srgbClr val="FF0000"/>
-              </a:solidFill>
-            </a:endParaRPr>
           </a:p>
           <a:p>
             <a:pPr>
@@ -7431,11 +7420,7 @@
             <a:pPr algn="ctr"/>
             <a:r>
               <a:rPr lang="en-GB" dirty="0" smtClean="0"/>
-              <a:t>Added </a:t>
-            </a:r>
-            <a:r>
-              <a:rPr lang="en-GB" dirty="0" smtClean="0"/>
-              <a:t>2011-08-02,</a:t>
+              <a:t>Added 2011-08-02,</a:t>
             </a:r>
           </a:p>
           <a:p>
@@ -8589,7 +8574,7 @@
         <p:spPr/>
         <p:txBody>
           <a:bodyPr>
-            <a:normAutofit fontScale="85000" lnSpcReduction="20000"/>
+            <a:normAutofit fontScale="85000" lnSpcReduction="10000"/>
           </a:bodyPr>
           <a:lstStyle/>
           <a:p>
@@ -8745,7 +8730,7 @@
         <p:spPr/>
         <p:txBody>
           <a:bodyPr>
-            <a:normAutofit fontScale="85000" lnSpcReduction="20000"/>
+            <a:normAutofit fontScale="85000" lnSpcReduction="10000"/>
           </a:bodyPr>
           <a:lstStyle/>
           <a:p>
@@ -8769,75 +8754,84 @@
             <a:pPr lvl="2"/>
             <a:r>
               <a:rPr lang="en-GB" dirty="0" smtClean="0"/>
-              <a:t>N.B. originally was file CONTENT path</a:t>
-            </a:r>
-          </a:p>
-          <a:p>
-            <a:r>
-              <a:rPr lang="en-GB" dirty="0" smtClean="0"/>
-              <a:t>Not currently used:</a:t>
+              <a:t>N.B. originally was file CONTENT </a:t>
+            </a:r>
+            <a:r>
+              <a:rPr lang="en-GB" dirty="0" smtClean="0"/>
+              <a:t>path</a:t>
             </a:r>
           </a:p>
           <a:p>
             <a:pPr lvl="1"/>
             <a:r>
-              <a:rPr lang="en-GB" dirty="0" smtClean="0"/>
-              <a:t>error - error to report to user (?)</a:t>
+              <a:rPr lang="en-GB" dirty="0" err="1" smtClean="0"/>
+              <a:t>webctfileid</a:t>
+            </a:r>
+            <a:r>
+              <a:rPr lang="en-GB" dirty="0" smtClean="0"/>
+              <a:t> – </a:t>
+            </a:r>
+            <a:r>
+              <a:rPr lang="en-GB" dirty="0" smtClean="0"/>
+              <a:t>FK for </a:t>
+            </a:r>
+            <a:r>
+              <a:rPr lang="en-GB" dirty="0" err="1" smtClean="0"/>
+              <a:t>webctfile</a:t>
+            </a:r>
+            <a:r>
+              <a:rPr lang="en-GB" dirty="0" smtClean="0"/>
+              <a:t> table</a:t>
+            </a:r>
+          </a:p>
+          <a:p>
+            <a:pPr lvl="2"/>
+            <a:r>
+              <a:rPr lang="en-GB" dirty="0" smtClean="0"/>
+              <a:t>Changed meaning 2011-08-03</a:t>
             </a:r>
           </a:p>
           <a:p>
             <a:pPr lvl="1"/>
             <a:r>
               <a:rPr lang="en-GB" dirty="0" err="1" smtClean="0"/>
-              <a:t>webctfileid</a:t>
-            </a:r>
-            <a:r>
-              <a:rPr lang="en-GB" dirty="0" smtClean="0"/>
-              <a:t> – </a:t>
-            </a:r>
-            <a:r>
-              <a:rPr lang="en-GB" dirty="0" err="1" smtClean="0"/>
-              <a:t>CmsFileContent</a:t>
-            </a:r>
-            <a:r>
-              <a:rPr lang="en-GB" dirty="0" smtClean="0"/>
-              <a:t> id from </a:t>
-            </a:r>
-            <a:r>
-              <a:rPr lang="en-GB" dirty="0" err="1" smtClean="0"/>
-              <a:t>WebCT</a:t>
-            </a:r>
-            <a:r>
-              <a:rPr lang="en-GB" dirty="0" smtClean="0"/>
-              <a:t> (?)</a:t>
-            </a:r>
+              <a:t>targettype</a:t>
+            </a:r>
+            <a:r>
+              <a:rPr lang="en-GB" dirty="0" smtClean="0"/>
+              <a:t> – none, file or </a:t>
+            </a:r>
+            <a:r>
+              <a:rPr lang="en-GB" dirty="0" err="1" smtClean="0"/>
+              <a:t>equella</a:t>
+            </a:r>
+            <a:r>
+              <a:rPr lang="en-GB" dirty="0" smtClean="0"/>
+              <a:t>/etc.</a:t>
+            </a:r>
+          </a:p>
+          <a:p>
+            <a:pPr lvl="2"/>
+            <a:r>
+              <a:rPr lang="en-GB" dirty="0" smtClean="0"/>
+              <a:t>Added 2011-08-03</a:t>
+            </a:r>
+            <a:endParaRPr lang="en-GB" dirty="0" smtClean="0"/>
+          </a:p>
+          <a:p>
+            <a:r>
+              <a:rPr lang="en-GB" dirty="0" smtClean="0"/>
+              <a:t>Removed:</a:t>
+            </a:r>
+            <a:endParaRPr lang="en-GB" dirty="0" smtClean="0"/>
           </a:p>
           <a:p>
             <a:pPr lvl="1"/>
             <a:r>
               <a:rPr lang="en-GB" dirty="0" smtClean="0"/>
-              <a:t>metadata – JSON-encoded metadata for import to </a:t>
-            </a:r>
-            <a:r>
-              <a:rPr lang="en-GB" dirty="0" err="1" smtClean="0"/>
-              <a:t>Equella</a:t>
-            </a:r>
-            <a:r>
-              <a:rPr lang="en-GB" dirty="0" smtClean="0"/>
-              <a:t> etc (?)</a:t>
-            </a:r>
-          </a:p>
-          <a:p>
-            <a:pPr lvl="1"/>
-            <a:r>
-              <a:rPr lang="en-GB" dirty="0" smtClean="0"/>
-              <a:t>owners – Nominal access list from </a:t>
-            </a:r>
-            <a:r>
-              <a:rPr lang="en-GB" dirty="0" err="1" smtClean="0"/>
-              <a:t>WebCT</a:t>
-            </a:r>
-            <a:endParaRPr lang="en-GB" dirty="0"/>
+              <a:t>2011-08-03: error, metadata, owners</a:t>
+            </a:r>
+            <a:endParaRPr lang="en-GB" dirty="0" smtClean="0"/>
           </a:p>
         </p:txBody>
       </p:sp>
@@ -8975,7 +8969,11 @@
             </a:r>
             <a:r>
               <a:rPr lang="en-GB" dirty="0" smtClean="0"/>
-              <a:t> table</a:t>
+              <a:t> </a:t>
+            </a:r>
+            <a:r>
+              <a:rPr lang="en-GB" dirty="0" smtClean="0"/>
+              <a:t>table</a:t>
             </a:r>
             <a:endParaRPr lang="en-GB" dirty="0"/>
           </a:p>
@@ -8994,26 +8992,47 @@
         <p:spPr/>
         <p:txBody>
           <a:bodyPr>
-            <a:normAutofit fontScale="70000" lnSpcReduction="20000"/>
+            <a:normAutofit fontScale="77500" lnSpcReduction="20000"/>
           </a:bodyPr>
           <a:lstStyle/>
           <a:p>
             <a:r>
-              <a:rPr lang="en-GB" b="1" dirty="0" smtClean="0"/>
-              <a:t>Not yet implemented </a:t>
-            </a:r>
-          </a:p>
-          <a:p>
-            <a:r>
-              <a:rPr lang="en-GB" dirty="0" smtClean="0"/>
-              <a:t>Row per imported file</a:t>
-            </a:r>
+              <a:rPr lang="en-GB" dirty="0" smtClean="0"/>
+              <a:t>(updated 2011-08-03)</a:t>
+            </a:r>
+          </a:p>
+          <a:p>
+            <a:r>
+              <a:rPr lang="en-GB" dirty="0" smtClean="0"/>
+              <a:t>Row </a:t>
+            </a:r>
+            <a:r>
+              <a:rPr lang="en-GB" dirty="0" smtClean="0"/>
+              <a:t>per </a:t>
+            </a:r>
+            <a:r>
+              <a:rPr lang="en-GB" dirty="0" smtClean="0"/>
+              <a:t>file imported to </a:t>
+            </a:r>
+            <a:r>
+              <a:rPr lang="en-GB" dirty="0" err="1" smtClean="0"/>
+              <a:t>Moodle</a:t>
+            </a:r>
+            <a:r>
+              <a:rPr lang="en-GB" dirty="0" smtClean="0"/>
+              <a:t> file</a:t>
+            </a:r>
+            <a:endParaRPr lang="en-GB" dirty="0" smtClean="0"/>
           </a:p>
           <a:p>
             <a:pPr lvl="1"/>
             <a:r>
               <a:rPr lang="en-GB" dirty="0" smtClean="0"/>
-              <a:t>Many-to-one mapping to </a:t>
+              <a:t>0/1-to-0/1 mapping </a:t>
+            </a:r>
+            <a:r>
+              <a:rPr lang="en-GB" dirty="0" smtClean="0"/>
+              <a:t>to </a:t>
             </a:r>
             <a:r>
               <a:rPr lang="en-GB" dirty="0" err="1" smtClean="0"/>
@@ -9028,15 +9047,15 @@
             <a:pPr lvl="2"/>
             <a:r>
               <a:rPr lang="en-GB" dirty="0" smtClean="0"/>
-              <a:t>i.e. the same file may appear in several places in </a:t>
-            </a:r>
-            <a:r>
-              <a:rPr lang="en-GB" dirty="0" err="1" smtClean="0"/>
-              <a:t>Moodle</a:t>
-            </a:r>
-            <a:r>
-              <a:rPr lang="en-GB" dirty="0" smtClean="0"/>
-              <a:t> =&gt; one </a:t>
+              <a:t>i.e. </a:t>
+            </a:r>
+            <a:r>
+              <a:rPr lang="en-GB" dirty="0" err="1" smtClean="0"/>
+              <a:t>webctimport</a:t>
+            </a:r>
+            <a:r>
+              <a:rPr lang="en-GB" dirty="0" smtClean="0"/>
+              <a:t> row created initially, then </a:t>
             </a:r>
             <a:r>
               <a:rPr lang="en-GB" dirty="0" err="1" smtClean="0"/>
@@ -9044,7 +9063,19 @@
             </a:r>
             <a:r>
               <a:rPr lang="en-GB" dirty="0" smtClean="0"/>
-              <a:t> row, several </a:t>
+              <a:t> if import to </a:t>
+            </a:r>
+            <a:r>
+              <a:rPr lang="en-GB" dirty="0" err="1" smtClean="0"/>
+              <a:t>moodle</a:t>
+            </a:r>
+            <a:r>
+              <a:rPr lang="en-GB" dirty="0" smtClean="0"/>
+              <a:t> </a:t>
+            </a:r>
+            <a:r>
+              <a:rPr lang="en-GB" dirty="0" smtClean="0"/>
+              <a:t>file, then </a:t>
             </a:r>
             <a:r>
               <a:rPr lang="en-GB" dirty="0" err="1" smtClean="0"/>
@@ -9052,7 +9083,15 @@
             </a:r>
             <a:r>
               <a:rPr lang="en-GB" dirty="0" smtClean="0"/>
-              <a:t> rows</a:t>
+              <a:t> row deleted when import complete (</a:t>
+            </a:r>
+            <a:r>
+              <a:rPr lang="en-GB" dirty="0" err="1" smtClean="0"/>
+              <a:t>webctfile</a:t>
+            </a:r>
+            <a:r>
+              <a:rPr lang="en-GB" dirty="0" smtClean="0"/>
+              <a:t> row retained for reference).</a:t>
             </a:r>
           </a:p>
           <a:p>
@@ -9076,7 +9115,7 @@
         <p:spPr/>
         <p:txBody>
           <a:bodyPr>
-            <a:normAutofit fontScale="70000" lnSpcReduction="20000"/>
+            <a:normAutofit fontScale="77500" lnSpcReduction="20000"/>
           </a:bodyPr>
           <a:lstStyle/>
           <a:p>
@@ -9095,34 +9134,72 @@
           <a:p>
             <a:pPr lvl="1"/>
             <a:r>
-              <a:rPr lang="en-GB" dirty="0" err="1" smtClean="0"/>
-              <a:t>webctfileid</a:t>
-            </a:r>
-            <a:r>
-              <a:rPr lang="en-GB" dirty="0" smtClean="0"/>
-              <a:t> – Key, </a:t>
-            </a:r>
-            <a:r>
-              <a:rPr lang="en-GB" dirty="0" err="1" smtClean="0"/>
-              <a:t>CmsFileContent</a:t>
-            </a:r>
-            <a:r>
-              <a:rPr lang="en-GB" dirty="0" smtClean="0"/>
-              <a:t> ID</a:t>
+              <a:rPr lang="en-GB" dirty="0" smtClean="0"/>
+              <a:t>status </a:t>
+            </a:r>
+            <a:r>
+              <a:rPr lang="en-GB" dirty="0" smtClean="0"/>
+              <a:t>– new, in progress, success, failure/retry, failure/give up</a:t>
             </a:r>
           </a:p>
           <a:p>
             <a:pPr lvl="1"/>
             <a:r>
               <a:rPr lang="en-GB" dirty="0" smtClean="0"/>
-              <a:t>status – new, in progress, success, failure/retry, failure/give up</a:t>
+              <a:t>error – </a:t>
+            </a:r>
+            <a:r>
+              <a:rPr lang="en-GB" dirty="0" err="1" smtClean="0"/>
+              <a:t>error</a:t>
+            </a:r>
+            <a:r>
+              <a:rPr lang="en-GB" dirty="0" smtClean="0"/>
+              <a:t> </a:t>
+            </a:r>
+            <a:r>
+              <a:rPr lang="en-GB" dirty="0" err="1" smtClean="0"/>
+              <a:t>msg</a:t>
+            </a:r>
+            <a:r>
+              <a:rPr lang="en-GB" dirty="0" smtClean="0"/>
+              <a:t> for user</a:t>
             </a:r>
           </a:p>
           <a:p>
             <a:pPr lvl="1"/>
             <a:r>
-              <a:rPr lang="en-GB" dirty="0" smtClean="0"/>
-              <a:t>metadata – see </a:t>
+              <a:rPr lang="en-GB" dirty="0" err="1" smtClean="0"/>
+              <a:t>workerid</a:t>
+            </a:r>
+            <a:r>
+              <a:rPr lang="en-GB" dirty="0" smtClean="0"/>
+              <a:t>  </a:t>
+            </a:r>
+            <a:r>
+              <a:rPr lang="en-GB" dirty="0" smtClean="0"/>
+              <a:t>- thread (?) doing import</a:t>
+            </a:r>
+          </a:p>
+          <a:p>
+            <a:pPr lvl="1"/>
+            <a:r>
+              <a:rPr lang="en-GB" dirty="0" err="1" smtClean="0"/>
+              <a:t>workertimestamp</a:t>
+            </a:r>
+            <a:r>
+              <a:rPr lang="en-GB" dirty="0" smtClean="0"/>
+              <a:t> – timestamp of import</a:t>
+            </a:r>
+          </a:p>
+          <a:p>
+            <a:pPr lvl="1"/>
+            <a:r>
+              <a:rPr lang="en-GB" dirty="0" err="1" smtClean="0"/>
+              <a:t>localfilepath</a:t>
+            </a:r>
+            <a:r>
+              <a:rPr lang="en-GB" dirty="0" smtClean="0"/>
+              <a:t> – see </a:t>
             </a:r>
             <a:r>
               <a:rPr lang="en-GB" dirty="0" err="1" smtClean="0"/>
@@ -9133,80 +9210,31 @@
           <a:p>
             <a:pPr lvl="1"/>
             <a:r>
-              <a:rPr lang="en-GB" dirty="0" smtClean="0"/>
-              <a:t>owners – see </a:t>
-            </a:r>
-            <a:r>
-              <a:rPr lang="en-GB" dirty="0" err="1" smtClean="0"/>
-              <a:t>webctimport</a:t>
-            </a:r>
-            <a:endParaRPr lang="en-GB" dirty="0" smtClean="0"/>
+              <a:rPr lang="en-GB" dirty="0" err="1" smtClean="0"/>
+              <a:t>webctpath</a:t>
+            </a:r>
+            <a:r>
+              <a:rPr lang="en-GB" dirty="0" smtClean="0"/>
+              <a:t> – </a:t>
+            </a:r>
+            <a:r>
+              <a:rPr lang="en-GB" dirty="0" err="1" smtClean="0"/>
+              <a:t>webct</a:t>
+            </a:r>
+            <a:r>
+              <a:rPr lang="en-GB" dirty="0" smtClean="0"/>
+              <a:t> internal file path (indexed)</a:t>
+            </a:r>
           </a:p>
           <a:p>
             <a:pPr lvl="1"/>
             <a:r>
               <a:rPr lang="en-GB" dirty="0" err="1" smtClean="0"/>
-              <a:t>equellainfo</a:t>
-            </a:r>
-            <a:r>
-              <a:rPr lang="en-GB" dirty="0" smtClean="0"/>
-              <a:t> – result of successful </a:t>
-            </a:r>
-            <a:r>
-              <a:rPr lang="en-GB" dirty="0" err="1" smtClean="0"/>
-              <a:t>Equella</a:t>
-            </a:r>
-            <a:r>
-              <a:rPr lang="en-GB" dirty="0" smtClean="0"/>
-              <a:t> import</a:t>
-            </a:r>
-          </a:p>
-          <a:p>
-            <a:pPr lvl="1"/>
-            <a:r>
-              <a:rPr lang="en-GB" dirty="0" err="1" smtClean="0"/>
-              <a:t>fileinfo</a:t>
-            </a:r>
-            <a:r>
-              <a:rPr lang="en-GB" dirty="0" smtClean="0"/>
-              <a:t> – result of successful file import</a:t>
-            </a:r>
-          </a:p>
-          <a:p>
-            <a:pPr lvl="1"/>
-            <a:r>
-              <a:rPr lang="en-GB" dirty="0" err="1" smtClean="0"/>
-              <a:t>workerid</a:t>
-            </a:r>
-            <a:r>
-              <a:rPr lang="en-GB" dirty="0" smtClean="0"/>
-              <a:t>  - thread (?) doing import</a:t>
-            </a:r>
-          </a:p>
-          <a:p>
-            <a:pPr lvl="1"/>
-            <a:r>
-              <a:rPr lang="en-GB" dirty="0" err="1" smtClean="0"/>
-              <a:t>workertimestamp</a:t>
-            </a:r>
-            <a:r>
-              <a:rPr lang="en-GB" dirty="0" smtClean="0"/>
-              <a:t> – timestamp of import</a:t>
-            </a:r>
-          </a:p>
-          <a:p>
-            <a:pPr lvl="1"/>
-            <a:r>
-              <a:rPr lang="en-GB" dirty="0" err="1" smtClean="0"/>
-              <a:t>localfilepath</a:t>
-            </a:r>
-            <a:r>
-              <a:rPr lang="en-GB" dirty="0" smtClean="0"/>
-              <a:t> – see </a:t>
-            </a:r>
-            <a:r>
-              <a:rPr lang="en-GB" dirty="0" err="1" smtClean="0"/>
-              <a:t>webctimport</a:t>
+              <a:t>owneruserid</a:t>
+            </a:r>
+            <a:r>
+              <a:rPr lang="en-GB" dirty="0" smtClean="0"/>
+              <a:t> – user id of creator/owner</a:t>
             </a:r>
             <a:endParaRPr lang="en-GB" dirty="0" smtClean="0"/>
           </a:p>

</xml_diff>